<commit_message>
More figures and assorted results to validate
</commit_message>
<xml_diff>
--- a/Pictures/Figures/Figure 9.pptx
+++ b/Pictures/Figures/Figure 9.pptx
@@ -2,12 +2,12 @@
 <file path=ppt/presentation.xml><?xml version="1.0" encoding="utf-8"?>
 <p:presentation xmlns:a="http://schemas.openxmlformats.org/drawingml/2006/main" xmlns:r="http://schemas.openxmlformats.org/officeDocument/2006/relationships" xmlns:p="http://schemas.openxmlformats.org/presentationml/2006/main" saveSubsetFonts="1">
   <p:sldMasterIdLst>
-    <p:sldMasterId id="2147483672" r:id="rId1"/>
+    <p:sldMasterId id="2147483684" r:id="rId1"/>
   </p:sldMasterIdLst>
   <p:sldIdLst>
     <p:sldId id="256" r:id="rId2"/>
   </p:sldIdLst>
-  <p:sldSz cx="9144000" cy="9144000"/>
+  <p:sldSz cx="9144000" cy="10058400"/>
   <p:notesSz cx="6858000" cy="9144000"/>
   <p:defaultTextStyle>
     <a:defPPr>
@@ -104,6 +104,11 @@
       </a:defRPr>
     </a:lvl9pPr>
   </p:defaultTextStyle>
+  <p:extLst>
+    <p:ext uri="{EFAFB233-063F-42B5-8137-9DF3F51BA10A}">
+      <p15:sldGuideLst xmlns:p15="http://schemas.microsoft.com/office/powerpoint/2012/main"/>
+    </p:ext>
+  </p:extLst>
 </p:presentation>
 </file>
 
@@ -136,8 +141,8 @@
         </p:nvSpPr>
         <p:spPr>
           <a:xfrm>
-            <a:off x="685800" y="1496484"/>
-            <a:ext cx="7772400" cy="3183467"/>
+            <a:off x="685800" y="1646133"/>
+            <a:ext cx="7772400" cy="3501813"/>
           </a:xfrm>
         </p:spPr>
         <p:txBody>
@@ -168,8 +173,8 @@
         </p:nvSpPr>
         <p:spPr>
           <a:xfrm>
-            <a:off x="1143000" y="4802717"/>
-            <a:ext cx="6858000" cy="2207683"/>
+            <a:off x="1143000" y="5282989"/>
+            <a:ext cx="6858000" cy="2428451"/>
           </a:xfrm>
         </p:spPr>
         <p:txBody>
@@ -289,7 +294,7 @@
     </p:spTree>
     <p:extLst>
       <p:ext uri="{BB962C8B-B14F-4D97-AF65-F5344CB8AC3E}">
-        <p14:creationId xmlns:p14="http://schemas.microsoft.com/office/powerpoint/2010/main" val="3310711644"/>
+        <p14:creationId xmlns:p14="http://schemas.microsoft.com/office/powerpoint/2010/main" val="830809855"/>
       </p:ext>
     </p:extLst>
   </p:cSld>
@@ -459,7 +464,7 @@
     </p:spTree>
     <p:extLst>
       <p:ext uri="{BB962C8B-B14F-4D97-AF65-F5344CB8AC3E}">
-        <p14:creationId xmlns:p14="http://schemas.microsoft.com/office/powerpoint/2010/main" val="3891299856"/>
+        <p14:creationId xmlns:p14="http://schemas.microsoft.com/office/powerpoint/2010/main" val="3099198274"/>
       </p:ext>
     </p:extLst>
   </p:cSld>
@@ -498,8 +503,8 @@
         </p:nvSpPr>
         <p:spPr>
           <a:xfrm>
-            <a:off x="6543676" y="486834"/>
-            <a:ext cx="1971675" cy="7749117"/>
+            <a:off x="6543676" y="535517"/>
+            <a:ext cx="1971675" cy="8524029"/>
           </a:xfrm>
         </p:spPr>
         <p:txBody>
@@ -526,8 +531,8 @@
         </p:nvSpPr>
         <p:spPr>
           <a:xfrm>
-            <a:off x="628651" y="486834"/>
-            <a:ext cx="5800725" cy="7749117"/>
+            <a:off x="628651" y="535517"/>
+            <a:ext cx="5800725" cy="8524029"/>
           </a:xfrm>
         </p:spPr>
         <p:txBody>
@@ -639,7 +644,7 @@
     </p:spTree>
     <p:extLst>
       <p:ext uri="{BB962C8B-B14F-4D97-AF65-F5344CB8AC3E}">
-        <p14:creationId xmlns:p14="http://schemas.microsoft.com/office/powerpoint/2010/main" val="4266547830"/>
+        <p14:creationId xmlns:p14="http://schemas.microsoft.com/office/powerpoint/2010/main" val="945774250"/>
       </p:ext>
     </p:extLst>
   </p:cSld>
@@ -809,7 +814,7 @@
     </p:spTree>
     <p:extLst>
       <p:ext uri="{BB962C8B-B14F-4D97-AF65-F5344CB8AC3E}">
-        <p14:creationId xmlns:p14="http://schemas.microsoft.com/office/powerpoint/2010/main" val="639189725"/>
+        <p14:creationId xmlns:p14="http://schemas.microsoft.com/office/powerpoint/2010/main" val="3073248055"/>
       </p:ext>
     </p:extLst>
   </p:cSld>
@@ -848,8 +853,8 @@
         </p:nvSpPr>
         <p:spPr>
           <a:xfrm>
-            <a:off x="623888" y="2279653"/>
-            <a:ext cx="7886700" cy="3803649"/>
+            <a:off x="623888" y="2507618"/>
+            <a:ext cx="7886700" cy="4184014"/>
           </a:xfrm>
         </p:spPr>
         <p:txBody>
@@ -880,8 +885,8 @@
         </p:nvSpPr>
         <p:spPr>
           <a:xfrm>
-            <a:off x="623888" y="6119286"/>
-            <a:ext cx="7886700" cy="2000249"/>
+            <a:off x="623888" y="6731215"/>
+            <a:ext cx="7886700" cy="2200274"/>
           </a:xfrm>
         </p:spPr>
         <p:txBody>
@@ -1053,7 +1058,7 @@
     </p:spTree>
     <p:extLst>
       <p:ext uri="{BB962C8B-B14F-4D97-AF65-F5344CB8AC3E}">
-        <p14:creationId xmlns:p14="http://schemas.microsoft.com/office/powerpoint/2010/main" val="2799114705"/>
+        <p14:creationId xmlns:p14="http://schemas.microsoft.com/office/powerpoint/2010/main" val="854754761"/>
       </p:ext>
     </p:extLst>
   </p:cSld>
@@ -1115,8 +1120,8 @@
         </p:nvSpPr>
         <p:spPr>
           <a:xfrm>
-            <a:off x="628650" y="2434167"/>
-            <a:ext cx="3886200" cy="5801784"/>
+            <a:off x="628650" y="2677584"/>
+            <a:ext cx="3886200" cy="6381962"/>
           </a:xfrm>
         </p:spPr>
         <p:txBody>
@@ -1172,8 +1177,8 @@
         </p:nvSpPr>
         <p:spPr>
           <a:xfrm>
-            <a:off x="4629150" y="2434167"/>
-            <a:ext cx="3886200" cy="5801784"/>
+            <a:off x="4629150" y="2677584"/>
+            <a:ext cx="3886200" cy="6381962"/>
           </a:xfrm>
         </p:spPr>
         <p:txBody>
@@ -1285,7 +1290,7 @@
     </p:spTree>
     <p:extLst>
       <p:ext uri="{BB962C8B-B14F-4D97-AF65-F5344CB8AC3E}">
-        <p14:creationId xmlns:p14="http://schemas.microsoft.com/office/powerpoint/2010/main" val="1789429665"/>
+        <p14:creationId xmlns:p14="http://schemas.microsoft.com/office/powerpoint/2010/main" val="2335893193"/>
       </p:ext>
     </p:extLst>
   </p:cSld>
@@ -1324,8 +1329,8 @@
         </p:nvSpPr>
         <p:spPr>
           <a:xfrm>
-            <a:off x="629841" y="486836"/>
-            <a:ext cx="7886700" cy="1767417"/>
+            <a:off x="629841" y="535519"/>
+            <a:ext cx="7886700" cy="1944159"/>
           </a:xfrm>
         </p:spPr>
         <p:txBody>
@@ -1352,8 +1357,8 @@
         </p:nvSpPr>
         <p:spPr>
           <a:xfrm>
-            <a:off x="629842" y="2241551"/>
-            <a:ext cx="3868340" cy="1098549"/>
+            <a:off x="629842" y="2465706"/>
+            <a:ext cx="3868340" cy="1208404"/>
           </a:xfrm>
         </p:spPr>
         <p:txBody>
@@ -1417,8 +1422,8 @@
         </p:nvSpPr>
         <p:spPr>
           <a:xfrm>
-            <a:off x="629842" y="3340100"/>
-            <a:ext cx="3868340" cy="4912784"/>
+            <a:off x="629842" y="3674110"/>
+            <a:ext cx="3868340" cy="5404062"/>
           </a:xfrm>
         </p:spPr>
         <p:txBody>
@@ -1474,8 +1479,8 @@
         </p:nvSpPr>
         <p:spPr>
           <a:xfrm>
-            <a:off x="4629151" y="2241551"/>
-            <a:ext cx="3887391" cy="1098549"/>
+            <a:off x="4629151" y="2465706"/>
+            <a:ext cx="3887391" cy="1208404"/>
           </a:xfrm>
         </p:spPr>
         <p:txBody>
@@ -1539,8 +1544,8 @@
         </p:nvSpPr>
         <p:spPr>
           <a:xfrm>
-            <a:off x="4629151" y="3340100"/>
-            <a:ext cx="3887391" cy="4912784"/>
+            <a:off x="4629151" y="3674110"/>
+            <a:ext cx="3887391" cy="5404062"/>
           </a:xfrm>
         </p:spPr>
         <p:txBody>
@@ -1652,7 +1657,7 @@
     </p:spTree>
     <p:extLst>
       <p:ext uri="{BB962C8B-B14F-4D97-AF65-F5344CB8AC3E}">
-        <p14:creationId xmlns:p14="http://schemas.microsoft.com/office/powerpoint/2010/main" val="3206778193"/>
+        <p14:creationId xmlns:p14="http://schemas.microsoft.com/office/powerpoint/2010/main" val="1009417275"/>
       </p:ext>
     </p:extLst>
   </p:cSld>
@@ -1770,7 +1775,7 @@
     </p:spTree>
     <p:extLst>
       <p:ext uri="{BB962C8B-B14F-4D97-AF65-F5344CB8AC3E}">
-        <p14:creationId xmlns:p14="http://schemas.microsoft.com/office/powerpoint/2010/main" val="2246537282"/>
+        <p14:creationId xmlns:p14="http://schemas.microsoft.com/office/powerpoint/2010/main" val="592189900"/>
       </p:ext>
     </p:extLst>
   </p:cSld>
@@ -1865,7 +1870,7 @@
     </p:spTree>
     <p:extLst>
       <p:ext uri="{BB962C8B-B14F-4D97-AF65-F5344CB8AC3E}">
-        <p14:creationId xmlns:p14="http://schemas.microsoft.com/office/powerpoint/2010/main" val="8405595"/>
+        <p14:creationId xmlns:p14="http://schemas.microsoft.com/office/powerpoint/2010/main" val="1012108371"/>
       </p:ext>
     </p:extLst>
   </p:cSld>
@@ -1904,8 +1909,8 @@
         </p:nvSpPr>
         <p:spPr>
           <a:xfrm>
-            <a:off x="629841" y="609600"/>
-            <a:ext cx="2949178" cy="2133600"/>
+            <a:off x="629841" y="670560"/>
+            <a:ext cx="2949178" cy="2346960"/>
           </a:xfrm>
         </p:spPr>
         <p:txBody>
@@ -1936,8 +1941,8 @@
         </p:nvSpPr>
         <p:spPr>
           <a:xfrm>
-            <a:off x="3887391" y="1316569"/>
-            <a:ext cx="4629150" cy="6498167"/>
+            <a:off x="3887391" y="1448226"/>
+            <a:ext cx="4629150" cy="7147983"/>
           </a:xfrm>
         </p:spPr>
         <p:txBody>
@@ -2021,8 +2026,8 @@
         </p:nvSpPr>
         <p:spPr>
           <a:xfrm>
-            <a:off x="629841" y="2743200"/>
-            <a:ext cx="2949178" cy="5082117"/>
+            <a:off x="629841" y="3017520"/>
+            <a:ext cx="2949178" cy="5590329"/>
           </a:xfrm>
         </p:spPr>
         <p:txBody>
@@ -2142,7 +2147,7 @@
     </p:spTree>
     <p:extLst>
       <p:ext uri="{BB962C8B-B14F-4D97-AF65-F5344CB8AC3E}">
-        <p14:creationId xmlns:p14="http://schemas.microsoft.com/office/powerpoint/2010/main" val="1886310953"/>
+        <p14:creationId xmlns:p14="http://schemas.microsoft.com/office/powerpoint/2010/main" val="498217598"/>
       </p:ext>
     </p:extLst>
   </p:cSld>
@@ -2181,8 +2186,8 @@
         </p:nvSpPr>
         <p:spPr>
           <a:xfrm>
-            <a:off x="629841" y="609600"/>
-            <a:ext cx="2949178" cy="2133600"/>
+            <a:off x="629841" y="670560"/>
+            <a:ext cx="2949178" cy="2346960"/>
           </a:xfrm>
         </p:spPr>
         <p:txBody>
@@ -2213,8 +2218,8 @@
         </p:nvSpPr>
         <p:spPr>
           <a:xfrm>
-            <a:off x="3887391" y="1316569"/>
-            <a:ext cx="4629150" cy="6498167"/>
+            <a:off x="3887391" y="1448226"/>
+            <a:ext cx="4629150" cy="7147983"/>
           </a:xfrm>
         </p:spPr>
         <p:txBody>
@@ -2278,8 +2283,8 @@
         </p:nvSpPr>
         <p:spPr>
           <a:xfrm>
-            <a:off x="629841" y="2743200"/>
-            <a:ext cx="2949178" cy="5082117"/>
+            <a:off x="629841" y="3017520"/>
+            <a:ext cx="2949178" cy="5590329"/>
           </a:xfrm>
         </p:spPr>
         <p:txBody>
@@ -2399,7 +2404,7 @@
     </p:spTree>
     <p:extLst>
       <p:ext uri="{BB962C8B-B14F-4D97-AF65-F5344CB8AC3E}">
-        <p14:creationId xmlns:p14="http://schemas.microsoft.com/office/powerpoint/2010/main" val="3838346808"/>
+        <p14:creationId xmlns:p14="http://schemas.microsoft.com/office/powerpoint/2010/main" val="1107266632"/>
       </p:ext>
     </p:extLst>
   </p:cSld>
@@ -2443,8 +2448,8 @@
         </p:nvSpPr>
         <p:spPr>
           <a:xfrm>
-            <a:off x="628650" y="486836"/>
-            <a:ext cx="7886700" cy="1767417"/>
+            <a:off x="628650" y="535519"/>
+            <a:ext cx="7886700" cy="1944159"/>
           </a:xfrm>
           <a:prstGeom prst="rect">
             <a:avLst/>
@@ -2476,8 +2481,8 @@
         </p:nvSpPr>
         <p:spPr>
           <a:xfrm>
-            <a:off x="628650" y="2434167"/>
-            <a:ext cx="7886700" cy="5801784"/>
+            <a:off x="628650" y="2677584"/>
+            <a:ext cx="7886700" cy="6381962"/>
           </a:xfrm>
           <a:prstGeom prst="rect">
             <a:avLst/>
@@ -2538,8 +2543,8 @@
         </p:nvSpPr>
         <p:spPr>
           <a:xfrm>
-            <a:off x="628650" y="8475136"/>
-            <a:ext cx="2057400" cy="486833"/>
+            <a:off x="628650" y="9322649"/>
+            <a:ext cx="2057400" cy="535517"/>
           </a:xfrm>
           <a:prstGeom prst="rect">
             <a:avLst/>
@@ -2579,8 +2584,8 @@
         </p:nvSpPr>
         <p:spPr>
           <a:xfrm>
-            <a:off x="3028950" y="8475136"/>
-            <a:ext cx="3086100" cy="486833"/>
+            <a:off x="3028950" y="9322649"/>
+            <a:ext cx="3086100" cy="535517"/>
           </a:xfrm>
           <a:prstGeom prst="rect">
             <a:avLst/>
@@ -2616,8 +2621,8 @@
         </p:nvSpPr>
         <p:spPr>
           <a:xfrm>
-            <a:off x="6457950" y="8475136"/>
-            <a:ext cx="2057400" cy="486833"/>
+            <a:off x="6457950" y="9322649"/>
+            <a:ext cx="2057400" cy="535517"/>
           </a:xfrm>
           <a:prstGeom prst="rect">
             <a:avLst/>
@@ -2648,23 +2653,23 @@
     </p:spTree>
     <p:extLst>
       <p:ext uri="{BB962C8B-B14F-4D97-AF65-F5344CB8AC3E}">
-        <p14:creationId xmlns:p14="http://schemas.microsoft.com/office/powerpoint/2010/main" val="2510578593"/>
+        <p14:creationId xmlns:p14="http://schemas.microsoft.com/office/powerpoint/2010/main" val="3650529604"/>
       </p:ext>
     </p:extLst>
   </p:cSld>
   <p:clrMap bg1="lt1" tx1="dk1" bg2="lt2" tx2="dk2" accent1="accent1" accent2="accent2" accent3="accent3" accent4="accent4" accent5="accent5" accent6="accent6" hlink="hlink" folHlink="folHlink"/>
   <p:sldLayoutIdLst>
-    <p:sldLayoutId id="2147483673" r:id="rId1"/>
-    <p:sldLayoutId id="2147483674" r:id="rId2"/>
-    <p:sldLayoutId id="2147483675" r:id="rId3"/>
-    <p:sldLayoutId id="2147483676" r:id="rId4"/>
-    <p:sldLayoutId id="2147483677" r:id="rId5"/>
-    <p:sldLayoutId id="2147483678" r:id="rId6"/>
-    <p:sldLayoutId id="2147483679" r:id="rId7"/>
-    <p:sldLayoutId id="2147483680" r:id="rId8"/>
-    <p:sldLayoutId id="2147483681" r:id="rId9"/>
-    <p:sldLayoutId id="2147483682" r:id="rId10"/>
-    <p:sldLayoutId id="2147483683" r:id="rId11"/>
+    <p:sldLayoutId id="2147483685" r:id="rId1"/>
+    <p:sldLayoutId id="2147483686" r:id="rId2"/>
+    <p:sldLayoutId id="2147483687" r:id="rId3"/>
+    <p:sldLayoutId id="2147483688" r:id="rId4"/>
+    <p:sldLayoutId id="2147483689" r:id="rId5"/>
+    <p:sldLayoutId id="2147483690" r:id="rId6"/>
+    <p:sldLayoutId id="2147483691" r:id="rId7"/>
+    <p:sldLayoutId id="2147483692" r:id="rId8"/>
+    <p:sldLayoutId id="2147483693" r:id="rId9"/>
+    <p:sldLayoutId id="2147483694" r:id="rId10"/>
+    <p:sldLayoutId id="2147483695" r:id="rId11"/>
   </p:sldLayoutIdLst>
   <p:txStyles>
     <p:titleStyle>
@@ -2966,6 +2971,4524 @@
           <a:chExt cx="0" cy="0"/>
         </a:xfrm>
       </p:grpSpPr>
+      <p:pic>
+        <p:nvPicPr>
+          <p:cNvPr id="282" name="Picture 281">
+            <a:extLst>
+              <a:ext uri="{FF2B5EF4-FFF2-40B4-BE49-F238E27FC236}">
+                <a16:creationId xmlns:a16="http://schemas.microsoft.com/office/drawing/2014/main" id="{4DD5933B-D32C-47E0-9FFB-43B119581EA4}"/>
+              </a:ext>
+            </a:extLst>
+          </p:cNvPr>
+          <p:cNvPicPr>
+            <a:picLocks noChangeAspect="1"/>
+          </p:cNvPicPr>
+          <p:nvPr/>
+        </p:nvPicPr>
+        <p:blipFill>
+          <a:blip r:embed="rId2">
+            <a:extLst>
+              <a:ext uri="{28A0092B-C50C-407E-A947-70E740481C1C}">
+                <a14:useLocalDpi xmlns:a14="http://schemas.microsoft.com/office/drawing/2010/main" val="0"/>
+              </a:ext>
+            </a:extLst>
+          </a:blip>
+          <a:stretch>
+            <a:fillRect/>
+          </a:stretch>
+        </p:blipFill>
+        <p:spPr>
+          <a:xfrm>
+            <a:off x="187600" y="93286"/>
+            <a:ext cx="6537925" cy="3624214"/>
+          </a:xfrm>
+          <a:prstGeom prst="rect">
+            <a:avLst/>
+          </a:prstGeom>
+        </p:spPr>
+      </p:pic>
+      <p:sp>
+        <p:nvSpPr>
+          <p:cNvPr id="283" name="TextBox 282">
+            <a:extLst>
+              <a:ext uri="{FF2B5EF4-FFF2-40B4-BE49-F238E27FC236}">
+                <a16:creationId xmlns:a16="http://schemas.microsoft.com/office/drawing/2014/main" id="{F49DA689-9020-4EBE-AACC-93DC8A82D965}"/>
+              </a:ext>
+            </a:extLst>
+          </p:cNvPr>
+          <p:cNvSpPr txBox="1"/>
+          <p:nvPr/>
+        </p:nvSpPr>
+        <p:spPr>
+          <a:xfrm>
+            <a:off x="2073925" y="3735252"/>
+            <a:ext cx="3042402" cy="369332"/>
+          </a:xfrm>
+          <a:prstGeom prst="rect">
+            <a:avLst/>
+          </a:prstGeom>
+          <a:noFill/>
+        </p:spPr>
+        <p:txBody>
+          <a:bodyPr wrap="square" rtlCol="0">
+            <a:spAutoFit/>
+          </a:bodyPr>
+          <a:lstStyle/>
+          <a:p>
+            <a:pPr algn="ctr"/>
+            <a:r>
+              <a:rPr lang="en-US" dirty="0">
+                <a:latin typeface="Arial" panose="020B0604020202020204" pitchFamily="34" charset="0"/>
+                <a:cs typeface="Arial" panose="020B0604020202020204" pitchFamily="34" charset="0"/>
+              </a:rPr>
+              <a:t>(A) Pyramid Layers</a:t>
+            </a:r>
+          </a:p>
+        </p:txBody>
+      </p:sp>
+      <p:sp>
+        <p:nvSpPr>
+          <p:cNvPr id="284" name="TextBox 283">
+            <a:extLst>
+              <a:ext uri="{FF2B5EF4-FFF2-40B4-BE49-F238E27FC236}">
+                <a16:creationId xmlns:a16="http://schemas.microsoft.com/office/drawing/2014/main" id="{567672EA-05AF-46FB-928A-0B164769AAF8}"/>
+              </a:ext>
+            </a:extLst>
+          </p:cNvPr>
+          <p:cNvSpPr txBox="1"/>
+          <p:nvPr/>
+        </p:nvSpPr>
+        <p:spPr>
+          <a:xfrm>
+            <a:off x="7050637" y="3167124"/>
+            <a:ext cx="1888262" cy="923330"/>
+          </a:xfrm>
+          <a:prstGeom prst="rect">
+            <a:avLst/>
+          </a:prstGeom>
+          <a:noFill/>
+        </p:spPr>
+        <p:txBody>
+          <a:bodyPr wrap="square" rtlCol="0">
+            <a:spAutoFit/>
+          </a:bodyPr>
+          <a:lstStyle/>
+          <a:p>
+            <a:pPr algn="ctr"/>
+            <a:r>
+              <a:rPr lang="en-US">
+                <a:latin typeface="Arial" panose="020B0604020202020204" pitchFamily="34" charset="0"/>
+                <a:cs typeface="Arial" panose="020B0604020202020204" pitchFamily="34" charset="0"/>
+              </a:rPr>
+              <a:t>(E) </a:t>
+            </a:r>
+            <a:r>
+              <a:rPr lang="en-US" dirty="0">
+                <a:latin typeface="Arial" panose="020B0604020202020204" pitchFamily="34" charset="0"/>
+                <a:cs typeface="Arial" panose="020B0604020202020204" pitchFamily="34" charset="0"/>
+              </a:rPr>
+              <a:t>Chunk Configuration </a:t>
+            </a:r>
+          </a:p>
+          <a:p>
+            <a:pPr algn="ctr"/>
+            <a:r>
+              <a:rPr lang="en-US" dirty="0">
+                <a:latin typeface="Arial" panose="020B0604020202020204" pitchFamily="34" charset="0"/>
+                <a:cs typeface="Arial" panose="020B0604020202020204" pitchFamily="34" charset="0"/>
+              </a:rPr>
+              <a:t>Layer 3</a:t>
+            </a:r>
+          </a:p>
+        </p:txBody>
+      </p:sp>
+      <p:pic>
+        <p:nvPicPr>
+          <p:cNvPr id="285" name="Picture 284">
+            <a:extLst>
+              <a:ext uri="{FF2B5EF4-FFF2-40B4-BE49-F238E27FC236}">
+                <a16:creationId xmlns:a16="http://schemas.microsoft.com/office/drawing/2014/main" id="{0DE2DFBF-7301-4FFE-B6DA-9DFBB9B17A0D}"/>
+              </a:ext>
+            </a:extLst>
+          </p:cNvPr>
+          <p:cNvPicPr>
+            <a:picLocks noChangeAspect="1"/>
+          </p:cNvPicPr>
+          <p:nvPr/>
+        </p:nvPicPr>
+        <p:blipFill>
+          <a:blip r:embed="rId3">
+            <a:extLst>
+              <a:ext uri="{28A0092B-C50C-407E-A947-70E740481C1C}">
+                <a14:useLocalDpi xmlns:a14="http://schemas.microsoft.com/office/drawing/2010/main" val="0"/>
+              </a:ext>
+            </a:extLst>
+          </a:blip>
+          <a:stretch>
+            <a:fillRect/>
+          </a:stretch>
+        </p:blipFill>
+        <p:spPr>
+          <a:xfrm rot="5400000">
+            <a:off x="-800006" y="5241844"/>
+            <a:ext cx="5294075" cy="3055059"/>
+          </a:xfrm>
+          <a:prstGeom prst="rect">
+            <a:avLst/>
+          </a:prstGeom>
+        </p:spPr>
+      </p:pic>
+      <p:pic>
+        <p:nvPicPr>
+          <p:cNvPr id="286" name="Picture 285">
+            <a:extLst>
+              <a:ext uri="{FF2B5EF4-FFF2-40B4-BE49-F238E27FC236}">
+                <a16:creationId xmlns:a16="http://schemas.microsoft.com/office/drawing/2014/main" id="{1B5E9E98-8DAA-408E-9DBE-75DD1C06F300}"/>
+              </a:ext>
+            </a:extLst>
+          </p:cNvPr>
+          <p:cNvPicPr>
+            <a:picLocks noChangeAspect="1"/>
+          </p:cNvPicPr>
+          <p:nvPr/>
+        </p:nvPicPr>
+        <p:blipFill>
+          <a:blip r:embed="rId4">
+            <a:extLst>
+              <a:ext uri="{28A0092B-C50C-407E-A947-70E740481C1C}">
+                <a14:useLocalDpi xmlns:a14="http://schemas.microsoft.com/office/drawing/2010/main" val="0"/>
+              </a:ext>
+            </a:extLst>
+          </a:blip>
+          <a:stretch>
+            <a:fillRect/>
+          </a:stretch>
+        </p:blipFill>
+        <p:spPr>
+          <a:xfrm rot="5400000">
+            <a:off x="6356552" y="5578756"/>
+            <a:ext cx="3141080" cy="1888262"/>
+          </a:xfrm>
+          <a:prstGeom prst="rect">
+            <a:avLst/>
+          </a:prstGeom>
+        </p:spPr>
+      </p:pic>
+      <p:pic>
+        <p:nvPicPr>
+          <p:cNvPr id="287" name="Picture 286">
+            <a:extLst>
+              <a:ext uri="{FF2B5EF4-FFF2-40B4-BE49-F238E27FC236}">
+                <a16:creationId xmlns:a16="http://schemas.microsoft.com/office/drawing/2014/main" id="{C7067D9B-F7EA-4907-8CED-3E7437EBA8AD}"/>
+              </a:ext>
+            </a:extLst>
+          </p:cNvPr>
+          <p:cNvPicPr>
+            <a:picLocks noChangeAspect="1"/>
+          </p:cNvPicPr>
+          <p:nvPr/>
+        </p:nvPicPr>
+        <p:blipFill>
+          <a:blip r:embed="rId5">
+            <a:extLst>
+              <a:ext uri="{28A0092B-C50C-407E-A947-70E740481C1C}">
+                <a14:useLocalDpi xmlns:a14="http://schemas.microsoft.com/office/drawing/2010/main" val="0"/>
+              </a:ext>
+            </a:extLst>
+          </a:blip>
+          <a:stretch>
+            <a:fillRect/>
+          </a:stretch>
+        </p:blipFill>
+        <p:spPr>
+          <a:xfrm rot="5400000">
+            <a:off x="6730904" y="1249729"/>
+            <a:ext cx="2527729" cy="1301809"/>
+          </a:xfrm>
+          <a:prstGeom prst="rect">
+            <a:avLst/>
+          </a:prstGeom>
+        </p:spPr>
+      </p:pic>
+      <p:sp>
+        <p:nvSpPr>
+          <p:cNvPr id="288" name="TextBox 287">
+            <a:extLst>
+              <a:ext uri="{FF2B5EF4-FFF2-40B4-BE49-F238E27FC236}">
+                <a16:creationId xmlns:a16="http://schemas.microsoft.com/office/drawing/2014/main" id="{9128F5B2-EEDD-4B7B-9EB9-0A3C7E5F0A8E}"/>
+              </a:ext>
+            </a:extLst>
+          </p:cNvPr>
+          <p:cNvSpPr txBox="1"/>
+          <p:nvPr/>
+        </p:nvSpPr>
+        <p:spPr>
+          <a:xfrm>
+            <a:off x="512823" y="4476031"/>
+            <a:ext cx="671760" cy="461665"/>
+          </a:xfrm>
+          <a:prstGeom prst="rect">
+            <a:avLst/>
+          </a:prstGeom>
+          <a:noFill/>
+        </p:spPr>
+        <p:txBody>
+          <a:bodyPr wrap="square" rtlCol="0">
+            <a:spAutoFit/>
+          </a:bodyPr>
+          <a:lstStyle/>
+          <a:p>
+            <a:pPr algn="ctr"/>
+            <a:r>
+              <a:rPr lang="en-US" sz="1200" dirty="0">
+                <a:solidFill>
+                  <a:schemeClr val="bg1"/>
+                </a:solidFill>
+                <a:latin typeface="Arial" panose="020B0604020202020204" pitchFamily="34" charset="0"/>
+                <a:cs typeface="Arial" panose="020B0604020202020204" pitchFamily="34" charset="0"/>
+              </a:rPr>
+              <a:t>C 0:</a:t>
+            </a:r>
+          </a:p>
+          <a:p>
+            <a:pPr algn="ctr"/>
+            <a:r>
+              <a:rPr lang="en-US" sz="1200" dirty="0">
+                <a:solidFill>
+                  <a:schemeClr val="bg1"/>
+                </a:solidFill>
+                <a:latin typeface="Arial" panose="020B0604020202020204" pitchFamily="34" charset="0"/>
+                <a:cs typeface="Arial" panose="020B0604020202020204" pitchFamily="34" charset="0"/>
+              </a:rPr>
+              <a:t>1573</a:t>
+            </a:r>
+          </a:p>
+        </p:txBody>
+      </p:sp>
+      <p:sp>
+        <p:nvSpPr>
+          <p:cNvPr id="289" name="TextBox 288">
+            <a:extLst>
+              <a:ext uri="{FF2B5EF4-FFF2-40B4-BE49-F238E27FC236}">
+                <a16:creationId xmlns:a16="http://schemas.microsoft.com/office/drawing/2014/main" id="{C516CCDE-2664-4596-957A-98B4B1483DD5}"/>
+              </a:ext>
+            </a:extLst>
+          </p:cNvPr>
+          <p:cNvSpPr txBox="1"/>
+          <p:nvPr/>
+        </p:nvSpPr>
+        <p:spPr>
+          <a:xfrm>
+            <a:off x="512823" y="5489946"/>
+            <a:ext cx="671759" cy="461665"/>
+          </a:xfrm>
+          <a:prstGeom prst="rect">
+            <a:avLst/>
+          </a:prstGeom>
+          <a:noFill/>
+        </p:spPr>
+        <p:txBody>
+          <a:bodyPr wrap="square" rtlCol="0">
+            <a:spAutoFit/>
+          </a:bodyPr>
+          <a:lstStyle/>
+          <a:p>
+            <a:pPr algn="ctr"/>
+            <a:r>
+              <a:rPr lang="en-US" sz="1200" dirty="0">
+                <a:solidFill>
+                  <a:schemeClr val="bg1"/>
+                </a:solidFill>
+                <a:latin typeface="Arial" panose="020B0604020202020204" pitchFamily="34" charset="0"/>
+                <a:cs typeface="Arial" panose="020B0604020202020204" pitchFamily="34" charset="0"/>
+              </a:rPr>
+              <a:t>C 3:</a:t>
+            </a:r>
+          </a:p>
+          <a:p>
+            <a:pPr algn="ctr"/>
+            <a:r>
+              <a:rPr lang="en-US" sz="1200" dirty="0">
+                <a:solidFill>
+                  <a:schemeClr val="bg1"/>
+                </a:solidFill>
+                <a:latin typeface="Arial" panose="020B0604020202020204" pitchFamily="34" charset="0"/>
+                <a:cs typeface="Arial" panose="020B0604020202020204" pitchFamily="34" charset="0"/>
+              </a:rPr>
+              <a:t>2519</a:t>
+            </a:r>
+          </a:p>
+        </p:txBody>
+      </p:sp>
+      <p:sp>
+        <p:nvSpPr>
+          <p:cNvPr id="290" name="TextBox 289">
+            <a:extLst>
+              <a:ext uri="{FF2B5EF4-FFF2-40B4-BE49-F238E27FC236}">
+                <a16:creationId xmlns:a16="http://schemas.microsoft.com/office/drawing/2014/main" id="{82C59DD3-AD41-491E-9C91-9169F9690128}"/>
+              </a:ext>
+            </a:extLst>
+          </p:cNvPr>
+          <p:cNvSpPr txBox="1"/>
+          <p:nvPr/>
+        </p:nvSpPr>
+        <p:spPr>
+          <a:xfrm>
+            <a:off x="1520463" y="4476031"/>
+            <a:ext cx="788226" cy="461665"/>
+          </a:xfrm>
+          <a:prstGeom prst="rect">
+            <a:avLst/>
+          </a:prstGeom>
+          <a:noFill/>
+        </p:spPr>
+        <p:txBody>
+          <a:bodyPr wrap="square" rtlCol="0">
+            <a:spAutoFit/>
+          </a:bodyPr>
+          <a:lstStyle/>
+          <a:p>
+            <a:pPr algn="ctr"/>
+            <a:r>
+              <a:rPr lang="en-US" sz="1200" dirty="0">
+                <a:solidFill>
+                  <a:schemeClr val="bg1"/>
+                </a:solidFill>
+                <a:latin typeface="Arial" panose="020B0604020202020204" pitchFamily="34" charset="0"/>
+                <a:cs typeface="Arial" panose="020B0604020202020204" pitchFamily="34" charset="0"/>
+              </a:rPr>
+              <a:t>C 1:</a:t>
+            </a:r>
+          </a:p>
+          <a:p>
+            <a:pPr algn="ctr"/>
+            <a:r>
+              <a:rPr lang="en-US" sz="1200" dirty="0">
+                <a:solidFill>
+                  <a:schemeClr val="bg1"/>
+                </a:solidFill>
+                <a:latin typeface="Arial" panose="020B0604020202020204" pitchFamily="34" charset="0"/>
+                <a:cs typeface="Arial" panose="020B0604020202020204" pitchFamily="34" charset="0"/>
+              </a:rPr>
+              <a:t>2209</a:t>
+            </a:r>
+          </a:p>
+        </p:txBody>
+      </p:sp>
+      <p:sp>
+        <p:nvSpPr>
+          <p:cNvPr id="291" name="TextBox 290">
+            <a:extLst>
+              <a:ext uri="{FF2B5EF4-FFF2-40B4-BE49-F238E27FC236}">
+                <a16:creationId xmlns:a16="http://schemas.microsoft.com/office/drawing/2014/main" id="{A01F077F-7883-48F9-A56C-6D10E61A209E}"/>
+              </a:ext>
+            </a:extLst>
+          </p:cNvPr>
+          <p:cNvSpPr txBox="1"/>
+          <p:nvPr/>
+        </p:nvSpPr>
+        <p:spPr>
+          <a:xfrm>
+            <a:off x="2793441" y="4473007"/>
+            <a:ext cx="671760" cy="461665"/>
+          </a:xfrm>
+          <a:prstGeom prst="rect">
+            <a:avLst/>
+          </a:prstGeom>
+          <a:noFill/>
+        </p:spPr>
+        <p:txBody>
+          <a:bodyPr wrap="square" rtlCol="0">
+            <a:spAutoFit/>
+          </a:bodyPr>
+          <a:lstStyle/>
+          <a:p>
+            <a:pPr algn="ctr"/>
+            <a:r>
+              <a:rPr lang="en-US" sz="1200" dirty="0">
+                <a:solidFill>
+                  <a:schemeClr val="bg1"/>
+                </a:solidFill>
+                <a:latin typeface="Arial" panose="020B0604020202020204" pitchFamily="34" charset="0"/>
+                <a:cs typeface="Arial" panose="020B0604020202020204" pitchFamily="34" charset="0"/>
+              </a:rPr>
+              <a:t>C 2:</a:t>
+            </a:r>
+          </a:p>
+          <a:p>
+            <a:pPr algn="ctr"/>
+            <a:r>
+              <a:rPr lang="en-US" sz="1200" dirty="0">
+                <a:solidFill>
+                  <a:schemeClr val="bg1"/>
+                </a:solidFill>
+                <a:latin typeface="Arial" panose="020B0604020202020204" pitchFamily="34" charset="0"/>
+                <a:cs typeface="Arial" panose="020B0604020202020204" pitchFamily="34" charset="0"/>
+              </a:rPr>
+              <a:t>1220</a:t>
+            </a:r>
+          </a:p>
+        </p:txBody>
+      </p:sp>
+      <p:sp>
+        <p:nvSpPr>
+          <p:cNvPr id="292" name="TextBox 291">
+            <a:extLst>
+              <a:ext uri="{FF2B5EF4-FFF2-40B4-BE49-F238E27FC236}">
+                <a16:creationId xmlns:a16="http://schemas.microsoft.com/office/drawing/2014/main" id="{39B4ED9D-E84B-49DE-85B1-8A8923CDA835}"/>
+              </a:ext>
+            </a:extLst>
+          </p:cNvPr>
+          <p:cNvSpPr txBox="1"/>
+          <p:nvPr/>
+        </p:nvSpPr>
+        <p:spPr>
+          <a:xfrm>
+            <a:off x="1520463" y="5498767"/>
+            <a:ext cx="788226" cy="461665"/>
+          </a:xfrm>
+          <a:prstGeom prst="rect">
+            <a:avLst/>
+          </a:prstGeom>
+          <a:noFill/>
+        </p:spPr>
+        <p:txBody>
+          <a:bodyPr wrap="square" rtlCol="0">
+            <a:spAutoFit/>
+          </a:bodyPr>
+          <a:lstStyle/>
+          <a:p>
+            <a:pPr algn="ctr"/>
+            <a:r>
+              <a:rPr lang="en-US" sz="1200" dirty="0">
+                <a:solidFill>
+                  <a:schemeClr val="bg1"/>
+                </a:solidFill>
+                <a:latin typeface="Arial" panose="020B0604020202020204" pitchFamily="34" charset="0"/>
+                <a:cs typeface="Arial" panose="020B0604020202020204" pitchFamily="34" charset="0"/>
+              </a:rPr>
+              <a:t>C 4:</a:t>
+            </a:r>
+          </a:p>
+          <a:p>
+            <a:pPr algn="ctr"/>
+            <a:r>
+              <a:rPr lang="en-US" sz="1200" dirty="0">
+                <a:solidFill>
+                  <a:schemeClr val="bg1"/>
+                </a:solidFill>
+                <a:latin typeface="Arial" panose="020B0604020202020204" pitchFamily="34" charset="0"/>
+                <a:cs typeface="Arial" panose="020B0604020202020204" pitchFamily="34" charset="0"/>
+              </a:rPr>
+              <a:t>3847</a:t>
+            </a:r>
+          </a:p>
+        </p:txBody>
+      </p:sp>
+      <p:sp>
+        <p:nvSpPr>
+          <p:cNvPr id="293" name="TextBox 292">
+            <a:extLst>
+              <a:ext uri="{FF2B5EF4-FFF2-40B4-BE49-F238E27FC236}">
+                <a16:creationId xmlns:a16="http://schemas.microsoft.com/office/drawing/2014/main" id="{A80DAB8F-2FC0-49C9-B93D-30EC1ACAFCAC}"/>
+              </a:ext>
+            </a:extLst>
+          </p:cNvPr>
+          <p:cNvSpPr txBox="1"/>
+          <p:nvPr/>
+        </p:nvSpPr>
+        <p:spPr>
+          <a:xfrm>
+            <a:off x="2793441" y="5495743"/>
+            <a:ext cx="671760" cy="461665"/>
+          </a:xfrm>
+          <a:prstGeom prst="rect">
+            <a:avLst/>
+          </a:prstGeom>
+          <a:noFill/>
+        </p:spPr>
+        <p:txBody>
+          <a:bodyPr wrap="square" rtlCol="0">
+            <a:spAutoFit/>
+          </a:bodyPr>
+          <a:lstStyle/>
+          <a:p>
+            <a:pPr algn="ctr"/>
+            <a:r>
+              <a:rPr lang="en-US" sz="1200" dirty="0">
+                <a:solidFill>
+                  <a:schemeClr val="bg1"/>
+                </a:solidFill>
+                <a:latin typeface="Arial" panose="020B0604020202020204" pitchFamily="34" charset="0"/>
+                <a:cs typeface="Arial" panose="020B0604020202020204" pitchFamily="34" charset="0"/>
+              </a:rPr>
+              <a:t>C 5:</a:t>
+            </a:r>
+          </a:p>
+          <a:p>
+            <a:pPr algn="ctr"/>
+            <a:r>
+              <a:rPr lang="en-US" sz="1200" dirty="0">
+                <a:solidFill>
+                  <a:schemeClr val="bg1"/>
+                </a:solidFill>
+                <a:latin typeface="Arial" panose="020B0604020202020204" pitchFamily="34" charset="0"/>
+                <a:cs typeface="Arial" panose="020B0604020202020204" pitchFamily="34" charset="0"/>
+              </a:rPr>
+              <a:t>2021</a:t>
+            </a:r>
+          </a:p>
+        </p:txBody>
+      </p:sp>
+      <p:sp>
+        <p:nvSpPr>
+          <p:cNvPr id="294" name="TextBox 293">
+            <a:extLst>
+              <a:ext uri="{FF2B5EF4-FFF2-40B4-BE49-F238E27FC236}">
+                <a16:creationId xmlns:a16="http://schemas.microsoft.com/office/drawing/2014/main" id="{43BF8689-6D52-4790-890E-A979CA9E2188}"/>
+              </a:ext>
+            </a:extLst>
+          </p:cNvPr>
+          <p:cNvSpPr txBox="1"/>
+          <p:nvPr/>
+        </p:nvSpPr>
+        <p:spPr>
+          <a:xfrm>
+            <a:off x="512823" y="6686286"/>
+            <a:ext cx="671759" cy="461665"/>
+          </a:xfrm>
+          <a:prstGeom prst="rect">
+            <a:avLst/>
+          </a:prstGeom>
+          <a:noFill/>
+        </p:spPr>
+        <p:txBody>
+          <a:bodyPr wrap="square" rtlCol="0">
+            <a:spAutoFit/>
+          </a:bodyPr>
+          <a:lstStyle/>
+          <a:p>
+            <a:pPr algn="ctr"/>
+            <a:r>
+              <a:rPr lang="en-US" sz="1200" dirty="0">
+                <a:solidFill>
+                  <a:schemeClr val="bg1"/>
+                </a:solidFill>
+                <a:latin typeface="Arial" panose="020B0604020202020204" pitchFamily="34" charset="0"/>
+                <a:cs typeface="Arial" panose="020B0604020202020204" pitchFamily="34" charset="0"/>
+              </a:rPr>
+              <a:t>C 6:</a:t>
+            </a:r>
+          </a:p>
+          <a:p>
+            <a:pPr algn="ctr"/>
+            <a:r>
+              <a:rPr lang="en-US" sz="1200" dirty="0">
+                <a:solidFill>
+                  <a:schemeClr val="bg1"/>
+                </a:solidFill>
+                <a:latin typeface="Arial" panose="020B0604020202020204" pitchFamily="34" charset="0"/>
+                <a:cs typeface="Arial" panose="020B0604020202020204" pitchFamily="34" charset="0"/>
+              </a:rPr>
+              <a:t>2070</a:t>
+            </a:r>
+          </a:p>
+        </p:txBody>
+      </p:sp>
+      <p:sp>
+        <p:nvSpPr>
+          <p:cNvPr id="295" name="TextBox 294">
+            <a:extLst>
+              <a:ext uri="{FF2B5EF4-FFF2-40B4-BE49-F238E27FC236}">
+                <a16:creationId xmlns:a16="http://schemas.microsoft.com/office/drawing/2014/main" id="{D4259D13-8440-41E9-89E5-8888E6A1C612}"/>
+              </a:ext>
+            </a:extLst>
+          </p:cNvPr>
+          <p:cNvSpPr txBox="1"/>
+          <p:nvPr/>
+        </p:nvSpPr>
+        <p:spPr>
+          <a:xfrm>
+            <a:off x="1520463" y="6695107"/>
+            <a:ext cx="788226" cy="461665"/>
+          </a:xfrm>
+          <a:prstGeom prst="rect">
+            <a:avLst/>
+          </a:prstGeom>
+          <a:noFill/>
+        </p:spPr>
+        <p:txBody>
+          <a:bodyPr wrap="square" rtlCol="0">
+            <a:spAutoFit/>
+          </a:bodyPr>
+          <a:lstStyle/>
+          <a:p>
+            <a:pPr algn="ctr"/>
+            <a:r>
+              <a:rPr lang="en-US" sz="1200" dirty="0">
+                <a:solidFill>
+                  <a:schemeClr val="bg1"/>
+                </a:solidFill>
+                <a:latin typeface="Arial" panose="020B0604020202020204" pitchFamily="34" charset="0"/>
+                <a:cs typeface="Arial" panose="020B0604020202020204" pitchFamily="34" charset="0"/>
+              </a:rPr>
+              <a:t>C 7:</a:t>
+            </a:r>
+          </a:p>
+          <a:p>
+            <a:pPr algn="ctr"/>
+            <a:r>
+              <a:rPr lang="en-US" sz="1200" dirty="0">
+                <a:solidFill>
+                  <a:schemeClr val="bg1"/>
+                </a:solidFill>
+                <a:latin typeface="Arial" panose="020B0604020202020204" pitchFamily="34" charset="0"/>
+                <a:cs typeface="Arial" panose="020B0604020202020204" pitchFamily="34" charset="0"/>
+              </a:rPr>
+              <a:t>3163</a:t>
+            </a:r>
+          </a:p>
+        </p:txBody>
+      </p:sp>
+      <p:sp>
+        <p:nvSpPr>
+          <p:cNvPr id="296" name="TextBox 295">
+            <a:extLst>
+              <a:ext uri="{FF2B5EF4-FFF2-40B4-BE49-F238E27FC236}">
+                <a16:creationId xmlns:a16="http://schemas.microsoft.com/office/drawing/2014/main" id="{A057AB63-650F-4A10-B115-0BD5BE95187F}"/>
+              </a:ext>
+            </a:extLst>
+          </p:cNvPr>
+          <p:cNvSpPr txBox="1"/>
+          <p:nvPr/>
+        </p:nvSpPr>
+        <p:spPr>
+          <a:xfrm>
+            <a:off x="2793441" y="6692083"/>
+            <a:ext cx="671760" cy="461665"/>
+          </a:xfrm>
+          <a:prstGeom prst="rect">
+            <a:avLst/>
+          </a:prstGeom>
+          <a:noFill/>
+        </p:spPr>
+        <p:txBody>
+          <a:bodyPr wrap="square" rtlCol="0">
+            <a:spAutoFit/>
+          </a:bodyPr>
+          <a:lstStyle/>
+          <a:p>
+            <a:pPr algn="ctr"/>
+            <a:r>
+              <a:rPr lang="en-US" sz="1200" dirty="0">
+                <a:solidFill>
+                  <a:schemeClr val="bg1"/>
+                </a:solidFill>
+                <a:latin typeface="Arial" panose="020B0604020202020204" pitchFamily="34" charset="0"/>
+                <a:cs typeface="Arial" panose="020B0604020202020204" pitchFamily="34" charset="0"/>
+              </a:rPr>
+              <a:t>C 8:</a:t>
+            </a:r>
+          </a:p>
+          <a:p>
+            <a:pPr algn="ctr"/>
+            <a:r>
+              <a:rPr lang="en-US" sz="1200" dirty="0">
+                <a:solidFill>
+                  <a:schemeClr val="bg1"/>
+                </a:solidFill>
+                <a:latin typeface="Arial" panose="020B0604020202020204" pitchFamily="34" charset="0"/>
+                <a:cs typeface="Arial" panose="020B0604020202020204" pitchFamily="34" charset="0"/>
+              </a:rPr>
+              <a:t>1662</a:t>
+            </a:r>
+          </a:p>
+        </p:txBody>
+      </p:sp>
+      <p:sp>
+        <p:nvSpPr>
+          <p:cNvPr id="297" name="TextBox 296">
+            <a:extLst>
+              <a:ext uri="{FF2B5EF4-FFF2-40B4-BE49-F238E27FC236}">
+                <a16:creationId xmlns:a16="http://schemas.microsoft.com/office/drawing/2014/main" id="{FFAC7D40-0528-4FD8-B03D-D9D268B97B6D}"/>
+              </a:ext>
+            </a:extLst>
+          </p:cNvPr>
+          <p:cNvSpPr txBox="1"/>
+          <p:nvPr/>
+        </p:nvSpPr>
+        <p:spPr>
+          <a:xfrm>
+            <a:off x="510397" y="7701179"/>
+            <a:ext cx="671759" cy="461665"/>
+          </a:xfrm>
+          <a:prstGeom prst="rect">
+            <a:avLst/>
+          </a:prstGeom>
+          <a:noFill/>
+        </p:spPr>
+        <p:txBody>
+          <a:bodyPr wrap="square" rtlCol="0">
+            <a:spAutoFit/>
+          </a:bodyPr>
+          <a:lstStyle/>
+          <a:p>
+            <a:pPr algn="ctr"/>
+            <a:r>
+              <a:rPr lang="en-US" sz="1200" dirty="0">
+                <a:solidFill>
+                  <a:schemeClr val="bg1"/>
+                </a:solidFill>
+                <a:latin typeface="Arial" panose="020B0604020202020204" pitchFamily="34" charset="0"/>
+                <a:cs typeface="Arial" panose="020B0604020202020204" pitchFamily="34" charset="0"/>
+              </a:rPr>
+              <a:t>C 9:</a:t>
+            </a:r>
+          </a:p>
+          <a:p>
+            <a:pPr algn="ctr"/>
+            <a:r>
+              <a:rPr lang="en-US" sz="1200" dirty="0">
+                <a:solidFill>
+                  <a:schemeClr val="bg1"/>
+                </a:solidFill>
+                <a:latin typeface="Arial" panose="020B0604020202020204" pitchFamily="34" charset="0"/>
+                <a:cs typeface="Arial" panose="020B0604020202020204" pitchFamily="34" charset="0"/>
+              </a:rPr>
+              <a:t>2068</a:t>
+            </a:r>
+          </a:p>
+        </p:txBody>
+      </p:sp>
+      <p:sp>
+        <p:nvSpPr>
+          <p:cNvPr id="298" name="TextBox 297">
+            <a:extLst>
+              <a:ext uri="{FF2B5EF4-FFF2-40B4-BE49-F238E27FC236}">
+                <a16:creationId xmlns:a16="http://schemas.microsoft.com/office/drawing/2014/main" id="{A0165BBF-A901-404C-AFD4-C2CF04B12F3F}"/>
+              </a:ext>
+            </a:extLst>
+          </p:cNvPr>
+          <p:cNvSpPr txBox="1"/>
+          <p:nvPr/>
+        </p:nvSpPr>
+        <p:spPr>
+          <a:xfrm>
+            <a:off x="1518037" y="7710000"/>
+            <a:ext cx="788226" cy="461665"/>
+          </a:xfrm>
+          <a:prstGeom prst="rect">
+            <a:avLst/>
+          </a:prstGeom>
+          <a:noFill/>
+        </p:spPr>
+        <p:txBody>
+          <a:bodyPr wrap="square" rtlCol="0">
+            <a:spAutoFit/>
+          </a:bodyPr>
+          <a:lstStyle/>
+          <a:p>
+            <a:pPr algn="ctr"/>
+            <a:r>
+              <a:rPr lang="en-US" sz="1200" dirty="0">
+                <a:solidFill>
+                  <a:schemeClr val="bg1"/>
+                </a:solidFill>
+                <a:latin typeface="Arial" panose="020B0604020202020204" pitchFamily="34" charset="0"/>
+                <a:cs typeface="Arial" panose="020B0604020202020204" pitchFamily="34" charset="0"/>
+              </a:rPr>
+              <a:t>C 10:</a:t>
+            </a:r>
+          </a:p>
+          <a:p>
+            <a:pPr algn="ctr"/>
+            <a:r>
+              <a:rPr lang="en-US" sz="1200" dirty="0">
+                <a:solidFill>
+                  <a:schemeClr val="bg1"/>
+                </a:solidFill>
+                <a:latin typeface="Arial" panose="020B0604020202020204" pitchFamily="34" charset="0"/>
+                <a:cs typeface="Arial" panose="020B0604020202020204" pitchFamily="34" charset="0"/>
+              </a:rPr>
+              <a:t>3163</a:t>
+            </a:r>
+          </a:p>
+        </p:txBody>
+      </p:sp>
+      <p:sp>
+        <p:nvSpPr>
+          <p:cNvPr id="299" name="TextBox 298">
+            <a:extLst>
+              <a:ext uri="{FF2B5EF4-FFF2-40B4-BE49-F238E27FC236}">
+                <a16:creationId xmlns:a16="http://schemas.microsoft.com/office/drawing/2014/main" id="{0FF81F3B-0369-4EB2-AC44-7B80E6A157DD}"/>
+              </a:ext>
+            </a:extLst>
+          </p:cNvPr>
+          <p:cNvSpPr txBox="1"/>
+          <p:nvPr/>
+        </p:nvSpPr>
+        <p:spPr>
+          <a:xfrm>
+            <a:off x="2791015" y="7706976"/>
+            <a:ext cx="671760" cy="461665"/>
+          </a:xfrm>
+          <a:prstGeom prst="rect">
+            <a:avLst/>
+          </a:prstGeom>
+          <a:noFill/>
+        </p:spPr>
+        <p:txBody>
+          <a:bodyPr wrap="square" rtlCol="0">
+            <a:spAutoFit/>
+          </a:bodyPr>
+          <a:lstStyle/>
+          <a:p>
+            <a:pPr algn="ctr"/>
+            <a:r>
+              <a:rPr lang="en-US" sz="1200" dirty="0">
+                <a:solidFill>
+                  <a:schemeClr val="bg1"/>
+                </a:solidFill>
+                <a:latin typeface="Arial" panose="020B0604020202020204" pitchFamily="34" charset="0"/>
+                <a:cs typeface="Arial" panose="020B0604020202020204" pitchFamily="34" charset="0"/>
+              </a:rPr>
+              <a:t>C 11:</a:t>
+            </a:r>
+          </a:p>
+          <a:p>
+            <a:pPr algn="ctr"/>
+            <a:r>
+              <a:rPr lang="en-US" sz="1200" dirty="0">
+                <a:solidFill>
+                  <a:schemeClr val="bg1"/>
+                </a:solidFill>
+                <a:latin typeface="Arial" panose="020B0604020202020204" pitchFamily="34" charset="0"/>
+                <a:cs typeface="Arial" panose="020B0604020202020204" pitchFamily="34" charset="0"/>
+              </a:rPr>
+              <a:t>1662</a:t>
+            </a:r>
+          </a:p>
+        </p:txBody>
+      </p:sp>
+      <p:sp>
+        <p:nvSpPr>
+          <p:cNvPr id="300" name="TextBox 299">
+            <a:extLst>
+              <a:ext uri="{FF2B5EF4-FFF2-40B4-BE49-F238E27FC236}">
+                <a16:creationId xmlns:a16="http://schemas.microsoft.com/office/drawing/2014/main" id="{54439AB1-04D9-4259-B018-7509045806A4}"/>
+              </a:ext>
+            </a:extLst>
+          </p:cNvPr>
+          <p:cNvSpPr txBox="1"/>
+          <p:nvPr/>
+        </p:nvSpPr>
+        <p:spPr>
+          <a:xfrm>
+            <a:off x="510397" y="8739318"/>
+            <a:ext cx="671759" cy="461665"/>
+          </a:xfrm>
+          <a:prstGeom prst="rect">
+            <a:avLst/>
+          </a:prstGeom>
+          <a:noFill/>
+        </p:spPr>
+        <p:txBody>
+          <a:bodyPr wrap="square" rtlCol="0">
+            <a:spAutoFit/>
+          </a:bodyPr>
+          <a:lstStyle/>
+          <a:p>
+            <a:pPr algn="ctr"/>
+            <a:r>
+              <a:rPr lang="en-US" sz="1200" dirty="0">
+                <a:solidFill>
+                  <a:schemeClr val="bg1"/>
+                </a:solidFill>
+                <a:latin typeface="Arial" panose="020B0604020202020204" pitchFamily="34" charset="0"/>
+                <a:cs typeface="Arial" panose="020B0604020202020204" pitchFamily="34" charset="0"/>
+              </a:rPr>
+              <a:t>C 12:</a:t>
+            </a:r>
+          </a:p>
+          <a:p>
+            <a:pPr algn="ctr"/>
+            <a:r>
+              <a:rPr lang="en-US" sz="1200" dirty="0">
+                <a:solidFill>
+                  <a:schemeClr val="bg1"/>
+                </a:solidFill>
+                <a:latin typeface="Arial" panose="020B0604020202020204" pitchFamily="34" charset="0"/>
+                <a:cs typeface="Arial" panose="020B0604020202020204" pitchFamily="34" charset="0"/>
+              </a:rPr>
+              <a:t>929</a:t>
+            </a:r>
+          </a:p>
+        </p:txBody>
+      </p:sp>
+      <p:sp>
+        <p:nvSpPr>
+          <p:cNvPr id="301" name="TextBox 300">
+            <a:extLst>
+              <a:ext uri="{FF2B5EF4-FFF2-40B4-BE49-F238E27FC236}">
+                <a16:creationId xmlns:a16="http://schemas.microsoft.com/office/drawing/2014/main" id="{A3E52E0E-AF1E-46DB-8C1D-6BF5C838D2A7}"/>
+              </a:ext>
+            </a:extLst>
+          </p:cNvPr>
+          <p:cNvSpPr txBox="1"/>
+          <p:nvPr/>
+        </p:nvSpPr>
+        <p:spPr>
+          <a:xfrm>
+            <a:off x="1518037" y="8748139"/>
+            <a:ext cx="788226" cy="461665"/>
+          </a:xfrm>
+          <a:prstGeom prst="rect">
+            <a:avLst/>
+          </a:prstGeom>
+          <a:noFill/>
+        </p:spPr>
+        <p:txBody>
+          <a:bodyPr wrap="square" rtlCol="0">
+            <a:spAutoFit/>
+          </a:bodyPr>
+          <a:lstStyle/>
+          <a:p>
+            <a:pPr algn="ctr"/>
+            <a:r>
+              <a:rPr lang="en-US" sz="1200" dirty="0">
+                <a:solidFill>
+                  <a:schemeClr val="bg1"/>
+                </a:solidFill>
+                <a:latin typeface="Arial" panose="020B0604020202020204" pitchFamily="34" charset="0"/>
+                <a:cs typeface="Arial" panose="020B0604020202020204" pitchFamily="34" charset="0"/>
+              </a:rPr>
+              <a:t>C 13:</a:t>
+            </a:r>
+          </a:p>
+          <a:p>
+            <a:pPr algn="ctr"/>
+            <a:r>
+              <a:rPr lang="en-US" sz="1200" dirty="0">
+                <a:solidFill>
+                  <a:schemeClr val="bg1"/>
+                </a:solidFill>
+                <a:latin typeface="Arial" panose="020B0604020202020204" pitchFamily="34" charset="0"/>
+                <a:cs typeface="Arial" panose="020B0604020202020204" pitchFamily="34" charset="0"/>
+              </a:rPr>
+              <a:t>1274</a:t>
+            </a:r>
+          </a:p>
+        </p:txBody>
+      </p:sp>
+      <p:sp>
+        <p:nvSpPr>
+          <p:cNvPr id="302" name="TextBox 301">
+            <a:extLst>
+              <a:ext uri="{FF2B5EF4-FFF2-40B4-BE49-F238E27FC236}">
+                <a16:creationId xmlns:a16="http://schemas.microsoft.com/office/drawing/2014/main" id="{3D7C0BDE-6434-4263-A8D0-57EFFA03AE6C}"/>
+              </a:ext>
+            </a:extLst>
+          </p:cNvPr>
+          <p:cNvSpPr txBox="1"/>
+          <p:nvPr/>
+        </p:nvSpPr>
+        <p:spPr>
+          <a:xfrm>
+            <a:off x="2791015" y="8745115"/>
+            <a:ext cx="671760" cy="461665"/>
+          </a:xfrm>
+          <a:prstGeom prst="rect">
+            <a:avLst/>
+          </a:prstGeom>
+          <a:noFill/>
+        </p:spPr>
+        <p:txBody>
+          <a:bodyPr wrap="square" rtlCol="0">
+            <a:spAutoFit/>
+          </a:bodyPr>
+          <a:lstStyle/>
+          <a:p>
+            <a:pPr algn="ctr"/>
+            <a:r>
+              <a:rPr lang="en-US" sz="1200" dirty="0">
+                <a:solidFill>
+                  <a:schemeClr val="bg1"/>
+                </a:solidFill>
+                <a:latin typeface="Arial" panose="020B0604020202020204" pitchFamily="34" charset="0"/>
+                <a:cs typeface="Arial" panose="020B0604020202020204" pitchFamily="34" charset="0"/>
+              </a:rPr>
+              <a:t>C 14:</a:t>
+            </a:r>
+          </a:p>
+          <a:p>
+            <a:pPr algn="ctr"/>
+            <a:r>
+              <a:rPr lang="en-US" sz="1200" dirty="0">
+                <a:solidFill>
+                  <a:schemeClr val="bg1"/>
+                </a:solidFill>
+                <a:latin typeface="Arial" panose="020B0604020202020204" pitchFamily="34" charset="0"/>
+                <a:cs typeface="Arial" panose="020B0604020202020204" pitchFamily="34" charset="0"/>
+              </a:rPr>
+              <a:t>777</a:t>
+            </a:r>
+          </a:p>
+        </p:txBody>
+      </p:sp>
+      <p:sp>
+        <p:nvSpPr>
+          <p:cNvPr id="303" name="TextBox 302">
+            <a:extLst>
+              <a:ext uri="{FF2B5EF4-FFF2-40B4-BE49-F238E27FC236}">
+                <a16:creationId xmlns:a16="http://schemas.microsoft.com/office/drawing/2014/main" id="{2D884C32-68F7-45CF-B403-0976D1A1F52C}"/>
+              </a:ext>
+            </a:extLst>
+          </p:cNvPr>
+          <p:cNvSpPr txBox="1"/>
+          <p:nvPr/>
+        </p:nvSpPr>
+        <p:spPr>
+          <a:xfrm>
+            <a:off x="98935" y="9416411"/>
+            <a:ext cx="3496191" cy="641989"/>
+          </a:xfrm>
+          <a:prstGeom prst="rect">
+            <a:avLst/>
+          </a:prstGeom>
+          <a:noFill/>
+        </p:spPr>
+        <p:txBody>
+          <a:bodyPr wrap="square" rtlCol="0">
+            <a:spAutoFit/>
+          </a:bodyPr>
+          <a:lstStyle/>
+          <a:p>
+            <a:pPr algn="ctr"/>
+            <a:r>
+              <a:rPr lang="en-US" dirty="0">
+                <a:latin typeface="Arial" panose="020B0604020202020204" pitchFamily="34" charset="0"/>
+                <a:cs typeface="Arial" panose="020B0604020202020204" pitchFamily="34" charset="0"/>
+              </a:rPr>
+              <a:t>(B) Chunk Configuration </a:t>
+            </a:r>
+          </a:p>
+          <a:p>
+            <a:pPr algn="ctr"/>
+            <a:r>
+              <a:rPr lang="en-US" dirty="0">
+                <a:latin typeface="Arial" panose="020B0604020202020204" pitchFamily="34" charset="0"/>
+                <a:cs typeface="Arial" panose="020B0604020202020204" pitchFamily="34" charset="0"/>
+              </a:rPr>
+              <a:t>Layer 0</a:t>
+            </a:r>
+          </a:p>
+        </p:txBody>
+      </p:sp>
+      <p:cxnSp>
+        <p:nvCxnSpPr>
+          <p:cNvPr id="304" name="Straight Arrow Connector 303">
+            <a:extLst>
+              <a:ext uri="{FF2B5EF4-FFF2-40B4-BE49-F238E27FC236}">
+                <a16:creationId xmlns:a16="http://schemas.microsoft.com/office/drawing/2014/main" id="{A4D9C26A-7AF9-4B53-BA50-86E33676402A}"/>
+              </a:ext>
+            </a:extLst>
+          </p:cNvPr>
+          <p:cNvCxnSpPr>
+            <a:cxnSpLocks/>
+            <a:stCxn id="289" idx="0"/>
+            <a:endCxn id="288" idx="2"/>
+          </p:cNvCxnSpPr>
+          <p:nvPr/>
+        </p:nvCxnSpPr>
+        <p:spPr>
+          <a:xfrm flipV="1">
+            <a:off x="848703" y="4937696"/>
+            <a:ext cx="0" cy="552250"/>
+          </a:xfrm>
+          <a:prstGeom prst="straightConnector1">
+            <a:avLst/>
+          </a:prstGeom>
+          <a:ln>
+            <a:solidFill>
+              <a:srgbClr val="FF0000"/>
+            </a:solidFill>
+            <a:tailEnd type="triangle"/>
+          </a:ln>
+        </p:spPr>
+        <p:style>
+          <a:lnRef idx="1">
+            <a:schemeClr val="accent1"/>
+          </a:lnRef>
+          <a:fillRef idx="0">
+            <a:schemeClr val="accent1"/>
+          </a:fillRef>
+          <a:effectRef idx="0">
+            <a:schemeClr val="accent1"/>
+          </a:effectRef>
+          <a:fontRef idx="minor">
+            <a:schemeClr val="tx1"/>
+          </a:fontRef>
+        </p:style>
+      </p:cxnSp>
+      <p:cxnSp>
+        <p:nvCxnSpPr>
+          <p:cNvPr id="305" name="Straight Arrow Connector 304">
+            <a:extLst>
+              <a:ext uri="{FF2B5EF4-FFF2-40B4-BE49-F238E27FC236}">
+                <a16:creationId xmlns:a16="http://schemas.microsoft.com/office/drawing/2014/main" id="{428C7B7D-D85C-4944-9FD4-DAE40BA412AD}"/>
+              </a:ext>
+            </a:extLst>
+          </p:cNvPr>
+          <p:cNvCxnSpPr>
+            <a:stCxn id="292" idx="0"/>
+            <a:endCxn id="290" idx="2"/>
+          </p:cNvCxnSpPr>
+          <p:nvPr/>
+        </p:nvCxnSpPr>
+        <p:spPr>
+          <a:xfrm flipV="1">
+            <a:off x="1914576" y="4937696"/>
+            <a:ext cx="0" cy="561071"/>
+          </a:xfrm>
+          <a:prstGeom prst="straightConnector1">
+            <a:avLst/>
+          </a:prstGeom>
+          <a:ln>
+            <a:solidFill>
+              <a:srgbClr val="FF0000"/>
+            </a:solidFill>
+            <a:tailEnd type="triangle"/>
+          </a:ln>
+        </p:spPr>
+        <p:style>
+          <a:lnRef idx="1">
+            <a:schemeClr val="accent1"/>
+          </a:lnRef>
+          <a:fillRef idx="0">
+            <a:schemeClr val="accent1"/>
+          </a:fillRef>
+          <a:effectRef idx="0">
+            <a:schemeClr val="accent1"/>
+          </a:effectRef>
+          <a:fontRef idx="minor">
+            <a:schemeClr val="tx1"/>
+          </a:fontRef>
+        </p:style>
+      </p:cxnSp>
+      <p:cxnSp>
+        <p:nvCxnSpPr>
+          <p:cNvPr id="306" name="Straight Arrow Connector 305">
+            <a:extLst>
+              <a:ext uri="{FF2B5EF4-FFF2-40B4-BE49-F238E27FC236}">
+                <a16:creationId xmlns:a16="http://schemas.microsoft.com/office/drawing/2014/main" id="{4E54F832-5059-46C1-88DD-CD0B495F4A21}"/>
+              </a:ext>
+            </a:extLst>
+          </p:cNvPr>
+          <p:cNvCxnSpPr>
+            <a:cxnSpLocks/>
+            <a:stCxn id="293" idx="0"/>
+            <a:endCxn id="291" idx="2"/>
+          </p:cNvCxnSpPr>
+          <p:nvPr/>
+        </p:nvCxnSpPr>
+        <p:spPr>
+          <a:xfrm flipV="1">
+            <a:off x="3129321" y="4934672"/>
+            <a:ext cx="0" cy="561071"/>
+          </a:xfrm>
+          <a:prstGeom prst="straightConnector1">
+            <a:avLst/>
+          </a:prstGeom>
+          <a:ln>
+            <a:solidFill>
+              <a:srgbClr val="FF0000"/>
+            </a:solidFill>
+            <a:tailEnd type="triangle"/>
+          </a:ln>
+        </p:spPr>
+        <p:style>
+          <a:lnRef idx="1">
+            <a:schemeClr val="accent1"/>
+          </a:lnRef>
+          <a:fillRef idx="0">
+            <a:schemeClr val="accent1"/>
+          </a:fillRef>
+          <a:effectRef idx="0">
+            <a:schemeClr val="accent1"/>
+          </a:effectRef>
+          <a:fontRef idx="minor">
+            <a:schemeClr val="tx1"/>
+          </a:fontRef>
+        </p:style>
+      </p:cxnSp>
+      <p:cxnSp>
+        <p:nvCxnSpPr>
+          <p:cNvPr id="307" name="Straight Arrow Connector 306">
+            <a:extLst>
+              <a:ext uri="{FF2B5EF4-FFF2-40B4-BE49-F238E27FC236}">
+                <a16:creationId xmlns:a16="http://schemas.microsoft.com/office/drawing/2014/main" id="{D2545AEF-BAEB-4491-A4F5-003AE706B6EE}"/>
+              </a:ext>
+            </a:extLst>
+          </p:cNvPr>
+          <p:cNvCxnSpPr>
+            <a:cxnSpLocks/>
+            <a:stCxn id="294" idx="0"/>
+            <a:endCxn id="289" idx="2"/>
+          </p:cNvCxnSpPr>
+          <p:nvPr/>
+        </p:nvCxnSpPr>
+        <p:spPr>
+          <a:xfrm flipV="1">
+            <a:off x="848703" y="5951611"/>
+            <a:ext cx="0" cy="734675"/>
+          </a:xfrm>
+          <a:prstGeom prst="straightConnector1">
+            <a:avLst/>
+          </a:prstGeom>
+          <a:ln>
+            <a:solidFill>
+              <a:srgbClr val="FF0000"/>
+            </a:solidFill>
+            <a:tailEnd type="triangle"/>
+          </a:ln>
+        </p:spPr>
+        <p:style>
+          <a:lnRef idx="1">
+            <a:schemeClr val="accent1"/>
+          </a:lnRef>
+          <a:fillRef idx="0">
+            <a:schemeClr val="accent1"/>
+          </a:fillRef>
+          <a:effectRef idx="0">
+            <a:schemeClr val="accent1"/>
+          </a:effectRef>
+          <a:fontRef idx="minor">
+            <a:schemeClr val="tx1"/>
+          </a:fontRef>
+        </p:style>
+      </p:cxnSp>
+      <p:cxnSp>
+        <p:nvCxnSpPr>
+          <p:cNvPr id="308" name="Straight Arrow Connector 307">
+            <a:extLst>
+              <a:ext uri="{FF2B5EF4-FFF2-40B4-BE49-F238E27FC236}">
+                <a16:creationId xmlns:a16="http://schemas.microsoft.com/office/drawing/2014/main" id="{18E46308-7150-47C6-B827-1E163B23A645}"/>
+              </a:ext>
+            </a:extLst>
+          </p:cNvPr>
+          <p:cNvCxnSpPr>
+            <a:endCxn id="292" idx="2"/>
+          </p:cNvCxnSpPr>
+          <p:nvPr/>
+        </p:nvCxnSpPr>
+        <p:spPr>
+          <a:xfrm flipV="1">
+            <a:off x="1912150" y="5960432"/>
+            <a:ext cx="2426" cy="731651"/>
+          </a:xfrm>
+          <a:prstGeom prst="straightConnector1">
+            <a:avLst/>
+          </a:prstGeom>
+          <a:ln>
+            <a:solidFill>
+              <a:srgbClr val="FF0000"/>
+            </a:solidFill>
+            <a:tailEnd type="triangle"/>
+          </a:ln>
+        </p:spPr>
+        <p:style>
+          <a:lnRef idx="1">
+            <a:schemeClr val="accent1"/>
+          </a:lnRef>
+          <a:fillRef idx="0">
+            <a:schemeClr val="accent1"/>
+          </a:fillRef>
+          <a:effectRef idx="0">
+            <a:schemeClr val="accent1"/>
+          </a:effectRef>
+          <a:fontRef idx="minor">
+            <a:schemeClr val="tx1"/>
+          </a:fontRef>
+        </p:style>
+      </p:cxnSp>
+      <p:cxnSp>
+        <p:nvCxnSpPr>
+          <p:cNvPr id="309" name="Straight Arrow Connector 308">
+            <a:extLst>
+              <a:ext uri="{FF2B5EF4-FFF2-40B4-BE49-F238E27FC236}">
+                <a16:creationId xmlns:a16="http://schemas.microsoft.com/office/drawing/2014/main" id="{9AC71C3C-6DD6-412E-BF65-E27BBCF94FEB}"/>
+              </a:ext>
+            </a:extLst>
+          </p:cNvPr>
+          <p:cNvCxnSpPr>
+            <a:cxnSpLocks/>
+            <a:stCxn id="296" idx="0"/>
+            <a:endCxn id="293" idx="2"/>
+          </p:cNvCxnSpPr>
+          <p:nvPr/>
+        </p:nvCxnSpPr>
+        <p:spPr>
+          <a:xfrm flipV="1">
+            <a:off x="3129321" y="5957408"/>
+            <a:ext cx="0" cy="734675"/>
+          </a:xfrm>
+          <a:prstGeom prst="straightConnector1">
+            <a:avLst/>
+          </a:prstGeom>
+          <a:ln>
+            <a:solidFill>
+              <a:srgbClr val="FF0000"/>
+            </a:solidFill>
+            <a:tailEnd type="triangle"/>
+          </a:ln>
+        </p:spPr>
+        <p:style>
+          <a:lnRef idx="1">
+            <a:schemeClr val="accent1"/>
+          </a:lnRef>
+          <a:fillRef idx="0">
+            <a:schemeClr val="accent1"/>
+          </a:fillRef>
+          <a:effectRef idx="0">
+            <a:schemeClr val="accent1"/>
+          </a:effectRef>
+          <a:fontRef idx="minor">
+            <a:schemeClr val="tx1"/>
+          </a:fontRef>
+        </p:style>
+      </p:cxnSp>
+      <p:cxnSp>
+        <p:nvCxnSpPr>
+          <p:cNvPr id="310" name="Straight Arrow Connector 309">
+            <a:extLst>
+              <a:ext uri="{FF2B5EF4-FFF2-40B4-BE49-F238E27FC236}">
+                <a16:creationId xmlns:a16="http://schemas.microsoft.com/office/drawing/2014/main" id="{C9974A41-86B7-4B0B-BBF5-9F28A7645C33}"/>
+              </a:ext>
+            </a:extLst>
+          </p:cNvPr>
+          <p:cNvCxnSpPr>
+            <a:cxnSpLocks/>
+            <a:stCxn id="297" idx="0"/>
+            <a:endCxn id="294" idx="2"/>
+          </p:cNvCxnSpPr>
+          <p:nvPr/>
+        </p:nvCxnSpPr>
+        <p:spPr>
+          <a:xfrm flipV="1">
+            <a:off x="846277" y="7147951"/>
+            <a:ext cx="2426" cy="553228"/>
+          </a:xfrm>
+          <a:prstGeom prst="straightConnector1">
+            <a:avLst/>
+          </a:prstGeom>
+          <a:ln>
+            <a:solidFill>
+              <a:srgbClr val="FF0000"/>
+            </a:solidFill>
+            <a:tailEnd type="triangle"/>
+          </a:ln>
+        </p:spPr>
+        <p:style>
+          <a:lnRef idx="1">
+            <a:schemeClr val="accent1"/>
+          </a:lnRef>
+          <a:fillRef idx="0">
+            <a:schemeClr val="accent1"/>
+          </a:fillRef>
+          <a:effectRef idx="0">
+            <a:schemeClr val="accent1"/>
+          </a:effectRef>
+          <a:fontRef idx="minor">
+            <a:schemeClr val="tx1"/>
+          </a:fontRef>
+        </p:style>
+      </p:cxnSp>
+      <p:cxnSp>
+        <p:nvCxnSpPr>
+          <p:cNvPr id="311" name="Straight Arrow Connector 310">
+            <a:extLst>
+              <a:ext uri="{FF2B5EF4-FFF2-40B4-BE49-F238E27FC236}">
+                <a16:creationId xmlns:a16="http://schemas.microsoft.com/office/drawing/2014/main" id="{B01FADAA-C305-4F14-97E8-DDD8A781B28C}"/>
+              </a:ext>
+            </a:extLst>
+          </p:cNvPr>
+          <p:cNvCxnSpPr>
+            <a:stCxn id="298" idx="0"/>
+            <a:endCxn id="295" idx="2"/>
+          </p:cNvCxnSpPr>
+          <p:nvPr/>
+        </p:nvCxnSpPr>
+        <p:spPr>
+          <a:xfrm flipV="1">
+            <a:off x="1912150" y="7156772"/>
+            <a:ext cx="2426" cy="553228"/>
+          </a:xfrm>
+          <a:prstGeom prst="straightConnector1">
+            <a:avLst/>
+          </a:prstGeom>
+          <a:ln>
+            <a:solidFill>
+              <a:srgbClr val="FF0000"/>
+            </a:solidFill>
+            <a:tailEnd type="triangle"/>
+          </a:ln>
+        </p:spPr>
+        <p:style>
+          <a:lnRef idx="1">
+            <a:schemeClr val="accent1"/>
+          </a:lnRef>
+          <a:fillRef idx="0">
+            <a:schemeClr val="accent1"/>
+          </a:fillRef>
+          <a:effectRef idx="0">
+            <a:schemeClr val="accent1"/>
+          </a:effectRef>
+          <a:fontRef idx="minor">
+            <a:schemeClr val="tx1"/>
+          </a:fontRef>
+        </p:style>
+      </p:cxnSp>
+      <p:cxnSp>
+        <p:nvCxnSpPr>
+          <p:cNvPr id="312" name="Straight Arrow Connector 311">
+            <a:extLst>
+              <a:ext uri="{FF2B5EF4-FFF2-40B4-BE49-F238E27FC236}">
+                <a16:creationId xmlns:a16="http://schemas.microsoft.com/office/drawing/2014/main" id="{21E1B38D-8312-4E1C-AB31-F66F24BBFE0E}"/>
+              </a:ext>
+            </a:extLst>
+          </p:cNvPr>
+          <p:cNvCxnSpPr>
+            <a:cxnSpLocks/>
+            <a:stCxn id="299" idx="0"/>
+            <a:endCxn id="296" idx="2"/>
+          </p:cNvCxnSpPr>
+          <p:nvPr/>
+        </p:nvCxnSpPr>
+        <p:spPr>
+          <a:xfrm flipV="1">
+            <a:off x="3126895" y="7153748"/>
+            <a:ext cx="2426" cy="553228"/>
+          </a:xfrm>
+          <a:prstGeom prst="straightConnector1">
+            <a:avLst/>
+          </a:prstGeom>
+          <a:ln>
+            <a:solidFill>
+              <a:srgbClr val="FF0000"/>
+            </a:solidFill>
+            <a:tailEnd type="triangle"/>
+          </a:ln>
+        </p:spPr>
+        <p:style>
+          <a:lnRef idx="1">
+            <a:schemeClr val="accent1"/>
+          </a:lnRef>
+          <a:fillRef idx="0">
+            <a:schemeClr val="accent1"/>
+          </a:fillRef>
+          <a:effectRef idx="0">
+            <a:schemeClr val="accent1"/>
+          </a:effectRef>
+          <a:fontRef idx="minor">
+            <a:schemeClr val="tx1"/>
+          </a:fontRef>
+        </p:style>
+      </p:cxnSp>
+      <p:cxnSp>
+        <p:nvCxnSpPr>
+          <p:cNvPr id="313" name="Straight Arrow Connector 312">
+            <a:extLst>
+              <a:ext uri="{FF2B5EF4-FFF2-40B4-BE49-F238E27FC236}">
+                <a16:creationId xmlns:a16="http://schemas.microsoft.com/office/drawing/2014/main" id="{38D977E9-F592-4A46-828E-ED46E5410C1F}"/>
+              </a:ext>
+            </a:extLst>
+          </p:cNvPr>
+          <p:cNvCxnSpPr>
+            <a:cxnSpLocks/>
+            <a:stCxn id="300" idx="0"/>
+            <a:endCxn id="297" idx="2"/>
+          </p:cNvCxnSpPr>
+          <p:nvPr/>
+        </p:nvCxnSpPr>
+        <p:spPr>
+          <a:xfrm flipV="1">
+            <a:off x="846277" y="8162844"/>
+            <a:ext cx="0" cy="576474"/>
+          </a:xfrm>
+          <a:prstGeom prst="straightConnector1">
+            <a:avLst/>
+          </a:prstGeom>
+          <a:ln>
+            <a:solidFill>
+              <a:srgbClr val="FF0000"/>
+            </a:solidFill>
+            <a:tailEnd type="triangle"/>
+          </a:ln>
+        </p:spPr>
+        <p:style>
+          <a:lnRef idx="1">
+            <a:schemeClr val="accent1"/>
+          </a:lnRef>
+          <a:fillRef idx="0">
+            <a:schemeClr val="accent1"/>
+          </a:fillRef>
+          <a:effectRef idx="0">
+            <a:schemeClr val="accent1"/>
+          </a:effectRef>
+          <a:fontRef idx="minor">
+            <a:schemeClr val="tx1"/>
+          </a:fontRef>
+        </p:style>
+      </p:cxnSp>
+      <p:cxnSp>
+        <p:nvCxnSpPr>
+          <p:cNvPr id="314" name="Straight Arrow Connector 313">
+            <a:extLst>
+              <a:ext uri="{FF2B5EF4-FFF2-40B4-BE49-F238E27FC236}">
+                <a16:creationId xmlns:a16="http://schemas.microsoft.com/office/drawing/2014/main" id="{BC78185E-8FF5-4DDF-B241-4928A836E272}"/>
+              </a:ext>
+            </a:extLst>
+          </p:cNvPr>
+          <p:cNvCxnSpPr>
+            <a:stCxn id="301" idx="0"/>
+            <a:endCxn id="298" idx="2"/>
+          </p:cNvCxnSpPr>
+          <p:nvPr/>
+        </p:nvCxnSpPr>
+        <p:spPr>
+          <a:xfrm flipV="1">
+            <a:off x="1912150" y="8171665"/>
+            <a:ext cx="0" cy="576474"/>
+          </a:xfrm>
+          <a:prstGeom prst="straightConnector1">
+            <a:avLst/>
+          </a:prstGeom>
+          <a:ln>
+            <a:solidFill>
+              <a:srgbClr val="FF0000"/>
+            </a:solidFill>
+            <a:tailEnd type="triangle"/>
+          </a:ln>
+        </p:spPr>
+        <p:style>
+          <a:lnRef idx="1">
+            <a:schemeClr val="accent1"/>
+          </a:lnRef>
+          <a:fillRef idx="0">
+            <a:schemeClr val="accent1"/>
+          </a:fillRef>
+          <a:effectRef idx="0">
+            <a:schemeClr val="accent1"/>
+          </a:effectRef>
+          <a:fontRef idx="minor">
+            <a:schemeClr val="tx1"/>
+          </a:fontRef>
+        </p:style>
+      </p:cxnSp>
+      <p:cxnSp>
+        <p:nvCxnSpPr>
+          <p:cNvPr id="315" name="Straight Arrow Connector 314">
+            <a:extLst>
+              <a:ext uri="{FF2B5EF4-FFF2-40B4-BE49-F238E27FC236}">
+                <a16:creationId xmlns:a16="http://schemas.microsoft.com/office/drawing/2014/main" id="{6CCF2A6E-A49D-4DD2-917D-7D528301CDCA}"/>
+              </a:ext>
+            </a:extLst>
+          </p:cNvPr>
+          <p:cNvCxnSpPr>
+            <a:cxnSpLocks/>
+            <a:stCxn id="302" idx="0"/>
+            <a:endCxn id="299" idx="2"/>
+          </p:cNvCxnSpPr>
+          <p:nvPr/>
+        </p:nvCxnSpPr>
+        <p:spPr>
+          <a:xfrm flipV="1">
+            <a:off x="3126895" y="8168641"/>
+            <a:ext cx="0" cy="576474"/>
+          </a:xfrm>
+          <a:prstGeom prst="straightConnector1">
+            <a:avLst/>
+          </a:prstGeom>
+          <a:ln>
+            <a:solidFill>
+              <a:srgbClr val="FF0000"/>
+            </a:solidFill>
+            <a:tailEnd type="triangle"/>
+          </a:ln>
+        </p:spPr>
+        <p:style>
+          <a:lnRef idx="1">
+            <a:schemeClr val="accent1"/>
+          </a:lnRef>
+          <a:fillRef idx="0">
+            <a:schemeClr val="accent1"/>
+          </a:fillRef>
+          <a:effectRef idx="0">
+            <a:schemeClr val="accent1"/>
+          </a:effectRef>
+          <a:fontRef idx="minor">
+            <a:schemeClr val="tx1"/>
+          </a:fontRef>
+        </p:style>
+      </p:cxnSp>
+      <p:cxnSp>
+        <p:nvCxnSpPr>
+          <p:cNvPr id="316" name="Straight Arrow Connector 315">
+            <a:extLst>
+              <a:ext uri="{FF2B5EF4-FFF2-40B4-BE49-F238E27FC236}">
+                <a16:creationId xmlns:a16="http://schemas.microsoft.com/office/drawing/2014/main" id="{BD0694F3-E678-44B0-A158-6BF535E6401E}"/>
+              </a:ext>
+            </a:extLst>
+          </p:cNvPr>
+          <p:cNvCxnSpPr>
+            <a:cxnSpLocks/>
+            <a:stCxn id="290" idx="1"/>
+            <a:endCxn id="288" idx="3"/>
+          </p:cNvCxnSpPr>
+          <p:nvPr/>
+        </p:nvCxnSpPr>
+        <p:spPr>
+          <a:xfrm flipH="1">
+            <a:off x="1184583" y="4706864"/>
+            <a:ext cx="335880" cy="0"/>
+          </a:xfrm>
+          <a:prstGeom prst="straightConnector1">
+            <a:avLst/>
+          </a:prstGeom>
+          <a:ln>
+            <a:solidFill>
+              <a:srgbClr val="FF0000"/>
+            </a:solidFill>
+            <a:tailEnd type="triangle"/>
+          </a:ln>
+        </p:spPr>
+        <p:style>
+          <a:lnRef idx="1">
+            <a:schemeClr val="accent1"/>
+          </a:lnRef>
+          <a:fillRef idx="0">
+            <a:schemeClr val="accent1"/>
+          </a:fillRef>
+          <a:effectRef idx="0">
+            <a:schemeClr val="accent1"/>
+          </a:effectRef>
+          <a:fontRef idx="minor">
+            <a:schemeClr val="tx1"/>
+          </a:fontRef>
+        </p:style>
+      </p:cxnSp>
+      <p:cxnSp>
+        <p:nvCxnSpPr>
+          <p:cNvPr id="317" name="Straight Arrow Connector 316">
+            <a:extLst>
+              <a:ext uri="{FF2B5EF4-FFF2-40B4-BE49-F238E27FC236}">
+                <a16:creationId xmlns:a16="http://schemas.microsoft.com/office/drawing/2014/main" id="{1D1596D8-751C-4BEE-8FD0-016FF1158CD4}"/>
+              </a:ext>
+            </a:extLst>
+          </p:cNvPr>
+          <p:cNvCxnSpPr>
+            <a:cxnSpLocks/>
+            <a:stCxn id="290" idx="3"/>
+            <a:endCxn id="291" idx="1"/>
+          </p:cNvCxnSpPr>
+          <p:nvPr/>
+        </p:nvCxnSpPr>
+        <p:spPr>
+          <a:xfrm flipV="1">
+            <a:off x="2308689" y="4703840"/>
+            <a:ext cx="484752" cy="3024"/>
+          </a:xfrm>
+          <a:prstGeom prst="straightConnector1">
+            <a:avLst/>
+          </a:prstGeom>
+          <a:ln>
+            <a:solidFill>
+              <a:srgbClr val="FF0000"/>
+            </a:solidFill>
+            <a:tailEnd type="triangle"/>
+          </a:ln>
+        </p:spPr>
+        <p:style>
+          <a:lnRef idx="1">
+            <a:schemeClr val="accent1"/>
+          </a:lnRef>
+          <a:fillRef idx="0">
+            <a:schemeClr val="accent1"/>
+          </a:fillRef>
+          <a:effectRef idx="0">
+            <a:schemeClr val="accent1"/>
+          </a:effectRef>
+          <a:fontRef idx="minor">
+            <a:schemeClr val="tx1"/>
+          </a:fontRef>
+        </p:style>
+      </p:cxnSp>
+      <p:cxnSp>
+        <p:nvCxnSpPr>
+          <p:cNvPr id="318" name="Straight Arrow Connector 317">
+            <a:extLst>
+              <a:ext uri="{FF2B5EF4-FFF2-40B4-BE49-F238E27FC236}">
+                <a16:creationId xmlns:a16="http://schemas.microsoft.com/office/drawing/2014/main" id="{5E9AD18E-09D9-42EB-8E26-67A4A89D283C}"/>
+              </a:ext>
+            </a:extLst>
+          </p:cNvPr>
+          <p:cNvCxnSpPr>
+            <a:stCxn id="292" idx="3"/>
+            <a:endCxn id="293" idx="1"/>
+          </p:cNvCxnSpPr>
+          <p:nvPr/>
+        </p:nvCxnSpPr>
+        <p:spPr>
+          <a:xfrm flipV="1">
+            <a:off x="2308689" y="5726576"/>
+            <a:ext cx="484752" cy="3024"/>
+          </a:xfrm>
+          <a:prstGeom prst="straightConnector1">
+            <a:avLst/>
+          </a:prstGeom>
+          <a:ln>
+            <a:solidFill>
+              <a:srgbClr val="FF0000"/>
+            </a:solidFill>
+            <a:tailEnd type="triangle"/>
+          </a:ln>
+        </p:spPr>
+        <p:style>
+          <a:lnRef idx="1">
+            <a:schemeClr val="accent1"/>
+          </a:lnRef>
+          <a:fillRef idx="0">
+            <a:schemeClr val="accent1"/>
+          </a:fillRef>
+          <a:effectRef idx="0">
+            <a:schemeClr val="accent1"/>
+          </a:effectRef>
+          <a:fontRef idx="minor">
+            <a:schemeClr val="tx1"/>
+          </a:fontRef>
+        </p:style>
+      </p:cxnSp>
+      <p:cxnSp>
+        <p:nvCxnSpPr>
+          <p:cNvPr id="319" name="Straight Arrow Connector 318">
+            <a:extLst>
+              <a:ext uri="{FF2B5EF4-FFF2-40B4-BE49-F238E27FC236}">
+                <a16:creationId xmlns:a16="http://schemas.microsoft.com/office/drawing/2014/main" id="{FA29D505-9D6C-463A-A16A-01731FB19224}"/>
+              </a:ext>
+            </a:extLst>
+          </p:cNvPr>
+          <p:cNvCxnSpPr>
+            <a:stCxn id="295" idx="3"/>
+            <a:endCxn id="296" idx="1"/>
+          </p:cNvCxnSpPr>
+          <p:nvPr/>
+        </p:nvCxnSpPr>
+        <p:spPr>
+          <a:xfrm flipV="1">
+            <a:off x="2308689" y="6922916"/>
+            <a:ext cx="484752" cy="3024"/>
+          </a:xfrm>
+          <a:prstGeom prst="straightConnector1">
+            <a:avLst/>
+          </a:prstGeom>
+          <a:ln>
+            <a:solidFill>
+              <a:srgbClr val="FF0000"/>
+            </a:solidFill>
+            <a:tailEnd type="triangle"/>
+          </a:ln>
+        </p:spPr>
+        <p:style>
+          <a:lnRef idx="1">
+            <a:schemeClr val="accent1"/>
+          </a:lnRef>
+          <a:fillRef idx="0">
+            <a:schemeClr val="accent1"/>
+          </a:fillRef>
+          <a:effectRef idx="0">
+            <a:schemeClr val="accent1"/>
+          </a:effectRef>
+          <a:fontRef idx="minor">
+            <a:schemeClr val="tx1"/>
+          </a:fontRef>
+        </p:style>
+      </p:cxnSp>
+      <p:cxnSp>
+        <p:nvCxnSpPr>
+          <p:cNvPr id="320" name="Straight Arrow Connector 319">
+            <a:extLst>
+              <a:ext uri="{FF2B5EF4-FFF2-40B4-BE49-F238E27FC236}">
+                <a16:creationId xmlns:a16="http://schemas.microsoft.com/office/drawing/2014/main" id="{E4694403-0D89-4C20-A532-0CD02841D7A3}"/>
+              </a:ext>
+            </a:extLst>
+          </p:cNvPr>
+          <p:cNvCxnSpPr>
+            <a:stCxn id="298" idx="3"/>
+            <a:endCxn id="299" idx="1"/>
+          </p:cNvCxnSpPr>
+          <p:nvPr/>
+        </p:nvCxnSpPr>
+        <p:spPr>
+          <a:xfrm flipV="1">
+            <a:off x="2306263" y="7937809"/>
+            <a:ext cx="484752" cy="3024"/>
+          </a:xfrm>
+          <a:prstGeom prst="straightConnector1">
+            <a:avLst/>
+          </a:prstGeom>
+          <a:ln>
+            <a:solidFill>
+              <a:srgbClr val="FF0000"/>
+            </a:solidFill>
+            <a:tailEnd type="triangle"/>
+          </a:ln>
+        </p:spPr>
+        <p:style>
+          <a:lnRef idx="1">
+            <a:schemeClr val="accent1"/>
+          </a:lnRef>
+          <a:fillRef idx="0">
+            <a:schemeClr val="accent1"/>
+          </a:fillRef>
+          <a:effectRef idx="0">
+            <a:schemeClr val="accent1"/>
+          </a:effectRef>
+          <a:fontRef idx="minor">
+            <a:schemeClr val="tx1"/>
+          </a:fontRef>
+        </p:style>
+      </p:cxnSp>
+      <p:cxnSp>
+        <p:nvCxnSpPr>
+          <p:cNvPr id="321" name="Straight Arrow Connector 320">
+            <a:extLst>
+              <a:ext uri="{FF2B5EF4-FFF2-40B4-BE49-F238E27FC236}">
+                <a16:creationId xmlns:a16="http://schemas.microsoft.com/office/drawing/2014/main" id="{ABF82E09-2F82-4C9E-9CBE-4FD7B86A571C}"/>
+              </a:ext>
+            </a:extLst>
+          </p:cNvPr>
+          <p:cNvCxnSpPr>
+            <a:stCxn id="301" idx="3"/>
+            <a:endCxn id="302" idx="1"/>
+          </p:cNvCxnSpPr>
+          <p:nvPr/>
+        </p:nvCxnSpPr>
+        <p:spPr>
+          <a:xfrm flipV="1">
+            <a:off x="2306263" y="8975948"/>
+            <a:ext cx="484752" cy="3024"/>
+          </a:xfrm>
+          <a:prstGeom prst="straightConnector1">
+            <a:avLst/>
+          </a:prstGeom>
+          <a:ln>
+            <a:solidFill>
+              <a:srgbClr val="FF0000"/>
+            </a:solidFill>
+            <a:tailEnd type="triangle"/>
+          </a:ln>
+        </p:spPr>
+        <p:style>
+          <a:lnRef idx="1">
+            <a:schemeClr val="accent1"/>
+          </a:lnRef>
+          <a:fillRef idx="0">
+            <a:schemeClr val="accent1"/>
+          </a:fillRef>
+          <a:effectRef idx="0">
+            <a:schemeClr val="accent1"/>
+          </a:effectRef>
+          <a:fontRef idx="minor">
+            <a:schemeClr val="tx1"/>
+          </a:fontRef>
+        </p:style>
+      </p:cxnSp>
+      <p:cxnSp>
+        <p:nvCxnSpPr>
+          <p:cNvPr id="322" name="Straight Arrow Connector 321">
+            <a:extLst>
+              <a:ext uri="{FF2B5EF4-FFF2-40B4-BE49-F238E27FC236}">
+                <a16:creationId xmlns:a16="http://schemas.microsoft.com/office/drawing/2014/main" id="{AFEA7B93-A412-4800-8B7C-DF8740C6910E}"/>
+              </a:ext>
+            </a:extLst>
+          </p:cNvPr>
+          <p:cNvCxnSpPr>
+            <a:stCxn id="292" idx="1"/>
+            <a:endCxn id="289" idx="3"/>
+          </p:cNvCxnSpPr>
+          <p:nvPr/>
+        </p:nvCxnSpPr>
+        <p:spPr>
+          <a:xfrm flipH="1" flipV="1">
+            <a:off x="1184582" y="5720779"/>
+            <a:ext cx="335881" cy="8821"/>
+          </a:xfrm>
+          <a:prstGeom prst="straightConnector1">
+            <a:avLst/>
+          </a:prstGeom>
+          <a:ln>
+            <a:solidFill>
+              <a:srgbClr val="FF0000"/>
+            </a:solidFill>
+            <a:tailEnd type="triangle"/>
+          </a:ln>
+        </p:spPr>
+        <p:style>
+          <a:lnRef idx="1">
+            <a:schemeClr val="accent1"/>
+          </a:lnRef>
+          <a:fillRef idx="0">
+            <a:schemeClr val="accent1"/>
+          </a:fillRef>
+          <a:effectRef idx="0">
+            <a:schemeClr val="accent1"/>
+          </a:effectRef>
+          <a:fontRef idx="minor">
+            <a:schemeClr val="tx1"/>
+          </a:fontRef>
+        </p:style>
+      </p:cxnSp>
+      <p:cxnSp>
+        <p:nvCxnSpPr>
+          <p:cNvPr id="323" name="Straight Arrow Connector 322">
+            <a:extLst>
+              <a:ext uri="{FF2B5EF4-FFF2-40B4-BE49-F238E27FC236}">
+                <a16:creationId xmlns:a16="http://schemas.microsoft.com/office/drawing/2014/main" id="{157F9D55-DF39-40A7-8EA6-933B71BBC0E7}"/>
+              </a:ext>
+            </a:extLst>
+          </p:cNvPr>
+          <p:cNvCxnSpPr>
+            <a:stCxn id="295" idx="1"/>
+            <a:endCxn id="294" idx="3"/>
+          </p:cNvCxnSpPr>
+          <p:nvPr/>
+        </p:nvCxnSpPr>
+        <p:spPr>
+          <a:xfrm flipH="1" flipV="1">
+            <a:off x="1184582" y="6917119"/>
+            <a:ext cx="335881" cy="8821"/>
+          </a:xfrm>
+          <a:prstGeom prst="straightConnector1">
+            <a:avLst/>
+          </a:prstGeom>
+          <a:ln>
+            <a:solidFill>
+              <a:srgbClr val="FF0000"/>
+            </a:solidFill>
+            <a:tailEnd type="triangle"/>
+          </a:ln>
+        </p:spPr>
+        <p:style>
+          <a:lnRef idx="1">
+            <a:schemeClr val="accent1"/>
+          </a:lnRef>
+          <a:fillRef idx="0">
+            <a:schemeClr val="accent1"/>
+          </a:fillRef>
+          <a:effectRef idx="0">
+            <a:schemeClr val="accent1"/>
+          </a:effectRef>
+          <a:fontRef idx="minor">
+            <a:schemeClr val="tx1"/>
+          </a:fontRef>
+        </p:style>
+      </p:cxnSp>
+      <p:cxnSp>
+        <p:nvCxnSpPr>
+          <p:cNvPr id="324" name="Straight Arrow Connector 323">
+            <a:extLst>
+              <a:ext uri="{FF2B5EF4-FFF2-40B4-BE49-F238E27FC236}">
+                <a16:creationId xmlns:a16="http://schemas.microsoft.com/office/drawing/2014/main" id="{1B8E7DC8-070C-4EB8-B886-EB22A9306138}"/>
+              </a:ext>
+            </a:extLst>
+          </p:cNvPr>
+          <p:cNvCxnSpPr>
+            <a:cxnSpLocks/>
+            <a:stCxn id="298" idx="1"/>
+            <a:endCxn id="297" idx="3"/>
+          </p:cNvCxnSpPr>
+          <p:nvPr/>
+        </p:nvCxnSpPr>
+        <p:spPr>
+          <a:xfrm flipH="1" flipV="1">
+            <a:off x="1182156" y="7932012"/>
+            <a:ext cx="335881" cy="8821"/>
+          </a:xfrm>
+          <a:prstGeom prst="straightConnector1">
+            <a:avLst/>
+          </a:prstGeom>
+          <a:ln>
+            <a:solidFill>
+              <a:srgbClr val="FF0000"/>
+            </a:solidFill>
+            <a:tailEnd type="triangle"/>
+          </a:ln>
+        </p:spPr>
+        <p:style>
+          <a:lnRef idx="1">
+            <a:schemeClr val="accent1"/>
+          </a:lnRef>
+          <a:fillRef idx="0">
+            <a:schemeClr val="accent1"/>
+          </a:fillRef>
+          <a:effectRef idx="0">
+            <a:schemeClr val="accent1"/>
+          </a:effectRef>
+          <a:fontRef idx="minor">
+            <a:schemeClr val="tx1"/>
+          </a:fontRef>
+        </p:style>
+      </p:cxnSp>
+      <p:cxnSp>
+        <p:nvCxnSpPr>
+          <p:cNvPr id="325" name="Straight Arrow Connector 324">
+            <a:extLst>
+              <a:ext uri="{FF2B5EF4-FFF2-40B4-BE49-F238E27FC236}">
+                <a16:creationId xmlns:a16="http://schemas.microsoft.com/office/drawing/2014/main" id="{8538C342-7F0B-4B54-86AA-86760E4A4A01}"/>
+              </a:ext>
+            </a:extLst>
+          </p:cNvPr>
+          <p:cNvCxnSpPr>
+            <a:stCxn id="301" idx="1"/>
+            <a:endCxn id="300" idx="3"/>
+          </p:cNvCxnSpPr>
+          <p:nvPr/>
+        </p:nvCxnSpPr>
+        <p:spPr>
+          <a:xfrm flipH="1" flipV="1">
+            <a:off x="1182156" y="8970151"/>
+            <a:ext cx="335881" cy="8821"/>
+          </a:xfrm>
+          <a:prstGeom prst="straightConnector1">
+            <a:avLst/>
+          </a:prstGeom>
+          <a:ln>
+            <a:solidFill>
+              <a:srgbClr val="FF0000"/>
+            </a:solidFill>
+            <a:tailEnd type="triangle"/>
+          </a:ln>
+        </p:spPr>
+        <p:style>
+          <a:lnRef idx="1">
+            <a:schemeClr val="accent1"/>
+          </a:lnRef>
+          <a:fillRef idx="0">
+            <a:schemeClr val="accent1"/>
+          </a:fillRef>
+          <a:effectRef idx="0">
+            <a:schemeClr val="accent1"/>
+          </a:effectRef>
+          <a:fontRef idx="minor">
+            <a:schemeClr val="tx1"/>
+          </a:fontRef>
+        </p:style>
+      </p:cxnSp>
+      <p:grpSp>
+        <p:nvGrpSpPr>
+          <p:cNvPr id="326" name="Group 325">
+            <a:extLst>
+              <a:ext uri="{FF2B5EF4-FFF2-40B4-BE49-F238E27FC236}">
+                <a16:creationId xmlns:a16="http://schemas.microsoft.com/office/drawing/2014/main" id="{5C293263-F879-498C-AC7E-4F104727E914}"/>
+              </a:ext>
+            </a:extLst>
+          </p:cNvPr>
+          <p:cNvGrpSpPr/>
+          <p:nvPr/>
+        </p:nvGrpSpPr>
+        <p:grpSpPr>
+          <a:xfrm>
+            <a:off x="3822291" y="4378668"/>
+            <a:ext cx="2908243" cy="5076899"/>
+            <a:chOff x="3846749" y="4107311"/>
+            <a:chExt cx="2908243" cy="5076899"/>
+          </a:xfrm>
+        </p:grpSpPr>
+        <p:pic>
+          <p:nvPicPr>
+            <p:cNvPr id="341" name="Picture 340">
+              <a:extLst>
+                <a:ext uri="{FF2B5EF4-FFF2-40B4-BE49-F238E27FC236}">
+                  <a16:creationId xmlns:a16="http://schemas.microsoft.com/office/drawing/2014/main" id="{1ED84E0C-1AE1-4C12-84C5-D38BFD684E9A}"/>
+                </a:ext>
+              </a:extLst>
+            </p:cNvPr>
+            <p:cNvPicPr>
+              <a:picLocks noChangeAspect="1"/>
+            </p:cNvPicPr>
+            <p:nvPr/>
+          </p:nvPicPr>
+          <p:blipFill>
+            <a:blip r:embed="rId6">
+              <a:extLst>
+                <a:ext uri="{28A0092B-C50C-407E-A947-70E740481C1C}">
+                  <a14:useLocalDpi xmlns:a14="http://schemas.microsoft.com/office/drawing/2010/main" val="0"/>
+                </a:ext>
+              </a:extLst>
+            </a:blip>
+            <a:stretch>
+              <a:fillRect/>
+            </a:stretch>
+          </p:blipFill>
+          <p:spPr>
+            <a:xfrm rot="5400000">
+              <a:off x="3022851" y="4931209"/>
+              <a:ext cx="4439360" cy="2791563"/>
+            </a:xfrm>
+            <a:prstGeom prst="rect">
+              <a:avLst/>
+            </a:prstGeom>
+          </p:spPr>
+        </p:pic>
+        <p:sp>
+          <p:nvSpPr>
+            <p:cNvPr id="342" name="TextBox 341">
+              <a:extLst>
+                <a:ext uri="{FF2B5EF4-FFF2-40B4-BE49-F238E27FC236}">
+                  <a16:creationId xmlns:a16="http://schemas.microsoft.com/office/drawing/2014/main" id="{3EB447E4-2500-405A-AC2D-05FF185E32E9}"/>
+                </a:ext>
+              </a:extLst>
+            </p:cNvPr>
+            <p:cNvSpPr txBox="1"/>
+            <p:nvPr/>
+          </p:nvSpPr>
+          <p:spPr>
+            <a:xfrm>
+              <a:off x="4108444" y="4275344"/>
+              <a:ext cx="671760" cy="461665"/>
+            </a:xfrm>
+            <a:prstGeom prst="rect">
+              <a:avLst/>
+            </a:prstGeom>
+            <a:noFill/>
+          </p:spPr>
+          <p:txBody>
+            <a:bodyPr wrap="square" rtlCol="0">
+              <a:spAutoFit/>
+            </a:bodyPr>
+            <a:lstStyle/>
+            <a:p>
+              <a:pPr algn="ctr"/>
+              <a:r>
+                <a:rPr lang="en-US" sz="1200" dirty="0">
+                  <a:solidFill>
+                    <a:schemeClr val="bg1"/>
+                  </a:solidFill>
+                  <a:latin typeface="Arial" panose="020B0604020202020204" pitchFamily="34" charset="0"/>
+                  <a:cs typeface="Arial" panose="020B0604020202020204" pitchFamily="34" charset="0"/>
+                </a:rPr>
+                <a:t>C 0:</a:t>
+              </a:r>
+            </a:p>
+            <a:p>
+              <a:pPr algn="ctr"/>
+              <a:r>
+                <a:rPr lang="en-US" sz="1200" dirty="0">
+                  <a:solidFill>
+                    <a:schemeClr val="bg1"/>
+                  </a:solidFill>
+                  <a:latin typeface="Arial" panose="020B0604020202020204" pitchFamily="34" charset="0"/>
+                  <a:cs typeface="Arial" panose="020B0604020202020204" pitchFamily="34" charset="0"/>
+                </a:rPr>
+                <a:t>1579</a:t>
+              </a:r>
+            </a:p>
+          </p:txBody>
+        </p:sp>
+        <p:sp>
+          <p:nvSpPr>
+            <p:cNvPr id="343" name="TextBox 342">
+              <a:extLst>
+                <a:ext uri="{FF2B5EF4-FFF2-40B4-BE49-F238E27FC236}">
+                  <a16:creationId xmlns:a16="http://schemas.microsoft.com/office/drawing/2014/main" id="{8E422A2A-BBB7-4BCE-A892-64F289F6F187}"/>
+                </a:ext>
+              </a:extLst>
+            </p:cNvPr>
+            <p:cNvSpPr txBox="1"/>
+            <p:nvPr/>
+          </p:nvSpPr>
+          <p:spPr>
+            <a:xfrm>
+              <a:off x="4108444" y="5301926"/>
+              <a:ext cx="671759" cy="461665"/>
+            </a:xfrm>
+            <a:prstGeom prst="rect">
+              <a:avLst/>
+            </a:prstGeom>
+            <a:noFill/>
+          </p:spPr>
+          <p:txBody>
+            <a:bodyPr wrap="square" rtlCol="0">
+              <a:spAutoFit/>
+            </a:bodyPr>
+            <a:lstStyle/>
+            <a:p>
+              <a:pPr algn="ctr"/>
+              <a:r>
+                <a:rPr lang="en-US" sz="1200" dirty="0">
+                  <a:solidFill>
+                    <a:schemeClr val="bg1"/>
+                  </a:solidFill>
+                  <a:latin typeface="Arial" panose="020B0604020202020204" pitchFamily="34" charset="0"/>
+                  <a:cs typeface="Arial" panose="020B0604020202020204" pitchFamily="34" charset="0"/>
+                </a:rPr>
+                <a:t>C 3:</a:t>
+              </a:r>
+            </a:p>
+            <a:p>
+              <a:pPr algn="ctr"/>
+              <a:r>
+                <a:rPr lang="en-US" sz="1200" dirty="0">
+                  <a:solidFill>
+                    <a:schemeClr val="bg1"/>
+                  </a:solidFill>
+                  <a:latin typeface="Arial" panose="020B0604020202020204" pitchFamily="34" charset="0"/>
+                  <a:cs typeface="Arial" panose="020B0604020202020204" pitchFamily="34" charset="0"/>
+                </a:rPr>
+                <a:t>2528</a:t>
+              </a:r>
+            </a:p>
+          </p:txBody>
+        </p:sp>
+        <p:sp>
+          <p:nvSpPr>
+            <p:cNvPr id="344" name="TextBox 343">
+              <a:extLst>
+                <a:ext uri="{FF2B5EF4-FFF2-40B4-BE49-F238E27FC236}">
+                  <a16:creationId xmlns:a16="http://schemas.microsoft.com/office/drawing/2014/main" id="{367EF7DC-088A-4D14-A8C4-77F76A9E7A21}"/>
+                </a:ext>
+              </a:extLst>
+            </p:cNvPr>
+            <p:cNvSpPr txBox="1"/>
+            <p:nvPr/>
+          </p:nvSpPr>
+          <p:spPr>
+            <a:xfrm>
+              <a:off x="5205322" y="4275344"/>
+              <a:ext cx="608166" cy="461665"/>
+            </a:xfrm>
+            <a:prstGeom prst="rect">
+              <a:avLst/>
+            </a:prstGeom>
+            <a:noFill/>
+          </p:spPr>
+          <p:txBody>
+            <a:bodyPr wrap="square" rtlCol="0">
+              <a:spAutoFit/>
+            </a:bodyPr>
+            <a:lstStyle/>
+            <a:p>
+              <a:pPr algn="ctr"/>
+              <a:r>
+                <a:rPr lang="en-US" sz="1200" dirty="0">
+                  <a:solidFill>
+                    <a:schemeClr val="bg1"/>
+                  </a:solidFill>
+                  <a:latin typeface="Arial" panose="020B0604020202020204" pitchFamily="34" charset="0"/>
+                  <a:cs typeface="Arial" panose="020B0604020202020204" pitchFamily="34" charset="0"/>
+                </a:rPr>
+                <a:t>C 1:</a:t>
+              </a:r>
+            </a:p>
+            <a:p>
+              <a:pPr algn="ctr"/>
+              <a:r>
+                <a:rPr lang="en-US" sz="1200" dirty="0">
+                  <a:solidFill>
+                    <a:schemeClr val="bg1"/>
+                  </a:solidFill>
+                  <a:latin typeface="Arial" panose="020B0604020202020204" pitchFamily="34" charset="0"/>
+                  <a:cs typeface="Arial" panose="020B0604020202020204" pitchFamily="34" charset="0"/>
+                </a:rPr>
+                <a:t>1937</a:t>
+              </a:r>
+            </a:p>
+          </p:txBody>
+        </p:sp>
+        <p:sp>
+          <p:nvSpPr>
+            <p:cNvPr id="345" name="TextBox 344">
+              <a:extLst>
+                <a:ext uri="{FF2B5EF4-FFF2-40B4-BE49-F238E27FC236}">
+                  <a16:creationId xmlns:a16="http://schemas.microsoft.com/office/drawing/2014/main" id="{A1D5D95C-3F9B-404A-847B-22A84C78144D}"/>
+                </a:ext>
+              </a:extLst>
+            </p:cNvPr>
+            <p:cNvSpPr txBox="1"/>
+            <p:nvPr/>
+          </p:nvSpPr>
+          <p:spPr>
+            <a:xfrm>
+              <a:off x="6138476" y="4283025"/>
+              <a:ext cx="608166" cy="461665"/>
+            </a:xfrm>
+            <a:prstGeom prst="rect">
+              <a:avLst/>
+            </a:prstGeom>
+            <a:noFill/>
+          </p:spPr>
+          <p:txBody>
+            <a:bodyPr wrap="square" rtlCol="0">
+              <a:spAutoFit/>
+            </a:bodyPr>
+            <a:lstStyle/>
+            <a:p>
+              <a:pPr algn="ctr"/>
+              <a:r>
+                <a:rPr lang="en-US" sz="1200" dirty="0">
+                  <a:solidFill>
+                    <a:schemeClr val="bg1"/>
+                  </a:solidFill>
+                  <a:latin typeface="Arial" panose="020B0604020202020204" pitchFamily="34" charset="0"/>
+                  <a:cs typeface="Arial" panose="020B0604020202020204" pitchFamily="34" charset="0"/>
+                </a:rPr>
+                <a:t>C 2:</a:t>
+              </a:r>
+            </a:p>
+            <a:p>
+              <a:pPr algn="ctr"/>
+              <a:r>
+                <a:rPr lang="en-US" sz="1200" dirty="0">
+                  <a:solidFill>
+                    <a:schemeClr val="bg1"/>
+                  </a:solidFill>
+                  <a:latin typeface="Arial" panose="020B0604020202020204" pitchFamily="34" charset="0"/>
+                  <a:cs typeface="Arial" panose="020B0604020202020204" pitchFamily="34" charset="0"/>
+                </a:rPr>
+                <a:t>158</a:t>
+              </a:r>
+            </a:p>
+          </p:txBody>
+        </p:sp>
+        <p:sp>
+          <p:nvSpPr>
+            <p:cNvPr id="346" name="TextBox 345">
+              <a:extLst>
+                <a:ext uri="{FF2B5EF4-FFF2-40B4-BE49-F238E27FC236}">
+                  <a16:creationId xmlns:a16="http://schemas.microsoft.com/office/drawing/2014/main" id="{804CF202-BFFC-4F66-A46B-8D3FFDBCCD2F}"/>
+                </a:ext>
+              </a:extLst>
+            </p:cNvPr>
+            <p:cNvSpPr txBox="1"/>
+            <p:nvPr/>
+          </p:nvSpPr>
+          <p:spPr>
+            <a:xfrm>
+              <a:off x="5227683" y="5314001"/>
+              <a:ext cx="557223" cy="461665"/>
+            </a:xfrm>
+            <a:prstGeom prst="rect">
+              <a:avLst/>
+            </a:prstGeom>
+            <a:noFill/>
+          </p:spPr>
+          <p:txBody>
+            <a:bodyPr wrap="square" rtlCol="0">
+              <a:spAutoFit/>
+            </a:bodyPr>
+            <a:lstStyle/>
+            <a:p>
+              <a:pPr algn="ctr"/>
+              <a:r>
+                <a:rPr lang="en-US" sz="1200" dirty="0">
+                  <a:solidFill>
+                    <a:schemeClr val="bg1"/>
+                  </a:solidFill>
+                  <a:latin typeface="Arial" panose="020B0604020202020204" pitchFamily="34" charset="0"/>
+                  <a:cs typeface="Arial" panose="020B0604020202020204" pitchFamily="34" charset="0"/>
+                </a:rPr>
+                <a:t>C 4:</a:t>
+              </a:r>
+            </a:p>
+            <a:p>
+              <a:pPr algn="ctr"/>
+              <a:r>
+                <a:rPr lang="en-US" sz="1200" dirty="0">
+                  <a:solidFill>
+                    <a:schemeClr val="bg1"/>
+                  </a:solidFill>
+                  <a:latin typeface="Arial" panose="020B0604020202020204" pitchFamily="34" charset="0"/>
+                  <a:cs typeface="Arial" panose="020B0604020202020204" pitchFamily="34" charset="0"/>
+                </a:rPr>
+                <a:t>3306</a:t>
+              </a:r>
+            </a:p>
+          </p:txBody>
+        </p:sp>
+        <p:sp>
+          <p:nvSpPr>
+            <p:cNvPr id="347" name="TextBox 346">
+              <a:extLst>
+                <a:ext uri="{FF2B5EF4-FFF2-40B4-BE49-F238E27FC236}">
+                  <a16:creationId xmlns:a16="http://schemas.microsoft.com/office/drawing/2014/main" id="{C790CD7F-B9A5-4854-A93D-AF18BC7107CC}"/>
+                </a:ext>
+              </a:extLst>
+            </p:cNvPr>
+            <p:cNvSpPr txBox="1"/>
+            <p:nvPr/>
+          </p:nvSpPr>
+          <p:spPr>
+            <a:xfrm>
+              <a:off x="6144234" y="5301630"/>
+              <a:ext cx="602408" cy="461665"/>
+            </a:xfrm>
+            <a:prstGeom prst="rect">
+              <a:avLst/>
+            </a:prstGeom>
+            <a:noFill/>
+          </p:spPr>
+          <p:txBody>
+            <a:bodyPr wrap="square" rtlCol="0">
+              <a:spAutoFit/>
+            </a:bodyPr>
+            <a:lstStyle/>
+            <a:p>
+              <a:pPr algn="ctr"/>
+              <a:r>
+                <a:rPr lang="en-US" sz="1200" dirty="0">
+                  <a:solidFill>
+                    <a:schemeClr val="bg1"/>
+                  </a:solidFill>
+                  <a:latin typeface="Arial" panose="020B0604020202020204" pitchFamily="34" charset="0"/>
+                  <a:cs typeface="Arial" panose="020B0604020202020204" pitchFamily="34" charset="0"/>
+                </a:rPr>
+                <a:t>C 5:</a:t>
+              </a:r>
+            </a:p>
+            <a:p>
+              <a:pPr algn="ctr"/>
+              <a:r>
+                <a:rPr lang="en-US" sz="1200" dirty="0">
+                  <a:solidFill>
+                    <a:schemeClr val="bg1"/>
+                  </a:solidFill>
+                  <a:latin typeface="Arial" panose="020B0604020202020204" pitchFamily="34" charset="0"/>
+                  <a:cs typeface="Arial" panose="020B0604020202020204" pitchFamily="34" charset="0"/>
+                </a:rPr>
+                <a:t>266</a:t>
+              </a:r>
+            </a:p>
+          </p:txBody>
+        </p:sp>
+        <p:sp>
+          <p:nvSpPr>
+            <p:cNvPr id="348" name="TextBox 347">
+              <a:extLst>
+                <a:ext uri="{FF2B5EF4-FFF2-40B4-BE49-F238E27FC236}">
+                  <a16:creationId xmlns:a16="http://schemas.microsoft.com/office/drawing/2014/main" id="{3CD516F1-835C-4CEF-837F-51DB3004DB8F}"/>
+                </a:ext>
+              </a:extLst>
+            </p:cNvPr>
+            <p:cNvSpPr txBox="1"/>
+            <p:nvPr/>
+          </p:nvSpPr>
+          <p:spPr>
+            <a:xfrm>
+              <a:off x="4108444" y="6739469"/>
+              <a:ext cx="671759" cy="461665"/>
+            </a:xfrm>
+            <a:prstGeom prst="rect">
+              <a:avLst/>
+            </a:prstGeom>
+            <a:noFill/>
+          </p:spPr>
+          <p:txBody>
+            <a:bodyPr wrap="square" rtlCol="0">
+              <a:spAutoFit/>
+            </a:bodyPr>
+            <a:lstStyle/>
+            <a:p>
+              <a:pPr algn="ctr"/>
+              <a:r>
+                <a:rPr lang="en-US" sz="1200" dirty="0">
+                  <a:solidFill>
+                    <a:schemeClr val="bg1"/>
+                  </a:solidFill>
+                  <a:latin typeface="Arial" panose="020B0604020202020204" pitchFamily="34" charset="0"/>
+                  <a:cs typeface="Arial" panose="020B0604020202020204" pitchFamily="34" charset="0"/>
+                </a:rPr>
+                <a:t>C 6:</a:t>
+              </a:r>
+            </a:p>
+            <a:p>
+              <a:pPr algn="ctr"/>
+              <a:r>
+                <a:rPr lang="en-US" sz="1200" dirty="0">
+                  <a:solidFill>
+                    <a:schemeClr val="bg1"/>
+                  </a:solidFill>
+                  <a:latin typeface="Arial" panose="020B0604020202020204" pitchFamily="34" charset="0"/>
+                  <a:cs typeface="Arial" panose="020B0604020202020204" pitchFamily="34" charset="0"/>
+                </a:rPr>
+                <a:t>2079</a:t>
+              </a:r>
+            </a:p>
+          </p:txBody>
+        </p:sp>
+        <p:sp>
+          <p:nvSpPr>
+            <p:cNvPr id="349" name="TextBox 348">
+              <a:extLst>
+                <a:ext uri="{FF2B5EF4-FFF2-40B4-BE49-F238E27FC236}">
+                  <a16:creationId xmlns:a16="http://schemas.microsoft.com/office/drawing/2014/main" id="{BFB1F998-6777-4321-A7ED-6F2D8A6F13D1}"/>
+                </a:ext>
+              </a:extLst>
+            </p:cNvPr>
+            <p:cNvSpPr txBox="1"/>
+            <p:nvPr/>
+          </p:nvSpPr>
+          <p:spPr>
+            <a:xfrm>
+              <a:off x="5206637" y="6738150"/>
+              <a:ext cx="599314" cy="461665"/>
+            </a:xfrm>
+            <a:prstGeom prst="rect">
+              <a:avLst/>
+            </a:prstGeom>
+            <a:noFill/>
+          </p:spPr>
+          <p:txBody>
+            <a:bodyPr wrap="square" rtlCol="0">
+              <a:spAutoFit/>
+            </a:bodyPr>
+            <a:lstStyle/>
+            <a:p>
+              <a:pPr algn="ctr"/>
+              <a:r>
+                <a:rPr lang="en-US" sz="1200" dirty="0">
+                  <a:solidFill>
+                    <a:schemeClr val="bg1"/>
+                  </a:solidFill>
+                  <a:latin typeface="Arial" panose="020B0604020202020204" pitchFamily="34" charset="0"/>
+                  <a:cs typeface="Arial" panose="020B0604020202020204" pitchFamily="34" charset="0"/>
+                </a:rPr>
+                <a:t>C 7:</a:t>
+              </a:r>
+            </a:p>
+            <a:p>
+              <a:pPr algn="ctr"/>
+              <a:r>
+                <a:rPr lang="en-US" sz="1200" dirty="0">
+                  <a:solidFill>
+                    <a:schemeClr val="bg1"/>
+                  </a:solidFill>
+                  <a:latin typeface="Arial" panose="020B0604020202020204" pitchFamily="34" charset="0"/>
+                  <a:cs typeface="Arial" panose="020B0604020202020204" pitchFamily="34" charset="0"/>
+                </a:rPr>
+                <a:t>2763</a:t>
+              </a:r>
+            </a:p>
+          </p:txBody>
+        </p:sp>
+        <p:sp>
+          <p:nvSpPr>
+            <p:cNvPr id="350" name="TextBox 349">
+              <a:extLst>
+                <a:ext uri="{FF2B5EF4-FFF2-40B4-BE49-F238E27FC236}">
+                  <a16:creationId xmlns:a16="http://schemas.microsoft.com/office/drawing/2014/main" id="{28F9A57B-60F1-43D6-87FE-E6A2683B40DF}"/>
+                </a:ext>
+              </a:extLst>
+            </p:cNvPr>
+            <p:cNvSpPr txBox="1"/>
+            <p:nvPr/>
+          </p:nvSpPr>
+          <p:spPr>
+            <a:xfrm>
+              <a:off x="6152585" y="6748296"/>
+              <a:ext cx="602407" cy="461665"/>
+            </a:xfrm>
+            <a:prstGeom prst="rect">
+              <a:avLst/>
+            </a:prstGeom>
+            <a:noFill/>
+          </p:spPr>
+          <p:txBody>
+            <a:bodyPr wrap="square" rtlCol="0">
+              <a:spAutoFit/>
+            </a:bodyPr>
+            <a:lstStyle/>
+            <a:p>
+              <a:pPr algn="ctr"/>
+              <a:r>
+                <a:rPr lang="en-US" sz="1200" dirty="0">
+                  <a:solidFill>
+                    <a:schemeClr val="bg1"/>
+                  </a:solidFill>
+                  <a:latin typeface="Arial" panose="020B0604020202020204" pitchFamily="34" charset="0"/>
+                  <a:cs typeface="Arial" panose="020B0604020202020204" pitchFamily="34" charset="0"/>
+                </a:rPr>
+                <a:t>C 8:</a:t>
+              </a:r>
+            </a:p>
+            <a:p>
+              <a:pPr algn="ctr"/>
+              <a:r>
+                <a:rPr lang="en-US" sz="1200" dirty="0">
+                  <a:solidFill>
+                    <a:schemeClr val="bg1"/>
+                  </a:solidFill>
+                  <a:latin typeface="Arial" panose="020B0604020202020204" pitchFamily="34" charset="0"/>
+                  <a:cs typeface="Arial" panose="020B0604020202020204" pitchFamily="34" charset="0"/>
+                </a:rPr>
+                <a:t>174</a:t>
+              </a:r>
+            </a:p>
+          </p:txBody>
+        </p:sp>
+        <p:sp>
+          <p:nvSpPr>
+            <p:cNvPr id="351" name="TextBox 350">
+              <a:extLst>
+                <a:ext uri="{FF2B5EF4-FFF2-40B4-BE49-F238E27FC236}">
+                  <a16:creationId xmlns:a16="http://schemas.microsoft.com/office/drawing/2014/main" id="{9DEC4E87-7235-48FB-89AD-4E4A99D899EB}"/>
+                </a:ext>
+              </a:extLst>
+            </p:cNvPr>
+            <p:cNvSpPr txBox="1"/>
+            <p:nvPr/>
+          </p:nvSpPr>
+          <p:spPr>
+            <a:xfrm>
+              <a:off x="4106018" y="7950025"/>
+              <a:ext cx="671759" cy="461665"/>
+            </a:xfrm>
+            <a:prstGeom prst="rect">
+              <a:avLst/>
+            </a:prstGeom>
+            <a:noFill/>
+          </p:spPr>
+          <p:txBody>
+            <a:bodyPr wrap="square" rtlCol="0">
+              <a:spAutoFit/>
+            </a:bodyPr>
+            <a:lstStyle/>
+            <a:p>
+              <a:pPr algn="ctr"/>
+              <a:r>
+                <a:rPr lang="en-US" sz="1200" dirty="0">
+                  <a:solidFill>
+                    <a:schemeClr val="bg1"/>
+                  </a:solidFill>
+                  <a:latin typeface="Arial" panose="020B0604020202020204" pitchFamily="34" charset="0"/>
+                  <a:cs typeface="Arial" panose="020B0604020202020204" pitchFamily="34" charset="0"/>
+                </a:rPr>
+                <a:t>C 9:</a:t>
+              </a:r>
+            </a:p>
+            <a:p>
+              <a:pPr algn="ctr"/>
+              <a:r>
+                <a:rPr lang="en-US" sz="1200" dirty="0">
+                  <a:solidFill>
+                    <a:schemeClr val="bg1"/>
+                  </a:solidFill>
+                  <a:latin typeface="Arial" panose="020B0604020202020204" pitchFamily="34" charset="0"/>
+                  <a:cs typeface="Arial" panose="020B0604020202020204" pitchFamily="34" charset="0"/>
+                </a:rPr>
+                <a:t>528</a:t>
+              </a:r>
+            </a:p>
+          </p:txBody>
+        </p:sp>
+        <p:sp>
+          <p:nvSpPr>
+            <p:cNvPr id="352" name="TextBox 351">
+              <a:extLst>
+                <a:ext uri="{FF2B5EF4-FFF2-40B4-BE49-F238E27FC236}">
+                  <a16:creationId xmlns:a16="http://schemas.microsoft.com/office/drawing/2014/main" id="{0AEF4CBF-8CFC-46AF-96AF-AD7AC1168733}"/>
+                </a:ext>
+              </a:extLst>
+            </p:cNvPr>
+            <p:cNvSpPr txBox="1"/>
+            <p:nvPr/>
+          </p:nvSpPr>
+          <p:spPr>
+            <a:xfrm>
+              <a:off x="5237234" y="7948706"/>
+              <a:ext cx="571902" cy="461665"/>
+            </a:xfrm>
+            <a:prstGeom prst="rect">
+              <a:avLst/>
+            </a:prstGeom>
+            <a:noFill/>
+          </p:spPr>
+          <p:txBody>
+            <a:bodyPr wrap="square" rtlCol="0">
+              <a:spAutoFit/>
+            </a:bodyPr>
+            <a:lstStyle/>
+            <a:p>
+              <a:pPr algn="ctr"/>
+              <a:r>
+                <a:rPr lang="en-US" sz="1200" dirty="0">
+                  <a:solidFill>
+                    <a:schemeClr val="bg1"/>
+                  </a:solidFill>
+                  <a:latin typeface="Arial" panose="020B0604020202020204" pitchFamily="34" charset="0"/>
+                  <a:cs typeface="Arial" panose="020B0604020202020204" pitchFamily="34" charset="0"/>
+                </a:rPr>
+                <a:t>C 10:</a:t>
+              </a:r>
+            </a:p>
+            <a:p>
+              <a:pPr algn="ctr"/>
+              <a:r>
+                <a:rPr lang="en-US" sz="1200" dirty="0">
+                  <a:solidFill>
+                    <a:schemeClr val="bg1"/>
+                  </a:solidFill>
+                  <a:latin typeface="Arial" panose="020B0604020202020204" pitchFamily="34" charset="0"/>
+                  <a:cs typeface="Arial" panose="020B0604020202020204" pitchFamily="34" charset="0"/>
+                </a:rPr>
+                <a:t>649</a:t>
+              </a:r>
+            </a:p>
+          </p:txBody>
+        </p:sp>
+        <p:sp>
+          <p:nvSpPr>
+            <p:cNvPr id="353" name="TextBox 352">
+              <a:extLst>
+                <a:ext uri="{FF2B5EF4-FFF2-40B4-BE49-F238E27FC236}">
+                  <a16:creationId xmlns:a16="http://schemas.microsoft.com/office/drawing/2014/main" id="{009F85AD-76BE-477D-8C98-D1510DC48A91}"/>
+                </a:ext>
+              </a:extLst>
+            </p:cNvPr>
+            <p:cNvSpPr txBox="1"/>
+            <p:nvPr/>
+          </p:nvSpPr>
+          <p:spPr>
+            <a:xfrm>
+              <a:off x="6190141" y="7948706"/>
+              <a:ext cx="537661" cy="461665"/>
+            </a:xfrm>
+            <a:prstGeom prst="rect">
+              <a:avLst/>
+            </a:prstGeom>
+            <a:noFill/>
+          </p:spPr>
+          <p:txBody>
+            <a:bodyPr wrap="square" rtlCol="0">
+              <a:spAutoFit/>
+            </a:bodyPr>
+            <a:lstStyle/>
+            <a:p>
+              <a:pPr algn="ctr"/>
+              <a:r>
+                <a:rPr lang="en-US" sz="1200" dirty="0">
+                  <a:solidFill>
+                    <a:schemeClr val="bg1"/>
+                  </a:solidFill>
+                  <a:latin typeface="Arial" panose="020B0604020202020204" pitchFamily="34" charset="0"/>
+                  <a:cs typeface="Arial" panose="020B0604020202020204" pitchFamily="34" charset="0"/>
+                </a:rPr>
+                <a:t>C 11:</a:t>
+              </a:r>
+            </a:p>
+            <a:p>
+              <a:pPr algn="ctr"/>
+              <a:r>
+                <a:rPr lang="en-US" sz="1200" dirty="0">
+                  <a:solidFill>
+                    <a:schemeClr val="bg1"/>
+                  </a:solidFill>
+                  <a:latin typeface="Arial" panose="020B0604020202020204" pitchFamily="34" charset="0"/>
+                  <a:cs typeface="Arial" panose="020B0604020202020204" pitchFamily="34" charset="0"/>
+                </a:rPr>
+                <a:t>29</a:t>
+              </a:r>
+            </a:p>
+          </p:txBody>
+        </p:sp>
+        <p:cxnSp>
+          <p:nvCxnSpPr>
+            <p:cNvPr id="354" name="Straight Arrow Connector 353">
+              <a:extLst>
+                <a:ext uri="{FF2B5EF4-FFF2-40B4-BE49-F238E27FC236}">
+                  <a16:creationId xmlns:a16="http://schemas.microsoft.com/office/drawing/2014/main" id="{0ACDB7D2-A336-4BE9-8A7E-9B3008F9A2E1}"/>
+                </a:ext>
+              </a:extLst>
+            </p:cNvPr>
+            <p:cNvCxnSpPr>
+              <a:cxnSpLocks/>
+              <a:stCxn id="343" idx="0"/>
+              <a:endCxn id="342" idx="2"/>
+            </p:cNvCxnSpPr>
+            <p:nvPr/>
+          </p:nvCxnSpPr>
+          <p:spPr>
+            <a:xfrm flipV="1">
+              <a:off x="4444324" y="4737009"/>
+              <a:ext cx="0" cy="564917"/>
+            </a:xfrm>
+            <a:prstGeom prst="straightConnector1">
+              <a:avLst/>
+            </a:prstGeom>
+            <a:ln>
+              <a:solidFill>
+                <a:srgbClr val="FF0000"/>
+              </a:solidFill>
+              <a:tailEnd type="triangle"/>
+            </a:ln>
+          </p:spPr>
+          <p:style>
+            <a:lnRef idx="1">
+              <a:schemeClr val="accent1"/>
+            </a:lnRef>
+            <a:fillRef idx="0">
+              <a:schemeClr val="accent1"/>
+            </a:fillRef>
+            <a:effectRef idx="0">
+              <a:schemeClr val="accent1"/>
+            </a:effectRef>
+            <a:fontRef idx="minor">
+              <a:schemeClr val="tx1"/>
+            </a:fontRef>
+          </p:style>
+        </p:cxnSp>
+        <p:cxnSp>
+          <p:nvCxnSpPr>
+            <p:cNvPr id="355" name="Straight Arrow Connector 354">
+              <a:extLst>
+                <a:ext uri="{FF2B5EF4-FFF2-40B4-BE49-F238E27FC236}">
+                  <a16:creationId xmlns:a16="http://schemas.microsoft.com/office/drawing/2014/main" id="{5BE45944-924A-455A-90EF-95307D0E7831}"/>
+                </a:ext>
+              </a:extLst>
+            </p:cNvPr>
+            <p:cNvCxnSpPr>
+              <a:cxnSpLocks/>
+              <a:stCxn id="346" idx="0"/>
+              <a:endCxn id="344" idx="2"/>
+            </p:cNvCxnSpPr>
+            <p:nvPr/>
+          </p:nvCxnSpPr>
+          <p:spPr>
+            <a:xfrm flipV="1">
+              <a:off x="5506295" y="4737009"/>
+              <a:ext cx="3110" cy="576992"/>
+            </a:xfrm>
+            <a:prstGeom prst="straightConnector1">
+              <a:avLst/>
+            </a:prstGeom>
+            <a:ln>
+              <a:solidFill>
+                <a:srgbClr val="FF0000"/>
+              </a:solidFill>
+              <a:tailEnd type="triangle"/>
+            </a:ln>
+          </p:spPr>
+          <p:style>
+            <a:lnRef idx="1">
+              <a:schemeClr val="accent1"/>
+            </a:lnRef>
+            <a:fillRef idx="0">
+              <a:schemeClr val="accent1"/>
+            </a:fillRef>
+            <a:effectRef idx="0">
+              <a:schemeClr val="accent1"/>
+            </a:effectRef>
+            <a:fontRef idx="minor">
+              <a:schemeClr val="tx1"/>
+            </a:fontRef>
+          </p:style>
+        </p:cxnSp>
+        <p:cxnSp>
+          <p:nvCxnSpPr>
+            <p:cNvPr id="356" name="Straight Arrow Connector 355">
+              <a:extLst>
+                <a:ext uri="{FF2B5EF4-FFF2-40B4-BE49-F238E27FC236}">
+                  <a16:creationId xmlns:a16="http://schemas.microsoft.com/office/drawing/2014/main" id="{A85ED655-8F94-4903-ABD9-FBAF9FC27015}"/>
+                </a:ext>
+              </a:extLst>
+            </p:cNvPr>
+            <p:cNvCxnSpPr>
+              <a:cxnSpLocks/>
+              <a:stCxn id="347" idx="0"/>
+              <a:endCxn id="345" idx="2"/>
+            </p:cNvCxnSpPr>
+            <p:nvPr/>
+          </p:nvCxnSpPr>
+          <p:spPr>
+            <a:xfrm flipH="1" flipV="1">
+              <a:off x="6442559" y="4744690"/>
+              <a:ext cx="2879" cy="556940"/>
+            </a:xfrm>
+            <a:prstGeom prst="straightConnector1">
+              <a:avLst/>
+            </a:prstGeom>
+            <a:ln>
+              <a:solidFill>
+                <a:srgbClr val="FF0000"/>
+              </a:solidFill>
+              <a:tailEnd type="triangle"/>
+            </a:ln>
+          </p:spPr>
+          <p:style>
+            <a:lnRef idx="1">
+              <a:schemeClr val="accent1"/>
+            </a:lnRef>
+            <a:fillRef idx="0">
+              <a:schemeClr val="accent1"/>
+            </a:fillRef>
+            <a:effectRef idx="0">
+              <a:schemeClr val="accent1"/>
+            </a:effectRef>
+            <a:fontRef idx="minor">
+              <a:schemeClr val="tx1"/>
+            </a:fontRef>
+          </p:style>
+        </p:cxnSp>
+        <p:cxnSp>
+          <p:nvCxnSpPr>
+            <p:cNvPr id="357" name="Straight Arrow Connector 356">
+              <a:extLst>
+                <a:ext uri="{FF2B5EF4-FFF2-40B4-BE49-F238E27FC236}">
+                  <a16:creationId xmlns:a16="http://schemas.microsoft.com/office/drawing/2014/main" id="{7A25C3E1-62B0-470B-AEB4-2C6924C199CD}"/>
+                </a:ext>
+              </a:extLst>
+            </p:cNvPr>
+            <p:cNvCxnSpPr>
+              <a:cxnSpLocks/>
+              <a:stCxn id="348" idx="0"/>
+              <a:endCxn id="343" idx="2"/>
+            </p:cNvCxnSpPr>
+            <p:nvPr/>
+          </p:nvCxnSpPr>
+          <p:spPr>
+            <a:xfrm flipV="1">
+              <a:off x="4444324" y="5763591"/>
+              <a:ext cx="0" cy="975878"/>
+            </a:xfrm>
+            <a:prstGeom prst="straightConnector1">
+              <a:avLst/>
+            </a:prstGeom>
+            <a:ln>
+              <a:solidFill>
+                <a:srgbClr val="FF0000"/>
+              </a:solidFill>
+              <a:tailEnd type="triangle"/>
+            </a:ln>
+          </p:spPr>
+          <p:style>
+            <a:lnRef idx="1">
+              <a:schemeClr val="accent1"/>
+            </a:lnRef>
+            <a:fillRef idx="0">
+              <a:schemeClr val="accent1"/>
+            </a:fillRef>
+            <a:effectRef idx="0">
+              <a:schemeClr val="accent1"/>
+            </a:effectRef>
+            <a:fontRef idx="minor">
+              <a:schemeClr val="tx1"/>
+            </a:fontRef>
+          </p:style>
+        </p:cxnSp>
+        <p:cxnSp>
+          <p:nvCxnSpPr>
+            <p:cNvPr id="358" name="Straight Arrow Connector 357">
+              <a:extLst>
+                <a:ext uri="{FF2B5EF4-FFF2-40B4-BE49-F238E27FC236}">
+                  <a16:creationId xmlns:a16="http://schemas.microsoft.com/office/drawing/2014/main" id="{569550D3-D2B9-4B8B-8C01-E46CC8B587A3}"/>
+                </a:ext>
+              </a:extLst>
+            </p:cNvPr>
+            <p:cNvCxnSpPr>
+              <a:cxnSpLocks/>
+              <a:stCxn id="349" idx="0"/>
+              <a:endCxn id="346" idx="2"/>
+            </p:cNvCxnSpPr>
+            <p:nvPr/>
+          </p:nvCxnSpPr>
+          <p:spPr>
+            <a:xfrm flipV="1">
+              <a:off x="5506294" y="5775666"/>
+              <a:ext cx="1" cy="962484"/>
+            </a:xfrm>
+            <a:prstGeom prst="straightConnector1">
+              <a:avLst/>
+            </a:prstGeom>
+            <a:ln>
+              <a:solidFill>
+                <a:srgbClr val="FF0000"/>
+              </a:solidFill>
+              <a:tailEnd type="triangle"/>
+            </a:ln>
+          </p:spPr>
+          <p:style>
+            <a:lnRef idx="1">
+              <a:schemeClr val="accent1"/>
+            </a:lnRef>
+            <a:fillRef idx="0">
+              <a:schemeClr val="accent1"/>
+            </a:fillRef>
+            <a:effectRef idx="0">
+              <a:schemeClr val="accent1"/>
+            </a:effectRef>
+            <a:fontRef idx="minor">
+              <a:schemeClr val="tx1"/>
+            </a:fontRef>
+          </p:style>
+        </p:cxnSp>
+        <p:cxnSp>
+          <p:nvCxnSpPr>
+            <p:cNvPr id="359" name="Straight Arrow Connector 358">
+              <a:extLst>
+                <a:ext uri="{FF2B5EF4-FFF2-40B4-BE49-F238E27FC236}">
+                  <a16:creationId xmlns:a16="http://schemas.microsoft.com/office/drawing/2014/main" id="{13695CC5-5324-4345-8B70-5CCFF84F81FA}"/>
+                </a:ext>
+              </a:extLst>
+            </p:cNvPr>
+            <p:cNvCxnSpPr>
+              <a:cxnSpLocks/>
+              <a:stCxn id="350" idx="0"/>
+              <a:endCxn id="347" idx="2"/>
+            </p:cNvCxnSpPr>
+            <p:nvPr/>
+          </p:nvCxnSpPr>
+          <p:spPr>
+            <a:xfrm flipH="1" flipV="1">
+              <a:off x="6445438" y="5763295"/>
+              <a:ext cx="8351" cy="985001"/>
+            </a:xfrm>
+            <a:prstGeom prst="straightConnector1">
+              <a:avLst/>
+            </a:prstGeom>
+            <a:ln>
+              <a:solidFill>
+                <a:srgbClr val="FF0000"/>
+              </a:solidFill>
+              <a:tailEnd type="triangle"/>
+            </a:ln>
+          </p:spPr>
+          <p:style>
+            <a:lnRef idx="1">
+              <a:schemeClr val="accent1"/>
+            </a:lnRef>
+            <a:fillRef idx="0">
+              <a:schemeClr val="accent1"/>
+            </a:fillRef>
+            <a:effectRef idx="0">
+              <a:schemeClr val="accent1"/>
+            </a:effectRef>
+            <a:fontRef idx="minor">
+              <a:schemeClr val="tx1"/>
+            </a:fontRef>
+          </p:style>
+        </p:cxnSp>
+        <p:cxnSp>
+          <p:nvCxnSpPr>
+            <p:cNvPr id="360" name="Straight Arrow Connector 359">
+              <a:extLst>
+                <a:ext uri="{FF2B5EF4-FFF2-40B4-BE49-F238E27FC236}">
+                  <a16:creationId xmlns:a16="http://schemas.microsoft.com/office/drawing/2014/main" id="{D16A4242-07B9-4E43-B338-2239EF38EB96}"/>
+                </a:ext>
+              </a:extLst>
+            </p:cNvPr>
+            <p:cNvCxnSpPr>
+              <a:cxnSpLocks/>
+              <a:stCxn id="351" idx="0"/>
+              <a:endCxn id="348" idx="2"/>
+            </p:cNvCxnSpPr>
+            <p:nvPr/>
+          </p:nvCxnSpPr>
+          <p:spPr>
+            <a:xfrm flipV="1">
+              <a:off x="4441898" y="7201134"/>
+              <a:ext cx="2426" cy="748891"/>
+            </a:xfrm>
+            <a:prstGeom prst="straightConnector1">
+              <a:avLst/>
+            </a:prstGeom>
+            <a:ln>
+              <a:solidFill>
+                <a:srgbClr val="FF0000"/>
+              </a:solidFill>
+              <a:tailEnd type="triangle"/>
+            </a:ln>
+          </p:spPr>
+          <p:style>
+            <a:lnRef idx="1">
+              <a:schemeClr val="accent1"/>
+            </a:lnRef>
+            <a:fillRef idx="0">
+              <a:schemeClr val="accent1"/>
+            </a:fillRef>
+            <a:effectRef idx="0">
+              <a:schemeClr val="accent1"/>
+            </a:effectRef>
+            <a:fontRef idx="minor">
+              <a:schemeClr val="tx1"/>
+            </a:fontRef>
+          </p:style>
+        </p:cxnSp>
+        <p:cxnSp>
+          <p:nvCxnSpPr>
+            <p:cNvPr id="361" name="Straight Arrow Connector 360">
+              <a:extLst>
+                <a:ext uri="{FF2B5EF4-FFF2-40B4-BE49-F238E27FC236}">
+                  <a16:creationId xmlns:a16="http://schemas.microsoft.com/office/drawing/2014/main" id="{AF9E12F3-5EC5-4B9F-B908-F556A2ADBBD6}"/>
+                </a:ext>
+              </a:extLst>
+            </p:cNvPr>
+            <p:cNvCxnSpPr>
+              <a:cxnSpLocks/>
+              <a:stCxn id="352" idx="0"/>
+              <a:endCxn id="349" idx="2"/>
+            </p:cNvCxnSpPr>
+            <p:nvPr/>
+          </p:nvCxnSpPr>
+          <p:spPr>
+            <a:xfrm flipH="1" flipV="1">
+              <a:off x="5506294" y="7199815"/>
+              <a:ext cx="16891" cy="748891"/>
+            </a:xfrm>
+            <a:prstGeom prst="straightConnector1">
+              <a:avLst/>
+            </a:prstGeom>
+            <a:ln>
+              <a:solidFill>
+                <a:srgbClr val="FF0000"/>
+              </a:solidFill>
+              <a:tailEnd type="triangle"/>
+            </a:ln>
+          </p:spPr>
+          <p:style>
+            <a:lnRef idx="1">
+              <a:schemeClr val="accent1"/>
+            </a:lnRef>
+            <a:fillRef idx="0">
+              <a:schemeClr val="accent1"/>
+            </a:fillRef>
+            <a:effectRef idx="0">
+              <a:schemeClr val="accent1"/>
+            </a:effectRef>
+            <a:fontRef idx="minor">
+              <a:schemeClr val="tx1"/>
+            </a:fontRef>
+          </p:style>
+        </p:cxnSp>
+        <p:cxnSp>
+          <p:nvCxnSpPr>
+            <p:cNvPr id="362" name="Straight Arrow Connector 361">
+              <a:extLst>
+                <a:ext uri="{FF2B5EF4-FFF2-40B4-BE49-F238E27FC236}">
+                  <a16:creationId xmlns:a16="http://schemas.microsoft.com/office/drawing/2014/main" id="{377E01C1-4F95-466C-A465-1EE588BEA390}"/>
+                </a:ext>
+              </a:extLst>
+            </p:cNvPr>
+            <p:cNvCxnSpPr>
+              <a:cxnSpLocks/>
+              <a:stCxn id="353" idx="0"/>
+              <a:endCxn id="350" idx="2"/>
+            </p:cNvCxnSpPr>
+            <p:nvPr/>
+          </p:nvCxnSpPr>
+          <p:spPr>
+            <a:xfrm flipH="1" flipV="1">
+              <a:off x="6453789" y="7209961"/>
+              <a:ext cx="5183" cy="738745"/>
+            </a:xfrm>
+            <a:prstGeom prst="straightConnector1">
+              <a:avLst/>
+            </a:prstGeom>
+            <a:ln>
+              <a:solidFill>
+                <a:srgbClr val="FF0000"/>
+              </a:solidFill>
+              <a:tailEnd type="triangle"/>
+            </a:ln>
+          </p:spPr>
+          <p:style>
+            <a:lnRef idx="1">
+              <a:schemeClr val="accent1"/>
+            </a:lnRef>
+            <a:fillRef idx="0">
+              <a:schemeClr val="accent1"/>
+            </a:fillRef>
+            <a:effectRef idx="0">
+              <a:schemeClr val="accent1"/>
+            </a:effectRef>
+            <a:fontRef idx="minor">
+              <a:schemeClr val="tx1"/>
+            </a:fontRef>
+          </p:style>
+        </p:cxnSp>
+        <p:cxnSp>
+          <p:nvCxnSpPr>
+            <p:cNvPr id="363" name="Straight Arrow Connector 362">
+              <a:extLst>
+                <a:ext uri="{FF2B5EF4-FFF2-40B4-BE49-F238E27FC236}">
+                  <a16:creationId xmlns:a16="http://schemas.microsoft.com/office/drawing/2014/main" id="{B41FF63C-3279-4561-B95B-3631D4E738D2}"/>
+                </a:ext>
+              </a:extLst>
+            </p:cNvPr>
+            <p:cNvCxnSpPr>
+              <a:cxnSpLocks/>
+              <a:stCxn id="344" idx="1"/>
+              <a:endCxn id="342" idx="3"/>
+            </p:cNvCxnSpPr>
+            <p:nvPr/>
+          </p:nvCxnSpPr>
+          <p:spPr>
+            <a:xfrm flipH="1">
+              <a:off x="4780204" y="4506177"/>
+              <a:ext cx="425118" cy="0"/>
+            </a:xfrm>
+            <a:prstGeom prst="straightConnector1">
+              <a:avLst/>
+            </a:prstGeom>
+            <a:ln>
+              <a:solidFill>
+                <a:srgbClr val="FF0000"/>
+              </a:solidFill>
+              <a:tailEnd type="triangle"/>
+            </a:ln>
+          </p:spPr>
+          <p:style>
+            <a:lnRef idx="1">
+              <a:schemeClr val="accent1"/>
+            </a:lnRef>
+            <a:fillRef idx="0">
+              <a:schemeClr val="accent1"/>
+            </a:fillRef>
+            <a:effectRef idx="0">
+              <a:schemeClr val="accent1"/>
+            </a:effectRef>
+            <a:fontRef idx="minor">
+              <a:schemeClr val="tx1"/>
+            </a:fontRef>
+          </p:style>
+        </p:cxnSp>
+        <p:cxnSp>
+          <p:nvCxnSpPr>
+            <p:cNvPr id="364" name="Straight Arrow Connector 363">
+              <a:extLst>
+                <a:ext uri="{FF2B5EF4-FFF2-40B4-BE49-F238E27FC236}">
+                  <a16:creationId xmlns:a16="http://schemas.microsoft.com/office/drawing/2014/main" id="{19A05A3C-8503-41FA-B68A-A9D0282778E9}"/>
+                </a:ext>
+              </a:extLst>
+            </p:cNvPr>
+            <p:cNvCxnSpPr>
+              <a:cxnSpLocks/>
+              <a:stCxn id="344" idx="3"/>
+              <a:endCxn id="345" idx="1"/>
+            </p:cNvCxnSpPr>
+            <p:nvPr/>
+          </p:nvCxnSpPr>
+          <p:spPr>
+            <a:xfrm>
+              <a:off x="5813488" y="4506177"/>
+              <a:ext cx="324988" cy="7681"/>
+            </a:xfrm>
+            <a:prstGeom prst="straightConnector1">
+              <a:avLst/>
+            </a:prstGeom>
+            <a:ln>
+              <a:solidFill>
+                <a:srgbClr val="FF0000"/>
+              </a:solidFill>
+              <a:tailEnd type="triangle"/>
+            </a:ln>
+          </p:spPr>
+          <p:style>
+            <a:lnRef idx="1">
+              <a:schemeClr val="accent1"/>
+            </a:lnRef>
+            <a:fillRef idx="0">
+              <a:schemeClr val="accent1"/>
+            </a:fillRef>
+            <a:effectRef idx="0">
+              <a:schemeClr val="accent1"/>
+            </a:effectRef>
+            <a:fontRef idx="minor">
+              <a:schemeClr val="tx1"/>
+            </a:fontRef>
+          </p:style>
+        </p:cxnSp>
+        <p:cxnSp>
+          <p:nvCxnSpPr>
+            <p:cNvPr id="365" name="Straight Arrow Connector 364">
+              <a:extLst>
+                <a:ext uri="{FF2B5EF4-FFF2-40B4-BE49-F238E27FC236}">
+                  <a16:creationId xmlns:a16="http://schemas.microsoft.com/office/drawing/2014/main" id="{47CF3AF2-425C-4A6C-9112-5D208BA3C339}"/>
+                </a:ext>
+              </a:extLst>
+            </p:cNvPr>
+            <p:cNvCxnSpPr>
+              <a:cxnSpLocks/>
+              <a:stCxn id="346" idx="3"/>
+              <a:endCxn id="347" idx="1"/>
+            </p:cNvCxnSpPr>
+            <p:nvPr/>
+          </p:nvCxnSpPr>
+          <p:spPr>
+            <a:xfrm flipV="1">
+              <a:off x="5784906" y="5532463"/>
+              <a:ext cx="359328" cy="12371"/>
+            </a:xfrm>
+            <a:prstGeom prst="straightConnector1">
+              <a:avLst/>
+            </a:prstGeom>
+            <a:ln>
+              <a:solidFill>
+                <a:srgbClr val="FF0000"/>
+              </a:solidFill>
+              <a:tailEnd type="triangle"/>
+            </a:ln>
+          </p:spPr>
+          <p:style>
+            <a:lnRef idx="1">
+              <a:schemeClr val="accent1"/>
+            </a:lnRef>
+            <a:fillRef idx="0">
+              <a:schemeClr val="accent1"/>
+            </a:fillRef>
+            <a:effectRef idx="0">
+              <a:schemeClr val="accent1"/>
+            </a:effectRef>
+            <a:fontRef idx="minor">
+              <a:schemeClr val="tx1"/>
+            </a:fontRef>
+          </p:style>
+        </p:cxnSp>
+        <p:cxnSp>
+          <p:nvCxnSpPr>
+            <p:cNvPr id="366" name="Straight Arrow Connector 365">
+              <a:extLst>
+                <a:ext uri="{FF2B5EF4-FFF2-40B4-BE49-F238E27FC236}">
+                  <a16:creationId xmlns:a16="http://schemas.microsoft.com/office/drawing/2014/main" id="{A157BCDD-4F7C-40C0-9D81-30B846933741}"/>
+                </a:ext>
+              </a:extLst>
+            </p:cNvPr>
+            <p:cNvCxnSpPr>
+              <a:cxnSpLocks/>
+              <a:stCxn id="349" idx="3"/>
+              <a:endCxn id="350" idx="1"/>
+            </p:cNvCxnSpPr>
+            <p:nvPr/>
+          </p:nvCxnSpPr>
+          <p:spPr>
+            <a:xfrm>
+              <a:off x="5805951" y="6968983"/>
+              <a:ext cx="346634" cy="10146"/>
+            </a:xfrm>
+            <a:prstGeom prst="straightConnector1">
+              <a:avLst/>
+            </a:prstGeom>
+            <a:ln>
+              <a:solidFill>
+                <a:srgbClr val="FF0000"/>
+              </a:solidFill>
+              <a:tailEnd type="triangle"/>
+            </a:ln>
+          </p:spPr>
+          <p:style>
+            <a:lnRef idx="1">
+              <a:schemeClr val="accent1"/>
+            </a:lnRef>
+            <a:fillRef idx="0">
+              <a:schemeClr val="accent1"/>
+            </a:fillRef>
+            <a:effectRef idx="0">
+              <a:schemeClr val="accent1"/>
+            </a:effectRef>
+            <a:fontRef idx="minor">
+              <a:schemeClr val="tx1"/>
+            </a:fontRef>
+          </p:style>
+        </p:cxnSp>
+        <p:cxnSp>
+          <p:nvCxnSpPr>
+            <p:cNvPr id="367" name="Straight Arrow Connector 366">
+              <a:extLst>
+                <a:ext uri="{FF2B5EF4-FFF2-40B4-BE49-F238E27FC236}">
+                  <a16:creationId xmlns:a16="http://schemas.microsoft.com/office/drawing/2014/main" id="{16680949-C3F5-4E41-BDA0-76C3E2AAAB34}"/>
+                </a:ext>
+              </a:extLst>
+            </p:cNvPr>
+            <p:cNvCxnSpPr>
+              <a:cxnSpLocks/>
+              <a:stCxn id="352" idx="3"/>
+              <a:endCxn id="353" idx="1"/>
+            </p:cNvCxnSpPr>
+            <p:nvPr/>
+          </p:nvCxnSpPr>
+          <p:spPr>
+            <a:xfrm>
+              <a:off x="5809136" y="8179539"/>
+              <a:ext cx="381005" cy="0"/>
+            </a:xfrm>
+            <a:prstGeom prst="straightConnector1">
+              <a:avLst/>
+            </a:prstGeom>
+            <a:ln>
+              <a:solidFill>
+                <a:srgbClr val="FF0000"/>
+              </a:solidFill>
+              <a:tailEnd type="triangle"/>
+            </a:ln>
+          </p:spPr>
+          <p:style>
+            <a:lnRef idx="1">
+              <a:schemeClr val="accent1"/>
+            </a:lnRef>
+            <a:fillRef idx="0">
+              <a:schemeClr val="accent1"/>
+            </a:fillRef>
+            <a:effectRef idx="0">
+              <a:schemeClr val="accent1"/>
+            </a:effectRef>
+            <a:fontRef idx="minor">
+              <a:schemeClr val="tx1"/>
+            </a:fontRef>
+          </p:style>
+        </p:cxnSp>
+        <p:cxnSp>
+          <p:nvCxnSpPr>
+            <p:cNvPr id="368" name="Straight Arrow Connector 367">
+              <a:extLst>
+                <a:ext uri="{FF2B5EF4-FFF2-40B4-BE49-F238E27FC236}">
+                  <a16:creationId xmlns:a16="http://schemas.microsoft.com/office/drawing/2014/main" id="{96390298-6438-4C70-AEE1-A8F9755C2415}"/>
+                </a:ext>
+              </a:extLst>
+            </p:cNvPr>
+            <p:cNvCxnSpPr>
+              <a:cxnSpLocks/>
+              <a:stCxn id="346" idx="1"/>
+              <a:endCxn id="343" idx="3"/>
+            </p:cNvCxnSpPr>
+            <p:nvPr/>
+          </p:nvCxnSpPr>
+          <p:spPr>
+            <a:xfrm flipH="1" flipV="1">
+              <a:off x="4780203" y="5532759"/>
+              <a:ext cx="447480" cy="12075"/>
+            </a:xfrm>
+            <a:prstGeom prst="straightConnector1">
+              <a:avLst/>
+            </a:prstGeom>
+            <a:ln>
+              <a:solidFill>
+                <a:srgbClr val="FF0000"/>
+              </a:solidFill>
+              <a:tailEnd type="triangle"/>
+            </a:ln>
+          </p:spPr>
+          <p:style>
+            <a:lnRef idx="1">
+              <a:schemeClr val="accent1"/>
+            </a:lnRef>
+            <a:fillRef idx="0">
+              <a:schemeClr val="accent1"/>
+            </a:fillRef>
+            <a:effectRef idx="0">
+              <a:schemeClr val="accent1"/>
+            </a:effectRef>
+            <a:fontRef idx="minor">
+              <a:schemeClr val="tx1"/>
+            </a:fontRef>
+          </p:style>
+        </p:cxnSp>
+        <p:cxnSp>
+          <p:nvCxnSpPr>
+            <p:cNvPr id="369" name="Straight Arrow Connector 368">
+              <a:extLst>
+                <a:ext uri="{FF2B5EF4-FFF2-40B4-BE49-F238E27FC236}">
+                  <a16:creationId xmlns:a16="http://schemas.microsoft.com/office/drawing/2014/main" id="{AB2A44DF-F9C2-401A-AC45-2A99B577DDED}"/>
+                </a:ext>
+              </a:extLst>
+            </p:cNvPr>
+            <p:cNvCxnSpPr>
+              <a:cxnSpLocks/>
+              <a:stCxn id="349" idx="1"/>
+              <a:endCxn id="348" idx="3"/>
+            </p:cNvCxnSpPr>
+            <p:nvPr/>
+          </p:nvCxnSpPr>
+          <p:spPr>
+            <a:xfrm flipH="1">
+              <a:off x="4780203" y="6968983"/>
+              <a:ext cx="426434" cy="1319"/>
+            </a:xfrm>
+            <a:prstGeom prst="straightConnector1">
+              <a:avLst/>
+            </a:prstGeom>
+            <a:ln>
+              <a:solidFill>
+                <a:srgbClr val="FF0000"/>
+              </a:solidFill>
+              <a:tailEnd type="triangle"/>
+            </a:ln>
+          </p:spPr>
+          <p:style>
+            <a:lnRef idx="1">
+              <a:schemeClr val="accent1"/>
+            </a:lnRef>
+            <a:fillRef idx="0">
+              <a:schemeClr val="accent1"/>
+            </a:fillRef>
+            <a:effectRef idx="0">
+              <a:schemeClr val="accent1"/>
+            </a:effectRef>
+            <a:fontRef idx="minor">
+              <a:schemeClr val="tx1"/>
+            </a:fontRef>
+          </p:style>
+        </p:cxnSp>
+        <p:cxnSp>
+          <p:nvCxnSpPr>
+            <p:cNvPr id="370" name="Straight Arrow Connector 369">
+              <a:extLst>
+                <a:ext uri="{FF2B5EF4-FFF2-40B4-BE49-F238E27FC236}">
+                  <a16:creationId xmlns:a16="http://schemas.microsoft.com/office/drawing/2014/main" id="{31833518-1CBB-44E7-B0C6-A90753BEA1D2}"/>
+                </a:ext>
+              </a:extLst>
+            </p:cNvPr>
+            <p:cNvCxnSpPr>
+              <a:cxnSpLocks/>
+              <a:stCxn id="352" idx="1"/>
+              <a:endCxn id="351" idx="3"/>
+            </p:cNvCxnSpPr>
+            <p:nvPr/>
+          </p:nvCxnSpPr>
+          <p:spPr>
+            <a:xfrm flipH="1">
+              <a:off x="4777777" y="8179539"/>
+              <a:ext cx="459457" cy="1319"/>
+            </a:xfrm>
+            <a:prstGeom prst="straightConnector1">
+              <a:avLst/>
+            </a:prstGeom>
+            <a:ln>
+              <a:solidFill>
+                <a:srgbClr val="FF0000"/>
+              </a:solidFill>
+              <a:tailEnd type="triangle"/>
+            </a:ln>
+          </p:spPr>
+          <p:style>
+            <a:lnRef idx="1">
+              <a:schemeClr val="accent1"/>
+            </a:lnRef>
+            <a:fillRef idx="0">
+              <a:schemeClr val="accent1"/>
+            </a:fillRef>
+            <a:effectRef idx="0">
+              <a:schemeClr val="accent1"/>
+            </a:effectRef>
+            <a:fontRef idx="minor">
+              <a:schemeClr val="tx1"/>
+            </a:fontRef>
+          </p:style>
+        </p:cxnSp>
+        <p:sp>
+          <p:nvSpPr>
+            <p:cNvPr id="371" name="TextBox 370">
+              <a:extLst>
+                <a:ext uri="{FF2B5EF4-FFF2-40B4-BE49-F238E27FC236}">
+                  <a16:creationId xmlns:a16="http://schemas.microsoft.com/office/drawing/2014/main" id="{3F47B901-E5CF-4E6C-ABB4-9706F7483B87}"/>
+                </a:ext>
+              </a:extLst>
+            </p:cNvPr>
+            <p:cNvSpPr txBox="1"/>
+            <p:nvPr/>
+          </p:nvSpPr>
+          <p:spPr>
+            <a:xfrm>
+              <a:off x="3859313" y="8542221"/>
+              <a:ext cx="2779000" cy="641989"/>
+            </a:xfrm>
+            <a:prstGeom prst="rect">
+              <a:avLst/>
+            </a:prstGeom>
+            <a:noFill/>
+          </p:spPr>
+          <p:txBody>
+            <a:bodyPr wrap="square" rtlCol="0">
+              <a:spAutoFit/>
+            </a:bodyPr>
+            <a:lstStyle/>
+            <a:p>
+              <a:pPr algn="ctr"/>
+              <a:r>
+                <a:rPr lang="en-US" dirty="0">
+                  <a:latin typeface="Arial" panose="020B0604020202020204" pitchFamily="34" charset="0"/>
+                  <a:cs typeface="Arial" panose="020B0604020202020204" pitchFamily="34" charset="0"/>
+                </a:rPr>
+                <a:t>(C) Chunk Configuration </a:t>
+              </a:r>
+            </a:p>
+            <a:p>
+              <a:pPr algn="ctr"/>
+              <a:r>
+                <a:rPr lang="en-US" dirty="0">
+                  <a:latin typeface="Arial" panose="020B0604020202020204" pitchFamily="34" charset="0"/>
+                  <a:cs typeface="Arial" panose="020B0604020202020204" pitchFamily="34" charset="0"/>
+                </a:rPr>
+                <a:t>Layer 1</a:t>
+              </a:r>
+            </a:p>
+          </p:txBody>
+        </p:sp>
+      </p:grpSp>
+      <p:sp>
+        <p:nvSpPr>
+          <p:cNvPr id="327" name="TextBox 326">
+            <a:extLst>
+              <a:ext uri="{FF2B5EF4-FFF2-40B4-BE49-F238E27FC236}">
+                <a16:creationId xmlns:a16="http://schemas.microsoft.com/office/drawing/2014/main" id="{207255BB-7FF9-4054-9130-7FF70FA67FE9}"/>
+              </a:ext>
+            </a:extLst>
+          </p:cNvPr>
+          <p:cNvSpPr txBox="1"/>
+          <p:nvPr/>
+        </p:nvSpPr>
+        <p:spPr>
+          <a:xfrm>
+            <a:off x="6613855" y="8091202"/>
+            <a:ext cx="2530145" cy="923330"/>
+          </a:xfrm>
+          <a:prstGeom prst="rect">
+            <a:avLst/>
+          </a:prstGeom>
+          <a:noFill/>
+        </p:spPr>
+        <p:txBody>
+          <a:bodyPr wrap="square" rtlCol="0">
+            <a:spAutoFit/>
+          </a:bodyPr>
+          <a:lstStyle/>
+          <a:p>
+            <a:pPr algn="ctr"/>
+            <a:r>
+              <a:rPr lang="en-US" dirty="0">
+                <a:latin typeface="Arial" panose="020B0604020202020204" pitchFamily="34" charset="0"/>
+                <a:cs typeface="Arial" panose="020B0604020202020204" pitchFamily="34" charset="0"/>
+              </a:rPr>
+              <a:t>(D) Chunk Configuration </a:t>
+            </a:r>
+          </a:p>
+          <a:p>
+            <a:pPr algn="ctr"/>
+            <a:r>
+              <a:rPr lang="en-US" dirty="0">
+                <a:latin typeface="Arial" panose="020B0604020202020204" pitchFamily="34" charset="0"/>
+                <a:cs typeface="Arial" panose="020B0604020202020204" pitchFamily="34" charset="0"/>
+              </a:rPr>
+              <a:t>Layer 2</a:t>
+            </a:r>
+          </a:p>
+        </p:txBody>
+      </p:sp>
+      <p:sp>
+        <p:nvSpPr>
+          <p:cNvPr id="328" name="TextBox 327">
+            <a:extLst>
+              <a:ext uri="{FF2B5EF4-FFF2-40B4-BE49-F238E27FC236}">
+                <a16:creationId xmlns:a16="http://schemas.microsoft.com/office/drawing/2014/main" id="{ECB06ECC-2E08-4F2E-9EFA-7E80042880D0}"/>
+              </a:ext>
+            </a:extLst>
+          </p:cNvPr>
+          <p:cNvSpPr txBox="1"/>
+          <p:nvPr/>
+        </p:nvSpPr>
+        <p:spPr>
+          <a:xfrm>
+            <a:off x="7217037" y="5432717"/>
+            <a:ext cx="593179" cy="461665"/>
+          </a:xfrm>
+          <a:prstGeom prst="rect">
+            <a:avLst/>
+          </a:prstGeom>
+          <a:noFill/>
+        </p:spPr>
+        <p:txBody>
+          <a:bodyPr wrap="square" rtlCol="0">
+            <a:spAutoFit/>
+          </a:bodyPr>
+          <a:lstStyle/>
+          <a:p>
+            <a:pPr algn="ctr"/>
+            <a:r>
+              <a:rPr lang="en-US" sz="1200" dirty="0">
+                <a:solidFill>
+                  <a:schemeClr val="bg1"/>
+                </a:solidFill>
+                <a:latin typeface="Arial" panose="020B0604020202020204" pitchFamily="34" charset="0"/>
+                <a:cs typeface="Arial" panose="020B0604020202020204" pitchFamily="34" charset="0"/>
+              </a:rPr>
+              <a:t>C 0:</a:t>
+            </a:r>
+          </a:p>
+          <a:p>
+            <a:pPr algn="ctr"/>
+            <a:r>
+              <a:rPr lang="en-US" sz="1200" dirty="0">
+                <a:solidFill>
+                  <a:schemeClr val="bg1"/>
+                </a:solidFill>
+                <a:latin typeface="Arial" panose="020B0604020202020204" pitchFamily="34" charset="0"/>
+                <a:cs typeface="Arial" panose="020B0604020202020204" pitchFamily="34" charset="0"/>
+              </a:rPr>
+              <a:t>1573</a:t>
+            </a:r>
+          </a:p>
+        </p:txBody>
+      </p:sp>
+      <p:sp>
+        <p:nvSpPr>
+          <p:cNvPr id="329" name="TextBox 328">
+            <a:extLst>
+              <a:ext uri="{FF2B5EF4-FFF2-40B4-BE49-F238E27FC236}">
+                <a16:creationId xmlns:a16="http://schemas.microsoft.com/office/drawing/2014/main" id="{BB4811D0-7A29-40FB-9029-B16D161C6482}"/>
+              </a:ext>
+            </a:extLst>
+          </p:cNvPr>
+          <p:cNvSpPr txBox="1"/>
+          <p:nvPr/>
+        </p:nvSpPr>
+        <p:spPr>
+          <a:xfrm>
+            <a:off x="8179322" y="5431091"/>
+            <a:ext cx="530341" cy="461665"/>
+          </a:xfrm>
+          <a:prstGeom prst="rect">
+            <a:avLst/>
+          </a:prstGeom>
+          <a:noFill/>
+        </p:spPr>
+        <p:txBody>
+          <a:bodyPr wrap="square" rtlCol="0">
+            <a:spAutoFit/>
+          </a:bodyPr>
+          <a:lstStyle/>
+          <a:p>
+            <a:pPr algn="ctr"/>
+            <a:r>
+              <a:rPr lang="en-US" sz="1200" dirty="0">
+                <a:solidFill>
+                  <a:schemeClr val="bg1"/>
+                </a:solidFill>
+                <a:latin typeface="Arial" panose="020B0604020202020204" pitchFamily="34" charset="0"/>
+                <a:cs typeface="Arial" panose="020B0604020202020204" pitchFamily="34" charset="0"/>
+              </a:rPr>
+              <a:t>C 1:</a:t>
+            </a:r>
+          </a:p>
+          <a:p>
+            <a:pPr algn="ctr"/>
+            <a:r>
+              <a:rPr lang="en-US" sz="1200" dirty="0">
+                <a:solidFill>
+                  <a:schemeClr val="bg1"/>
+                </a:solidFill>
+                <a:latin typeface="Arial" panose="020B0604020202020204" pitchFamily="34" charset="0"/>
+                <a:cs typeface="Arial" panose="020B0604020202020204" pitchFamily="34" charset="0"/>
+              </a:rPr>
+              <a:t>776</a:t>
+            </a:r>
+          </a:p>
+        </p:txBody>
+      </p:sp>
+      <p:cxnSp>
+        <p:nvCxnSpPr>
+          <p:cNvPr id="330" name="Straight Arrow Connector 329">
+            <a:extLst>
+              <a:ext uri="{FF2B5EF4-FFF2-40B4-BE49-F238E27FC236}">
+                <a16:creationId xmlns:a16="http://schemas.microsoft.com/office/drawing/2014/main" id="{092BC26F-AAFB-4089-BF56-18FE437A6D17}"/>
+              </a:ext>
+            </a:extLst>
+          </p:cNvPr>
+          <p:cNvCxnSpPr>
+            <a:cxnSpLocks/>
+            <a:stCxn id="337" idx="0"/>
+            <a:endCxn id="328" idx="2"/>
+          </p:cNvCxnSpPr>
+          <p:nvPr/>
+        </p:nvCxnSpPr>
+        <p:spPr>
+          <a:xfrm flipV="1">
+            <a:off x="7513627" y="5894382"/>
+            <a:ext cx="0" cy="548317"/>
+          </a:xfrm>
+          <a:prstGeom prst="straightConnector1">
+            <a:avLst/>
+          </a:prstGeom>
+          <a:ln>
+            <a:solidFill>
+              <a:srgbClr val="FF0000"/>
+            </a:solidFill>
+            <a:tailEnd type="triangle"/>
+          </a:ln>
+        </p:spPr>
+        <p:style>
+          <a:lnRef idx="1">
+            <a:schemeClr val="accent1"/>
+          </a:lnRef>
+          <a:fillRef idx="0">
+            <a:schemeClr val="accent1"/>
+          </a:fillRef>
+          <a:effectRef idx="0">
+            <a:schemeClr val="accent1"/>
+          </a:effectRef>
+          <a:fontRef idx="minor">
+            <a:schemeClr val="tx1"/>
+          </a:fontRef>
+        </p:style>
+      </p:cxnSp>
+      <p:cxnSp>
+        <p:nvCxnSpPr>
+          <p:cNvPr id="331" name="Straight Arrow Connector 330">
+            <a:extLst>
+              <a:ext uri="{FF2B5EF4-FFF2-40B4-BE49-F238E27FC236}">
+                <a16:creationId xmlns:a16="http://schemas.microsoft.com/office/drawing/2014/main" id="{CC31D626-DA23-4E10-A6AE-DFBE4FB24A0E}"/>
+              </a:ext>
+            </a:extLst>
+          </p:cNvPr>
+          <p:cNvCxnSpPr>
+            <a:cxnSpLocks/>
+            <a:stCxn id="338" idx="0"/>
+            <a:endCxn id="329" idx="2"/>
+          </p:cNvCxnSpPr>
+          <p:nvPr/>
+        </p:nvCxnSpPr>
+        <p:spPr>
+          <a:xfrm flipV="1">
+            <a:off x="8444493" y="5892756"/>
+            <a:ext cx="0" cy="548317"/>
+          </a:xfrm>
+          <a:prstGeom prst="straightConnector1">
+            <a:avLst/>
+          </a:prstGeom>
+          <a:ln>
+            <a:solidFill>
+              <a:srgbClr val="FF0000"/>
+            </a:solidFill>
+            <a:tailEnd type="triangle"/>
+          </a:ln>
+        </p:spPr>
+        <p:style>
+          <a:lnRef idx="1">
+            <a:schemeClr val="accent1"/>
+          </a:lnRef>
+          <a:fillRef idx="0">
+            <a:schemeClr val="accent1"/>
+          </a:fillRef>
+          <a:effectRef idx="0">
+            <a:schemeClr val="accent1"/>
+          </a:effectRef>
+          <a:fontRef idx="minor">
+            <a:schemeClr val="tx1"/>
+          </a:fontRef>
+        </p:style>
+      </p:cxnSp>
+      <p:cxnSp>
+        <p:nvCxnSpPr>
+          <p:cNvPr id="332" name="Straight Arrow Connector 331">
+            <a:extLst>
+              <a:ext uri="{FF2B5EF4-FFF2-40B4-BE49-F238E27FC236}">
+                <a16:creationId xmlns:a16="http://schemas.microsoft.com/office/drawing/2014/main" id="{BD596E40-AF07-45A3-8636-5C5C38BEEBE0}"/>
+              </a:ext>
+            </a:extLst>
+          </p:cNvPr>
+          <p:cNvCxnSpPr>
+            <a:cxnSpLocks/>
+            <a:stCxn id="339" idx="0"/>
+            <a:endCxn id="337" idx="2"/>
+          </p:cNvCxnSpPr>
+          <p:nvPr/>
+        </p:nvCxnSpPr>
+        <p:spPr>
+          <a:xfrm flipV="1">
+            <a:off x="7513627" y="6904364"/>
+            <a:ext cx="0" cy="751362"/>
+          </a:xfrm>
+          <a:prstGeom prst="straightConnector1">
+            <a:avLst/>
+          </a:prstGeom>
+          <a:ln>
+            <a:solidFill>
+              <a:srgbClr val="FF0000"/>
+            </a:solidFill>
+            <a:tailEnd type="triangle"/>
+          </a:ln>
+        </p:spPr>
+        <p:style>
+          <a:lnRef idx="1">
+            <a:schemeClr val="accent1"/>
+          </a:lnRef>
+          <a:fillRef idx="0">
+            <a:schemeClr val="accent1"/>
+          </a:fillRef>
+          <a:effectRef idx="0">
+            <a:schemeClr val="accent1"/>
+          </a:effectRef>
+          <a:fontRef idx="minor">
+            <a:schemeClr val="tx1"/>
+          </a:fontRef>
+        </p:style>
+      </p:cxnSp>
+      <p:cxnSp>
+        <p:nvCxnSpPr>
+          <p:cNvPr id="333" name="Straight Arrow Connector 332">
+            <a:extLst>
+              <a:ext uri="{FF2B5EF4-FFF2-40B4-BE49-F238E27FC236}">
+                <a16:creationId xmlns:a16="http://schemas.microsoft.com/office/drawing/2014/main" id="{592BD371-FC49-41FC-9B4F-CE4814BD5C24}"/>
+              </a:ext>
+            </a:extLst>
+          </p:cNvPr>
+          <p:cNvCxnSpPr>
+            <a:cxnSpLocks/>
+            <a:stCxn id="340" idx="0"/>
+            <a:endCxn id="338" idx="2"/>
+          </p:cNvCxnSpPr>
+          <p:nvPr/>
+        </p:nvCxnSpPr>
+        <p:spPr>
+          <a:xfrm flipV="1">
+            <a:off x="8444493" y="6902738"/>
+            <a:ext cx="0" cy="751362"/>
+          </a:xfrm>
+          <a:prstGeom prst="straightConnector1">
+            <a:avLst/>
+          </a:prstGeom>
+          <a:ln>
+            <a:solidFill>
+              <a:srgbClr val="FF0000"/>
+            </a:solidFill>
+            <a:tailEnd type="triangle"/>
+          </a:ln>
+        </p:spPr>
+        <p:style>
+          <a:lnRef idx="1">
+            <a:schemeClr val="accent1"/>
+          </a:lnRef>
+          <a:fillRef idx="0">
+            <a:schemeClr val="accent1"/>
+          </a:fillRef>
+          <a:effectRef idx="0">
+            <a:schemeClr val="accent1"/>
+          </a:effectRef>
+          <a:fontRef idx="minor">
+            <a:schemeClr val="tx1"/>
+          </a:fontRef>
+        </p:style>
+      </p:cxnSp>
+      <p:cxnSp>
+        <p:nvCxnSpPr>
+          <p:cNvPr id="334" name="Straight Arrow Connector 333">
+            <a:extLst>
+              <a:ext uri="{FF2B5EF4-FFF2-40B4-BE49-F238E27FC236}">
+                <a16:creationId xmlns:a16="http://schemas.microsoft.com/office/drawing/2014/main" id="{4B7C41AD-6F9A-4837-B568-DEC3BEB0BEEA}"/>
+              </a:ext>
+            </a:extLst>
+          </p:cNvPr>
+          <p:cNvCxnSpPr>
+            <a:cxnSpLocks/>
+            <a:stCxn id="329" idx="1"/>
+            <a:endCxn id="328" idx="3"/>
+          </p:cNvCxnSpPr>
+          <p:nvPr/>
+        </p:nvCxnSpPr>
+        <p:spPr>
+          <a:xfrm flipH="1">
+            <a:off x="7810216" y="5661924"/>
+            <a:ext cx="369106" cy="1626"/>
+          </a:xfrm>
+          <a:prstGeom prst="straightConnector1">
+            <a:avLst/>
+          </a:prstGeom>
+          <a:ln>
+            <a:solidFill>
+              <a:srgbClr val="FF0000"/>
+            </a:solidFill>
+            <a:tailEnd type="triangle"/>
+          </a:ln>
+        </p:spPr>
+        <p:style>
+          <a:lnRef idx="1">
+            <a:schemeClr val="accent1"/>
+          </a:lnRef>
+          <a:fillRef idx="0">
+            <a:schemeClr val="accent1"/>
+          </a:fillRef>
+          <a:effectRef idx="0">
+            <a:schemeClr val="accent1"/>
+          </a:effectRef>
+          <a:fontRef idx="minor">
+            <a:schemeClr val="tx1"/>
+          </a:fontRef>
+        </p:style>
+      </p:cxnSp>
+      <p:cxnSp>
+        <p:nvCxnSpPr>
+          <p:cNvPr id="335" name="Straight Arrow Connector 334">
+            <a:extLst>
+              <a:ext uri="{FF2B5EF4-FFF2-40B4-BE49-F238E27FC236}">
+                <a16:creationId xmlns:a16="http://schemas.microsoft.com/office/drawing/2014/main" id="{34FE489E-4161-4700-9D0C-BD67406AF4F9}"/>
+              </a:ext>
+            </a:extLst>
+          </p:cNvPr>
+          <p:cNvCxnSpPr>
+            <a:cxnSpLocks/>
+            <a:stCxn id="338" idx="1"/>
+            <a:endCxn id="337" idx="3"/>
+          </p:cNvCxnSpPr>
+          <p:nvPr/>
+        </p:nvCxnSpPr>
+        <p:spPr>
+          <a:xfrm flipH="1">
+            <a:off x="7810216" y="6671906"/>
+            <a:ext cx="369106" cy="1626"/>
+          </a:xfrm>
+          <a:prstGeom prst="straightConnector1">
+            <a:avLst/>
+          </a:prstGeom>
+          <a:ln>
+            <a:solidFill>
+              <a:srgbClr val="FF0000"/>
+            </a:solidFill>
+            <a:tailEnd type="triangle"/>
+          </a:ln>
+        </p:spPr>
+        <p:style>
+          <a:lnRef idx="1">
+            <a:schemeClr val="accent1"/>
+          </a:lnRef>
+          <a:fillRef idx="0">
+            <a:schemeClr val="accent1"/>
+          </a:fillRef>
+          <a:effectRef idx="0">
+            <a:schemeClr val="accent1"/>
+          </a:effectRef>
+          <a:fontRef idx="minor">
+            <a:schemeClr val="tx1"/>
+          </a:fontRef>
+        </p:style>
+      </p:cxnSp>
+      <p:cxnSp>
+        <p:nvCxnSpPr>
+          <p:cNvPr id="336" name="Straight Arrow Connector 335">
+            <a:extLst>
+              <a:ext uri="{FF2B5EF4-FFF2-40B4-BE49-F238E27FC236}">
+                <a16:creationId xmlns:a16="http://schemas.microsoft.com/office/drawing/2014/main" id="{B2C04D43-42E3-48FF-9A20-3E319F2A8838}"/>
+              </a:ext>
+            </a:extLst>
+          </p:cNvPr>
+          <p:cNvCxnSpPr>
+            <a:cxnSpLocks/>
+            <a:stCxn id="340" idx="1"/>
+            <a:endCxn id="339" idx="3"/>
+          </p:cNvCxnSpPr>
+          <p:nvPr/>
+        </p:nvCxnSpPr>
+        <p:spPr>
+          <a:xfrm flipH="1">
+            <a:off x="7810216" y="7884933"/>
+            <a:ext cx="369106" cy="1626"/>
+          </a:xfrm>
+          <a:prstGeom prst="straightConnector1">
+            <a:avLst/>
+          </a:prstGeom>
+          <a:ln>
+            <a:solidFill>
+              <a:srgbClr val="FF0000"/>
+            </a:solidFill>
+            <a:tailEnd type="triangle"/>
+          </a:ln>
+        </p:spPr>
+        <p:style>
+          <a:lnRef idx="1">
+            <a:schemeClr val="accent1"/>
+          </a:lnRef>
+          <a:fillRef idx="0">
+            <a:schemeClr val="accent1"/>
+          </a:fillRef>
+          <a:effectRef idx="0">
+            <a:schemeClr val="accent1"/>
+          </a:effectRef>
+          <a:fontRef idx="minor">
+            <a:schemeClr val="tx1"/>
+          </a:fontRef>
+        </p:style>
+      </p:cxnSp>
+      <p:sp>
+        <p:nvSpPr>
+          <p:cNvPr id="337" name="TextBox 336">
+            <a:extLst>
+              <a:ext uri="{FF2B5EF4-FFF2-40B4-BE49-F238E27FC236}">
+                <a16:creationId xmlns:a16="http://schemas.microsoft.com/office/drawing/2014/main" id="{EC387C6F-937C-4199-BEF8-C7A40A4417E1}"/>
+              </a:ext>
+            </a:extLst>
+          </p:cNvPr>
+          <p:cNvSpPr txBox="1"/>
+          <p:nvPr/>
+        </p:nvSpPr>
+        <p:spPr>
+          <a:xfrm>
+            <a:off x="7217037" y="6442699"/>
+            <a:ext cx="593179" cy="461665"/>
+          </a:xfrm>
+          <a:prstGeom prst="rect">
+            <a:avLst/>
+          </a:prstGeom>
+          <a:noFill/>
+        </p:spPr>
+        <p:txBody>
+          <a:bodyPr wrap="square" rtlCol="0">
+            <a:spAutoFit/>
+          </a:bodyPr>
+          <a:lstStyle/>
+          <a:p>
+            <a:pPr algn="ctr"/>
+            <a:r>
+              <a:rPr lang="en-US" sz="1200" dirty="0">
+                <a:solidFill>
+                  <a:schemeClr val="bg1"/>
+                </a:solidFill>
+                <a:latin typeface="Arial" panose="020B0604020202020204" pitchFamily="34" charset="0"/>
+                <a:cs typeface="Arial" panose="020B0604020202020204" pitchFamily="34" charset="0"/>
+              </a:rPr>
+              <a:t>C 1:</a:t>
+            </a:r>
+          </a:p>
+          <a:p>
+            <a:pPr algn="ctr"/>
+            <a:r>
+              <a:rPr lang="en-US" sz="1200" dirty="0">
+                <a:solidFill>
+                  <a:schemeClr val="bg1"/>
+                </a:solidFill>
+                <a:latin typeface="Arial" panose="020B0604020202020204" pitchFamily="34" charset="0"/>
+                <a:cs typeface="Arial" panose="020B0604020202020204" pitchFamily="34" charset="0"/>
+              </a:rPr>
+              <a:t>2450</a:t>
+            </a:r>
+          </a:p>
+        </p:txBody>
+      </p:sp>
+      <p:sp>
+        <p:nvSpPr>
+          <p:cNvPr id="338" name="TextBox 337">
+            <a:extLst>
+              <a:ext uri="{FF2B5EF4-FFF2-40B4-BE49-F238E27FC236}">
+                <a16:creationId xmlns:a16="http://schemas.microsoft.com/office/drawing/2014/main" id="{B02814A0-F1FE-4F8E-92D8-416FD5634B1C}"/>
+              </a:ext>
+            </a:extLst>
+          </p:cNvPr>
+          <p:cNvSpPr txBox="1"/>
+          <p:nvPr/>
+        </p:nvSpPr>
+        <p:spPr>
+          <a:xfrm>
+            <a:off x="8179322" y="6441073"/>
+            <a:ext cx="530341" cy="461665"/>
+          </a:xfrm>
+          <a:prstGeom prst="rect">
+            <a:avLst/>
+          </a:prstGeom>
+          <a:noFill/>
+        </p:spPr>
+        <p:txBody>
+          <a:bodyPr wrap="square" rtlCol="0">
+            <a:spAutoFit/>
+          </a:bodyPr>
+          <a:lstStyle/>
+          <a:p>
+            <a:pPr algn="ctr"/>
+            <a:r>
+              <a:rPr lang="en-US" sz="1200" dirty="0">
+                <a:solidFill>
+                  <a:schemeClr val="bg1"/>
+                </a:solidFill>
+                <a:latin typeface="Arial" panose="020B0604020202020204" pitchFamily="34" charset="0"/>
+                <a:cs typeface="Arial" panose="020B0604020202020204" pitchFamily="34" charset="0"/>
+              </a:rPr>
+              <a:t>C 2:</a:t>
+            </a:r>
+          </a:p>
+          <a:p>
+            <a:pPr algn="ctr"/>
+            <a:r>
+              <a:rPr lang="en-US" sz="1200" dirty="0">
+                <a:solidFill>
+                  <a:schemeClr val="bg1"/>
+                </a:solidFill>
+                <a:latin typeface="Arial" panose="020B0604020202020204" pitchFamily="34" charset="0"/>
+                <a:cs typeface="Arial" panose="020B0604020202020204" pitchFamily="34" charset="0"/>
+              </a:rPr>
+              <a:t>1251</a:t>
+            </a:r>
+          </a:p>
+        </p:txBody>
+      </p:sp>
+      <p:sp>
+        <p:nvSpPr>
+          <p:cNvPr id="339" name="TextBox 338">
+            <a:extLst>
+              <a:ext uri="{FF2B5EF4-FFF2-40B4-BE49-F238E27FC236}">
+                <a16:creationId xmlns:a16="http://schemas.microsoft.com/office/drawing/2014/main" id="{EF328754-2E16-46F2-BEB8-D372BA0B95C3}"/>
+              </a:ext>
+            </a:extLst>
+          </p:cNvPr>
+          <p:cNvSpPr txBox="1"/>
+          <p:nvPr/>
+        </p:nvSpPr>
+        <p:spPr>
+          <a:xfrm>
+            <a:off x="7217037" y="7655726"/>
+            <a:ext cx="593179" cy="461665"/>
+          </a:xfrm>
+          <a:prstGeom prst="rect">
+            <a:avLst/>
+          </a:prstGeom>
+          <a:noFill/>
+        </p:spPr>
+        <p:txBody>
+          <a:bodyPr wrap="square" rtlCol="0">
+            <a:spAutoFit/>
+          </a:bodyPr>
+          <a:lstStyle/>
+          <a:p>
+            <a:pPr algn="ctr"/>
+            <a:r>
+              <a:rPr lang="en-US" sz="1200" dirty="0">
+                <a:solidFill>
+                  <a:schemeClr val="bg1"/>
+                </a:solidFill>
+                <a:latin typeface="Arial" panose="020B0604020202020204" pitchFamily="34" charset="0"/>
+                <a:cs typeface="Arial" panose="020B0604020202020204" pitchFamily="34" charset="0"/>
+              </a:rPr>
+              <a:t>C 3:</a:t>
+            </a:r>
+          </a:p>
+          <a:p>
+            <a:pPr algn="ctr"/>
+            <a:r>
+              <a:rPr lang="en-US" sz="1200" dirty="0">
+                <a:solidFill>
+                  <a:schemeClr val="bg1"/>
+                </a:solidFill>
+                <a:latin typeface="Arial" panose="020B0604020202020204" pitchFamily="34" charset="0"/>
+                <a:cs typeface="Arial" panose="020B0604020202020204" pitchFamily="34" charset="0"/>
+              </a:rPr>
+              <a:t>166</a:t>
+            </a:r>
+          </a:p>
+        </p:txBody>
+      </p:sp>
+      <p:sp>
+        <p:nvSpPr>
+          <p:cNvPr id="340" name="TextBox 339">
+            <a:extLst>
+              <a:ext uri="{FF2B5EF4-FFF2-40B4-BE49-F238E27FC236}">
+                <a16:creationId xmlns:a16="http://schemas.microsoft.com/office/drawing/2014/main" id="{C9046E1D-279E-46EF-B77E-439FDE8E7D3E}"/>
+              </a:ext>
+            </a:extLst>
+          </p:cNvPr>
+          <p:cNvSpPr txBox="1"/>
+          <p:nvPr/>
+        </p:nvSpPr>
+        <p:spPr>
+          <a:xfrm>
+            <a:off x="8179322" y="7654100"/>
+            <a:ext cx="530341" cy="461665"/>
+          </a:xfrm>
+          <a:prstGeom prst="rect">
+            <a:avLst/>
+          </a:prstGeom>
+          <a:noFill/>
+        </p:spPr>
+        <p:txBody>
+          <a:bodyPr wrap="square" rtlCol="0">
+            <a:spAutoFit/>
+          </a:bodyPr>
+          <a:lstStyle/>
+          <a:p>
+            <a:pPr algn="ctr"/>
+            <a:r>
+              <a:rPr lang="en-US" sz="1200" dirty="0">
+                <a:solidFill>
+                  <a:schemeClr val="bg1"/>
+                </a:solidFill>
+                <a:latin typeface="Arial" panose="020B0604020202020204" pitchFamily="34" charset="0"/>
+                <a:cs typeface="Arial" panose="020B0604020202020204" pitchFamily="34" charset="0"/>
+              </a:rPr>
+              <a:t>C 4:</a:t>
+            </a:r>
+          </a:p>
+          <a:p>
+            <a:pPr algn="ctr"/>
+            <a:r>
+              <a:rPr lang="en-US" sz="1200" dirty="0">
+                <a:solidFill>
+                  <a:schemeClr val="bg1"/>
+                </a:solidFill>
+                <a:latin typeface="Arial" panose="020B0604020202020204" pitchFamily="34" charset="0"/>
+                <a:cs typeface="Arial" panose="020B0604020202020204" pitchFamily="34" charset="0"/>
+              </a:rPr>
+              <a:t>73</a:t>
+            </a:r>
+          </a:p>
+        </p:txBody>
+      </p:sp>
+      <p:sp>
+        <p:nvSpPr>
+          <p:cNvPr id="372" name="TextBox 371">
+            <a:extLst>
+              <a:ext uri="{FF2B5EF4-FFF2-40B4-BE49-F238E27FC236}">
+                <a16:creationId xmlns:a16="http://schemas.microsoft.com/office/drawing/2014/main" id="{2A8D9DF1-9BCE-4048-B3C2-1DC4ACF8A226}"/>
+              </a:ext>
+            </a:extLst>
+          </p:cNvPr>
+          <p:cNvSpPr txBox="1"/>
+          <p:nvPr/>
+        </p:nvSpPr>
+        <p:spPr>
+          <a:xfrm>
+            <a:off x="7738745" y="1438254"/>
+            <a:ext cx="593179" cy="461665"/>
+          </a:xfrm>
+          <a:prstGeom prst="rect">
+            <a:avLst/>
+          </a:prstGeom>
+          <a:noFill/>
+        </p:spPr>
+        <p:txBody>
+          <a:bodyPr wrap="square" rtlCol="0">
+            <a:spAutoFit/>
+          </a:bodyPr>
+          <a:lstStyle/>
+          <a:p>
+            <a:pPr algn="ctr"/>
+            <a:r>
+              <a:rPr lang="en-US" sz="1200" dirty="0">
+                <a:solidFill>
+                  <a:schemeClr val="bg1"/>
+                </a:solidFill>
+                <a:latin typeface="Arial" panose="020B0604020202020204" pitchFamily="34" charset="0"/>
+                <a:cs typeface="Arial" panose="020B0604020202020204" pitchFamily="34" charset="0"/>
+              </a:rPr>
+              <a:t>C 0:</a:t>
+            </a:r>
+          </a:p>
+          <a:p>
+            <a:pPr algn="ctr"/>
+            <a:r>
+              <a:rPr lang="en-US" sz="1200" dirty="0">
+                <a:solidFill>
+                  <a:schemeClr val="bg1"/>
+                </a:solidFill>
+                <a:latin typeface="Arial" panose="020B0604020202020204" pitchFamily="34" charset="0"/>
+                <a:cs typeface="Arial" panose="020B0604020202020204" pitchFamily="34" charset="0"/>
+              </a:rPr>
+              <a:t>977</a:t>
+            </a:r>
+          </a:p>
+        </p:txBody>
+      </p:sp>
+      <p:cxnSp>
+        <p:nvCxnSpPr>
+          <p:cNvPr id="373" name="Straight Arrow Connector 372">
+            <a:extLst>
+              <a:ext uri="{FF2B5EF4-FFF2-40B4-BE49-F238E27FC236}">
+                <a16:creationId xmlns:a16="http://schemas.microsoft.com/office/drawing/2014/main" id="{002289FF-61A7-4975-B9D1-9728B712443E}"/>
+              </a:ext>
+            </a:extLst>
+          </p:cNvPr>
+          <p:cNvCxnSpPr>
+            <a:cxnSpLocks/>
+            <a:stCxn id="374" idx="0"/>
+            <a:endCxn id="372" idx="2"/>
+          </p:cNvCxnSpPr>
+          <p:nvPr/>
+        </p:nvCxnSpPr>
+        <p:spPr>
+          <a:xfrm flipV="1">
+            <a:off x="8035335" y="1899919"/>
+            <a:ext cx="0" cy="533529"/>
+          </a:xfrm>
+          <a:prstGeom prst="straightConnector1">
+            <a:avLst/>
+          </a:prstGeom>
+          <a:ln>
+            <a:solidFill>
+              <a:srgbClr val="FF0000"/>
+            </a:solidFill>
+            <a:tailEnd type="triangle"/>
+          </a:ln>
+        </p:spPr>
+        <p:style>
+          <a:lnRef idx="1">
+            <a:schemeClr val="accent1"/>
+          </a:lnRef>
+          <a:fillRef idx="0">
+            <a:schemeClr val="accent1"/>
+          </a:fillRef>
+          <a:effectRef idx="0">
+            <a:schemeClr val="accent1"/>
+          </a:effectRef>
+          <a:fontRef idx="minor">
+            <a:schemeClr val="tx1"/>
+          </a:fontRef>
+        </p:style>
+      </p:cxnSp>
+      <p:sp>
+        <p:nvSpPr>
+          <p:cNvPr id="374" name="TextBox 373">
+            <a:extLst>
+              <a:ext uri="{FF2B5EF4-FFF2-40B4-BE49-F238E27FC236}">
+                <a16:creationId xmlns:a16="http://schemas.microsoft.com/office/drawing/2014/main" id="{0450F249-0B3C-49C7-A8E2-03BCA4639C6A}"/>
+              </a:ext>
+            </a:extLst>
+          </p:cNvPr>
+          <p:cNvSpPr txBox="1"/>
+          <p:nvPr/>
+        </p:nvSpPr>
+        <p:spPr>
+          <a:xfrm>
+            <a:off x="7738745" y="2433448"/>
+            <a:ext cx="593179" cy="461665"/>
+          </a:xfrm>
+          <a:prstGeom prst="rect">
+            <a:avLst/>
+          </a:prstGeom>
+          <a:noFill/>
+        </p:spPr>
+        <p:txBody>
+          <a:bodyPr wrap="square" rtlCol="0">
+            <a:spAutoFit/>
+          </a:bodyPr>
+          <a:lstStyle/>
+          <a:p>
+            <a:pPr algn="ctr"/>
+            <a:r>
+              <a:rPr lang="en-US" sz="1200" dirty="0">
+                <a:solidFill>
+                  <a:schemeClr val="bg1"/>
+                </a:solidFill>
+                <a:latin typeface="Arial" panose="020B0604020202020204" pitchFamily="34" charset="0"/>
+                <a:cs typeface="Arial" panose="020B0604020202020204" pitchFamily="34" charset="0"/>
+              </a:rPr>
+              <a:t>C 1:</a:t>
+            </a:r>
+          </a:p>
+          <a:p>
+            <a:pPr algn="ctr"/>
+            <a:r>
+              <a:rPr lang="en-US" sz="1200" dirty="0">
+                <a:solidFill>
+                  <a:schemeClr val="bg1"/>
+                </a:solidFill>
+                <a:latin typeface="Arial" panose="020B0604020202020204" pitchFamily="34" charset="0"/>
+                <a:cs typeface="Arial" panose="020B0604020202020204" pitchFamily="34" charset="0"/>
+              </a:rPr>
+              <a:t>141</a:t>
+            </a:r>
+          </a:p>
+        </p:txBody>
+      </p:sp>
     </p:spTree>
     <p:extLst>
       <p:ext uri="{BB962C8B-B14F-4D97-AF65-F5344CB8AC3E}">

</xml_diff>